<commit_message>
Update architecture diagram, move go.mod go.sum to test
</commit_message>
<xml_diff>
--- a/doc/deployment_guide/images/terraform-mendix-private-cloud-diagram.pptx
+++ b/doc/deployment_guide/images/terraform-mendix-private-cloud-diagram.pptx
@@ -2,12 +2,12 @@
 <file path=ppt/presentation.xml><?xml version="1.0" encoding="utf-8"?>
 <p:presentation xmlns:a="http://schemas.openxmlformats.org/drawingml/2006/main" xmlns:r="http://schemas.openxmlformats.org/officeDocument/2006/relationships" xmlns:p="http://schemas.openxmlformats.org/presentationml/2006/main" saveSubsetFonts="1">
   <p:sldMasterIdLst>
-    <p:sldMasterId id="2147483720" r:id="rId1"/>
+    <p:sldMasterId id="2147483756" r:id="rId1"/>
   </p:sldMasterIdLst>
   <p:sldIdLst>
     <p:sldId id="256" r:id="rId2"/>
   </p:sldIdLst>
-  <p:sldSz cx="15968663" cy="8942388"/>
+  <p:sldSz cx="15968663" cy="7034213"/>
   <p:notesSz cx="6858000" cy="9144000"/>
   <p:defaultTextStyle>
     <a:defPPr>
@@ -141,15 +141,15 @@
         </p:nvSpPr>
         <p:spPr>
           <a:xfrm>
-            <a:off x="1996083" y="1463489"/>
-            <a:ext cx="11976497" cy="3113276"/>
+            <a:off x="1996083" y="1151202"/>
+            <a:ext cx="11976497" cy="2448948"/>
           </a:xfrm>
         </p:spPr>
         <p:txBody>
           <a:bodyPr anchor="b"/>
           <a:lstStyle>
             <a:lvl1pPr algn="ctr">
-              <a:defRPr sz="7823"/>
+              <a:defRPr sz="6154"/>
             </a:lvl1pPr>
           </a:lstStyle>
           <a:p>
@@ -173,8 +173,8 @@
         </p:nvSpPr>
         <p:spPr>
           <a:xfrm>
-            <a:off x="1996083" y="4696825"/>
-            <a:ext cx="11976497" cy="2159006"/>
+            <a:off x="1996083" y="3694591"/>
+            <a:ext cx="11976497" cy="1698306"/>
           </a:xfrm>
         </p:spPr>
         <p:txBody>
@@ -182,39 +182,39 @@
           <a:lstStyle>
             <a:lvl1pPr marL="0" indent="0" algn="ctr">
               <a:buNone/>
-              <a:defRPr sz="3129"/>
+              <a:defRPr sz="2462"/>
             </a:lvl1pPr>
-            <a:lvl2pPr marL="596143" indent="0" algn="ctr">
+            <a:lvl2pPr marL="468950" indent="0" algn="ctr">
               <a:buNone/>
-              <a:defRPr sz="2608"/>
+              <a:defRPr sz="2051"/>
             </a:lvl2pPr>
-            <a:lvl3pPr marL="1192286" indent="0" algn="ctr">
+            <a:lvl3pPr marL="937900" indent="0" algn="ctr">
               <a:buNone/>
-              <a:defRPr sz="2347"/>
+              <a:defRPr sz="1846"/>
             </a:lvl3pPr>
-            <a:lvl4pPr marL="1788429" indent="0" algn="ctr">
+            <a:lvl4pPr marL="1406850" indent="0" algn="ctr">
               <a:buNone/>
-              <a:defRPr sz="2086"/>
+              <a:defRPr sz="1641"/>
             </a:lvl4pPr>
-            <a:lvl5pPr marL="2384572" indent="0" algn="ctr">
+            <a:lvl5pPr marL="1875800" indent="0" algn="ctr">
               <a:buNone/>
-              <a:defRPr sz="2086"/>
+              <a:defRPr sz="1641"/>
             </a:lvl5pPr>
-            <a:lvl6pPr marL="2980715" indent="0" algn="ctr">
+            <a:lvl6pPr marL="2344750" indent="0" algn="ctr">
               <a:buNone/>
-              <a:defRPr sz="2086"/>
+              <a:defRPr sz="1641"/>
             </a:lvl6pPr>
-            <a:lvl7pPr marL="3576858" indent="0" algn="ctr">
+            <a:lvl7pPr marL="2813700" indent="0" algn="ctr">
               <a:buNone/>
-              <a:defRPr sz="2086"/>
+              <a:defRPr sz="1641"/>
             </a:lvl7pPr>
-            <a:lvl8pPr marL="4173002" indent="0" algn="ctr">
+            <a:lvl8pPr marL="3282650" indent="0" algn="ctr">
               <a:buNone/>
-              <a:defRPr sz="2086"/>
+              <a:defRPr sz="1641"/>
             </a:lvl8pPr>
-            <a:lvl9pPr marL="4769145" indent="0" algn="ctr">
+            <a:lvl9pPr marL="3751600" indent="0" algn="ctr">
               <a:buNone/>
-              <a:defRPr sz="2086"/>
+              <a:defRPr sz="1641"/>
             </a:lvl9pPr>
           </a:lstStyle>
           <a:p>
@@ -243,7 +243,7 @@
           <a:p>
             <a:fld id="{87F3BBB2-E533-43A8-AA78-2DC6FC5FE5A0}" type="datetimeFigureOut">
               <a:rPr lang="en-US" smtClean="0"/>
-              <a:t>12/11/22</a:t>
+              <a:t>12/12/22</a:t>
             </a:fld>
             <a:endParaRPr lang="en-US"/>
           </a:p>
@@ -294,7 +294,7 @@
     </p:spTree>
     <p:extLst>
       <p:ext uri="{BB962C8B-B14F-4D97-AF65-F5344CB8AC3E}">
-        <p14:creationId xmlns:p14="http://schemas.microsoft.com/office/powerpoint/2010/main" val="4250639287"/>
+        <p14:creationId xmlns:p14="http://schemas.microsoft.com/office/powerpoint/2010/main" val="2501843020"/>
       </p:ext>
     </p:extLst>
   </p:cSld>
@@ -413,7 +413,7 @@
           <a:p>
             <a:fld id="{87F3BBB2-E533-43A8-AA78-2DC6FC5FE5A0}" type="datetimeFigureOut">
               <a:rPr lang="en-US" smtClean="0"/>
-              <a:t>12/11/22</a:t>
+              <a:t>12/12/22</a:t>
             </a:fld>
             <a:endParaRPr lang="en-US"/>
           </a:p>
@@ -464,7 +464,7 @@
     </p:spTree>
     <p:extLst>
       <p:ext uri="{BB962C8B-B14F-4D97-AF65-F5344CB8AC3E}">
-        <p14:creationId xmlns:p14="http://schemas.microsoft.com/office/powerpoint/2010/main" val="625483589"/>
+        <p14:creationId xmlns:p14="http://schemas.microsoft.com/office/powerpoint/2010/main" val="2754541611"/>
       </p:ext>
     </p:extLst>
   </p:cSld>
@@ -503,8 +503,8 @@
         </p:nvSpPr>
         <p:spPr>
           <a:xfrm>
-            <a:off x="11427574" y="476100"/>
-            <a:ext cx="3443243" cy="7578260"/>
+            <a:off x="11427574" y="374507"/>
+            <a:ext cx="3443243" cy="5961170"/>
           </a:xfrm>
         </p:spPr>
         <p:txBody>
@@ -531,8 +531,8 @@
         </p:nvSpPr>
         <p:spPr>
           <a:xfrm>
-            <a:off x="1097845" y="476100"/>
-            <a:ext cx="10130121" cy="7578260"/>
+            <a:off x="1097845" y="374507"/>
+            <a:ext cx="10130121" cy="5961170"/>
           </a:xfrm>
         </p:spPr>
         <p:txBody>
@@ -593,7 +593,7 @@
           <a:p>
             <a:fld id="{87F3BBB2-E533-43A8-AA78-2DC6FC5FE5A0}" type="datetimeFigureOut">
               <a:rPr lang="en-US" smtClean="0"/>
-              <a:t>12/11/22</a:t>
+              <a:t>12/12/22</a:t>
             </a:fld>
             <a:endParaRPr lang="en-US"/>
           </a:p>
@@ -644,7 +644,7 @@
     </p:spTree>
     <p:extLst>
       <p:ext uri="{BB962C8B-B14F-4D97-AF65-F5344CB8AC3E}">
-        <p14:creationId xmlns:p14="http://schemas.microsoft.com/office/powerpoint/2010/main" val="2302575352"/>
+        <p14:creationId xmlns:p14="http://schemas.microsoft.com/office/powerpoint/2010/main" val="405857022"/>
       </p:ext>
     </p:extLst>
   </p:cSld>
@@ -763,7 +763,7 @@
           <a:p>
             <a:fld id="{87F3BBB2-E533-43A8-AA78-2DC6FC5FE5A0}" type="datetimeFigureOut">
               <a:rPr lang="en-US" smtClean="0"/>
-              <a:t>12/11/22</a:t>
+              <a:t>12/12/22</a:t>
             </a:fld>
             <a:endParaRPr lang="en-US"/>
           </a:p>
@@ -814,7 +814,7 @@
     </p:spTree>
     <p:extLst>
       <p:ext uri="{BB962C8B-B14F-4D97-AF65-F5344CB8AC3E}">
-        <p14:creationId xmlns:p14="http://schemas.microsoft.com/office/powerpoint/2010/main" val="1115261332"/>
+        <p14:creationId xmlns:p14="http://schemas.microsoft.com/office/powerpoint/2010/main" val="3010153755"/>
       </p:ext>
     </p:extLst>
   </p:cSld>
@@ -853,15 +853,15 @@
         </p:nvSpPr>
         <p:spPr>
           <a:xfrm>
-            <a:off x="1089528" y="2229388"/>
-            <a:ext cx="13772972" cy="3719784"/>
+            <a:off x="1089528" y="1753669"/>
+            <a:ext cx="13772972" cy="2926037"/>
           </a:xfrm>
         </p:spPr>
         <p:txBody>
           <a:bodyPr anchor="b"/>
           <a:lstStyle>
             <a:lvl1pPr>
-              <a:defRPr sz="7823"/>
+              <a:defRPr sz="6154"/>
             </a:lvl1pPr>
           </a:lstStyle>
           <a:p>
@@ -885,8 +885,8 @@
         </p:nvSpPr>
         <p:spPr>
           <a:xfrm>
-            <a:off x="1089528" y="5984363"/>
-            <a:ext cx="13772972" cy="1956147"/>
+            <a:off x="1089528" y="4707387"/>
+            <a:ext cx="13772972" cy="1538734"/>
           </a:xfrm>
         </p:spPr>
         <p:txBody>
@@ -894,7 +894,7 @@
           <a:lstStyle>
             <a:lvl1pPr marL="0" indent="0">
               <a:buNone/>
-              <a:defRPr sz="3129">
+              <a:defRPr sz="2462">
                 <a:solidFill>
                   <a:schemeClr val="tx1">
                     <a:tint val="75000"/>
@@ -902,9 +902,9 @@
                 </a:solidFill>
               </a:defRPr>
             </a:lvl1pPr>
-            <a:lvl2pPr marL="596143" indent="0">
+            <a:lvl2pPr marL="468950" indent="0">
               <a:buNone/>
-              <a:defRPr sz="2608">
+              <a:defRPr sz="2051">
                 <a:solidFill>
                   <a:schemeClr val="tx1">
                     <a:tint val="75000"/>
@@ -912,9 +912,9 @@
                 </a:solidFill>
               </a:defRPr>
             </a:lvl2pPr>
-            <a:lvl3pPr marL="1192286" indent="0">
+            <a:lvl3pPr marL="937900" indent="0">
               <a:buNone/>
-              <a:defRPr sz="2347">
+              <a:defRPr sz="1846">
                 <a:solidFill>
                   <a:schemeClr val="tx1">
                     <a:tint val="75000"/>
@@ -922,9 +922,9 @@
                 </a:solidFill>
               </a:defRPr>
             </a:lvl3pPr>
-            <a:lvl4pPr marL="1788429" indent="0">
+            <a:lvl4pPr marL="1406850" indent="0">
               <a:buNone/>
-              <a:defRPr sz="2086">
+              <a:defRPr sz="1641">
                 <a:solidFill>
                   <a:schemeClr val="tx1">
                     <a:tint val="75000"/>
@@ -932,9 +932,9 @@
                 </a:solidFill>
               </a:defRPr>
             </a:lvl4pPr>
-            <a:lvl5pPr marL="2384572" indent="0">
+            <a:lvl5pPr marL="1875800" indent="0">
               <a:buNone/>
-              <a:defRPr sz="2086">
+              <a:defRPr sz="1641">
                 <a:solidFill>
                   <a:schemeClr val="tx1">
                     <a:tint val="75000"/>
@@ -942,9 +942,9 @@
                 </a:solidFill>
               </a:defRPr>
             </a:lvl5pPr>
-            <a:lvl6pPr marL="2980715" indent="0">
+            <a:lvl6pPr marL="2344750" indent="0">
               <a:buNone/>
-              <a:defRPr sz="2086">
+              <a:defRPr sz="1641">
                 <a:solidFill>
                   <a:schemeClr val="tx1">
                     <a:tint val="75000"/>
@@ -952,9 +952,9 @@
                 </a:solidFill>
               </a:defRPr>
             </a:lvl6pPr>
-            <a:lvl7pPr marL="3576858" indent="0">
+            <a:lvl7pPr marL="2813700" indent="0">
               <a:buNone/>
-              <a:defRPr sz="2086">
+              <a:defRPr sz="1641">
                 <a:solidFill>
                   <a:schemeClr val="tx1">
                     <a:tint val="75000"/>
@@ -962,9 +962,9 @@
                 </a:solidFill>
               </a:defRPr>
             </a:lvl7pPr>
-            <a:lvl8pPr marL="4173002" indent="0">
+            <a:lvl8pPr marL="3282650" indent="0">
               <a:buNone/>
-              <a:defRPr sz="2086">
+              <a:defRPr sz="1641">
                 <a:solidFill>
                   <a:schemeClr val="tx1">
                     <a:tint val="75000"/>
@@ -972,9 +972,9 @@
                 </a:solidFill>
               </a:defRPr>
             </a:lvl8pPr>
-            <a:lvl9pPr marL="4769145" indent="0">
+            <a:lvl9pPr marL="3751600" indent="0">
               <a:buNone/>
-              <a:defRPr sz="2086">
+              <a:defRPr sz="1641">
                 <a:solidFill>
                   <a:schemeClr val="tx1">
                     <a:tint val="75000"/>
@@ -1009,7 +1009,7 @@
           <a:p>
             <a:fld id="{87F3BBB2-E533-43A8-AA78-2DC6FC5FE5A0}" type="datetimeFigureOut">
               <a:rPr lang="en-US" smtClean="0"/>
-              <a:t>12/11/22</a:t>
+              <a:t>12/12/22</a:t>
             </a:fld>
             <a:endParaRPr lang="en-US"/>
           </a:p>
@@ -1060,7 +1060,7 @@
     </p:spTree>
     <p:extLst>
       <p:ext uri="{BB962C8B-B14F-4D97-AF65-F5344CB8AC3E}">
-        <p14:creationId xmlns:p14="http://schemas.microsoft.com/office/powerpoint/2010/main" val="1281743991"/>
+        <p14:creationId xmlns:p14="http://schemas.microsoft.com/office/powerpoint/2010/main" val="4185514727"/>
       </p:ext>
     </p:extLst>
   </p:cSld>
@@ -1122,8 +1122,8 @@
         </p:nvSpPr>
         <p:spPr>
           <a:xfrm>
-            <a:off x="1097845" y="2380497"/>
-            <a:ext cx="6786682" cy="5673863"/>
+            <a:off x="1097845" y="1872533"/>
+            <a:ext cx="6786682" cy="4463144"/>
           </a:xfrm>
         </p:spPr>
         <p:txBody>
@@ -1179,8 +1179,8 @@
         </p:nvSpPr>
         <p:spPr>
           <a:xfrm>
-            <a:off x="8084136" y="2380497"/>
-            <a:ext cx="6786682" cy="5673863"/>
+            <a:off x="8084136" y="1872533"/>
+            <a:ext cx="6786682" cy="4463144"/>
           </a:xfrm>
         </p:spPr>
         <p:txBody>
@@ -1241,7 +1241,7 @@
           <a:p>
             <a:fld id="{87F3BBB2-E533-43A8-AA78-2DC6FC5FE5A0}" type="datetimeFigureOut">
               <a:rPr lang="en-US" smtClean="0"/>
-              <a:t>12/11/22</a:t>
+              <a:t>12/12/22</a:t>
             </a:fld>
             <a:endParaRPr lang="en-US"/>
           </a:p>
@@ -1292,7 +1292,7 @@
     </p:spTree>
     <p:extLst>
       <p:ext uri="{BB962C8B-B14F-4D97-AF65-F5344CB8AC3E}">
-        <p14:creationId xmlns:p14="http://schemas.microsoft.com/office/powerpoint/2010/main" val="3408790007"/>
+        <p14:creationId xmlns:p14="http://schemas.microsoft.com/office/powerpoint/2010/main" val="2244768449"/>
       </p:ext>
     </p:extLst>
   </p:cSld>
@@ -1331,8 +1331,8 @@
         </p:nvSpPr>
         <p:spPr>
           <a:xfrm>
-            <a:off x="1099925" y="476100"/>
-            <a:ext cx="13772972" cy="1728448"/>
+            <a:off x="1099925" y="374507"/>
+            <a:ext cx="13772972" cy="1359623"/>
           </a:xfrm>
         </p:spPr>
         <p:txBody>
@@ -1359,8 +1359,8 @@
         </p:nvSpPr>
         <p:spPr>
           <a:xfrm>
-            <a:off x="1099926" y="2192128"/>
-            <a:ext cx="6755492" cy="1074328"/>
+            <a:off x="1099926" y="1724360"/>
+            <a:ext cx="6755492" cy="845082"/>
           </a:xfrm>
         </p:spPr>
         <p:txBody>
@@ -1368,39 +1368,39 @@
           <a:lstStyle>
             <a:lvl1pPr marL="0" indent="0">
               <a:buNone/>
-              <a:defRPr sz="3129" b="1"/>
+              <a:defRPr sz="2462" b="1"/>
             </a:lvl1pPr>
-            <a:lvl2pPr marL="596143" indent="0">
+            <a:lvl2pPr marL="468950" indent="0">
               <a:buNone/>
-              <a:defRPr sz="2608" b="1"/>
+              <a:defRPr sz="2051" b="1"/>
             </a:lvl2pPr>
-            <a:lvl3pPr marL="1192286" indent="0">
+            <a:lvl3pPr marL="937900" indent="0">
               <a:buNone/>
-              <a:defRPr sz="2347" b="1"/>
+              <a:defRPr sz="1846" b="1"/>
             </a:lvl3pPr>
-            <a:lvl4pPr marL="1788429" indent="0">
+            <a:lvl4pPr marL="1406850" indent="0">
               <a:buNone/>
-              <a:defRPr sz="2086" b="1"/>
+              <a:defRPr sz="1641" b="1"/>
             </a:lvl4pPr>
-            <a:lvl5pPr marL="2384572" indent="0">
+            <a:lvl5pPr marL="1875800" indent="0">
               <a:buNone/>
-              <a:defRPr sz="2086" b="1"/>
+              <a:defRPr sz="1641" b="1"/>
             </a:lvl5pPr>
-            <a:lvl6pPr marL="2980715" indent="0">
+            <a:lvl6pPr marL="2344750" indent="0">
               <a:buNone/>
-              <a:defRPr sz="2086" b="1"/>
+              <a:defRPr sz="1641" b="1"/>
             </a:lvl6pPr>
-            <a:lvl7pPr marL="3576858" indent="0">
+            <a:lvl7pPr marL="2813700" indent="0">
               <a:buNone/>
-              <a:defRPr sz="2086" b="1"/>
+              <a:defRPr sz="1641" b="1"/>
             </a:lvl7pPr>
-            <a:lvl8pPr marL="4173002" indent="0">
+            <a:lvl8pPr marL="3282650" indent="0">
               <a:buNone/>
-              <a:defRPr sz="2086" b="1"/>
+              <a:defRPr sz="1641" b="1"/>
             </a:lvl8pPr>
-            <a:lvl9pPr marL="4769145" indent="0">
+            <a:lvl9pPr marL="3751600" indent="0">
               <a:buNone/>
-              <a:defRPr sz="2086" b="1"/>
+              <a:defRPr sz="1641" b="1"/>
             </a:lvl9pPr>
           </a:lstStyle>
           <a:p>
@@ -1424,8 +1424,8 @@
         </p:nvSpPr>
         <p:spPr>
           <a:xfrm>
-            <a:off x="1099926" y="3266456"/>
-            <a:ext cx="6755492" cy="4804464"/>
+            <a:off x="1099926" y="2569442"/>
+            <a:ext cx="6755492" cy="3779262"/>
           </a:xfrm>
         </p:spPr>
         <p:txBody>
@@ -1481,8 +1481,8 @@
         </p:nvSpPr>
         <p:spPr>
           <a:xfrm>
-            <a:off x="8084135" y="2192128"/>
-            <a:ext cx="6788762" cy="1074328"/>
+            <a:off x="8084135" y="1724360"/>
+            <a:ext cx="6788762" cy="845082"/>
           </a:xfrm>
         </p:spPr>
         <p:txBody>
@@ -1490,39 +1490,39 @@
           <a:lstStyle>
             <a:lvl1pPr marL="0" indent="0">
               <a:buNone/>
-              <a:defRPr sz="3129" b="1"/>
+              <a:defRPr sz="2462" b="1"/>
             </a:lvl1pPr>
-            <a:lvl2pPr marL="596143" indent="0">
+            <a:lvl2pPr marL="468950" indent="0">
               <a:buNone/>
-              <a:defRPr sz="2608" b="1"/>
+              <a:defRPr sz="2051" b="1"/>
             </a:lvl2pPr>
-            <a:lvl3pPr marL="1192286" indent="0">
+            <a:lvl3pPr marL="937900" indent="0">
               <a:buNone/>
-              <a:defRPr sz="2347" b="1"/>
+              <a:defRPr sz="1846" b="1"/>
             </a:lvl3pPr>
-            <a:lvl4pPr marL="1788429" indent="0">
+            <a:lvl4pPr marL="1406850" indent="0">
               <a:buNone/>
-              <a:defRPr sz="2086" b="1"/>
+              <a:defRPr sz="1641" b="1"/>
             </a:lvl4pPr>
-            <a:lvl5pPr marL="2384572" indent="0">
+            <a:lvl5pPr marL="1875800" indent="0">
               <a:buNone/>
-              <a:defRPr sz="2086" b="1"/>
+              <a:defRPr sz="1641" b="1"/>
             </a:lvl5pPr>
-            <a:lvl6pPr marL="2980715" indent="0">
+            <a:lvl6pPr marL="2344750" indent="0">
               <a:buNone/>
-              <a:defRPr sz="2086" b="1"/>
+              <a:defRPr sz="1641" b="1"/>
             </a:lvl6pPr>
-            <a:lvl7pPr marL="3576858" indent="0">
+            <a:lvl7pPr marL="2813700" indent="0">
               <a:buNone/>
-              <a:defRPr sz="2086" b="1"/>
+              <a:defRPr sz="1641" b="1"/>
             </a:lvl7pPr>
-            <a:lvl8pPr marL="4173002" indent="0">
+            <a:lvl8pPr marL="3282650" indent="0">
               <a:buNone/>
-              <a:defRPr sz="2086" b="1"/>
+              <a:defRPr sz="1641" b="1"/>
             </a:lvl8pPr>
-            <a:lvl9pPr marL="4769145" indent="0">
+            <a:lvl9pPr marL="3751600" indent="0">
               <a:buNone/>
-              <a:defRPr sz="2086" b="1"/>
+              <a:defRPr sz="1641" b="1"/>
             </a:lvl9pPr>
           </a:lstStyle>
           <a:p>
@@ -1546,8 +1546,8 @@
         </p:nvSpPr>
         <p:spPr>
           <a:xfrm>
-            <a:off x="8084135" y="3266456"/>
-            <a:ext cx="6788762" cy="4804464"/>
+            <a:off x="8084135" y="2569442"/>
+            <a:ext cx="6788762" cy="3779262"/>
           </a:xfrm>
         </p:spPr>
         <p:txBody>
@@ -1608,7 +1608,7 @@
           <a:p>
             <a:fld id="{87F3BBB2-E533-43A8-AA78-2DC6FC5FE5A0}" type="datetimeFigureOut">
               <a:rPr lang="en-US" smtClean="0"/>
-              <a:t>12/11/22</a:t>
+              <a:t>12/12/22</a:t>
             </a:fld>
             <a:endParaRPr lang="en-US"/>
           </a:p>
@@ -1659,7 +1659,7 @@
     </p:spTree>
     <p:extLst>
       <p:ext uri="{BB962C8B-B14F-4D97-AF65-F5344CB8AC3E}">
-        <p14:creationId xmlns:p14="http://schemas.microsoft.com/office/powerpoint/2010/main" val="1036042189"/>
+        <p14:creationId xmlns:p14="http://schemas.microsoft.com/office/powerpoint/2010/main" val="3241855731"/>
       </p:ext>
     </p:extLst>
   </p:cSld>
@@ -1726,7 +1726,7 @@
           <a:p>
             <a:fld id="{87F3BBB2-E533-43A8-AA78-2DC6FC5FE5A0}" type="datetimeFigureOut">
               <a:rPr lang="en-US" smtClean="0"/>
-              <a:t>12/11/22</a:t>
+              <a:t>12/12/22</a:t>
             </a:fld>
             <a:endParaRPr lang="en-US"/>
           </a:p>
@@ -1777,7 +1777,7 @@
     </p:spTree>
     <p:extLst>
       <p:ext uri="{BB962C8B-B14F-4D97-AF65-F5344CB8AC3E}">
-        <p14:creationId xmlns:p14="http://schemas.microsoft.com/office/powerpoint/2010/main" val="579242000"/>
+        <p14:creationId xmlns:p14="http://schemas.microsoft.com/office/powerpoint/2010/main" val="2955087644"/>
       </p:ext>
     </p:extLst>
   </p:cSld>
@@ -1821,7 +1821,7 @@
           <a:p>
             <a:fld id="{87F3BBB2-E533-43A8-AA78-2DC6FC5FE5A0}" type="datetimeFigureOut">
               <a:rPr lang="en-US" smtClean="0"/>
-              <a:t>12/11/22</a:t>
+              <a:t>12/12/22</a:t>
             </a:fld>
             <a:endParaRPr lang="en-US"/>
           </a:p>
@@ -1872,7 +1872,7 @@
     </p:spTree>
     <p:extLst>
       <p:ext uri="{BB962C8B-B14F-4D97-AF65-F5344CB8AC3E}">
-        <p14:creationId xmlns:p14="http://schemas.microsoft.com/office/powerpoint/2010/main" val="2373649233"/>
+        <p14:creationId xmlns:p14="http://schemas.microsoft.com/office/powerpoint/2010/main" val="2407345303"/>
       </p:ext>
     </p:extLst>
   </p:cSld>
@@ -1911,15 +1911,15 @@
         </p:nvSpPr>
         <p:spPr>
           <a:xfrm>
-            <a:off x="1099926" y="596159"/>
-            <a:ext cx="5150309" cy="2086557"/>
+            <a:off x="1099926" y="468948"/>
+            <a:ext cx="5150309" cy="1641316"/>
           </a:xfrm>
         </p:spPr>
         <p:txBody>
           <a:bodyPr anchor="b"/>
           <a:lstStyle>
             <a:lvl1pPr>
-              <a:defRPr sz="4172"/>
+              <a:defRPr sz="3282"/>
             </a:lvl1pPr>
           </a:lstStyle>
           <a:p>
@@ -1943,39 +1943,39 @@
         </p:nvSpPr>
         <p:spPr>
           <a:xfrm>
-            <a:off x="6788762" y="1287539"/>
-            <a:ext cx="8084136" cy="6354891"/>
+            <a:off x="6788762" y="1012797"/>
+            <a:ext cx="8084136" cy="4998850"/>
           </a:xfrm>
         </p:spPr>
         <p:txBody>
           <a:bodyPr/>
           <a:lstStyle>
             <a:lvl1pPr>
-              <a:defRPr sz="4172"/>
+              <a:defRPr sz="3282"/>
             </a:lvl1pPr>
             <a:lvl2pPr>
-              <a:defRPr sz="3651"/>
+              <a:defRPr sz="2872"/>
             </a:lvl2pPr>
             <a:lvl3pPr>
-              <a:defRPr sz="3129"/>
+              <a:defRPr sz="2462"/>
             </a:lvl3pPr>
             <a:lvl4pPr>
-              <a:defRPr sz="2608"/>
+              <a:defRPr sz="2051"/>
             </a:lvl4pPr>
             <a:lvl5pPr>
-              <a:defRPr sz="2608"/>
+              <a:defRPr sz="2051"/>
             </a:lvl5pPr>
             <a:lvl6pPr>
-              <a:defRPr sz="2608"/>
+              <a:defRPr sz="2051"/>
             </a:lvl6pPr>
             <a:lvl7pPr>
-              <a:defRPr sz="2608"/>
+              <a:defRPr sz="2051"/>
             </a:lvl7pPr>
             <a:lvl8pPr>
-              <a:defRPr sz="2608"/>
+              <a:defRPr sz="2051"/>
             </a:lvl8pPr>
             <a:lvl9pPr>
-              <a:defRPr sz="2608"/>
+              <a:defRPr sz="2051"/>
             </a:lvl9pPr>
           </a:lstStyle>
           <a:p>
@@ -2028,8 +2028,8 @@
         </p:nvSpPr>
         <p:spPr>
           <a:xfrm>
-            <a:off x="1099926" y="2682716"/>
-            <a:ext cx="5150309" cy="4970064"/>
+            <a:off x="1099926" y="2110264"/>
+            <a:ext cx="5150309" cy="3909525"/>
           </a:xfrm>
         </p:spPr>
         <p:txBody>
@@ -2037,39 +2037,39 @@
           <a:lstStyle>
             <a:lvl1pPr marL="0" indent="0">
               <a:buNone/>
-              <a:defRPr sz="2086"/>
+              <a:defRPr sz="1641"/>
             </a:lvl1pPr>
-            <a:lvl2pPr marL="596143" indent="0">
+            <a:lvl2pPr marL="468950" indent="0">
               <a:buNone/>
-              <a:defRPr sz="1825"/>
+              <a:defRPr sz="1436"/>
             </a:lvl2pPr>
-            <a:lvl3pPr marL="1192286" indent="0">
+            <a:lvl3pPr marL="937900" indent="0">
               <a:buNone/>
-              <a:defRPr sz="1565"/>
+              <a:defRPr sz="1231"/>
             </a:lvl3pPr>
-            <a:lvl4pPr marL="1788429" indent="0">
+            <a:lvl4pPr marL="1406850" indent="0">
               <a:buNone/>
-              <a:defRPr sz="1304"/>
+              <a:defRPr sz="1026"/>
             </a:lvl4pPr>
-            <a:lvl5pPr marL="2384572" indent="0">
+            <a:lvl5pPr marL="1875800" indent="0">
               <a:buNone/>
-              <a:defRPr sz="1304"/>
+              <a:defRPr sz="1026"/>
             </a:lvl5pPr>
-            <a:lvl6pPr marL="2980715" indent="0">
+            <a:lvl6pPr marL="2344750" indent="0">
               <a:buNone/>
-              <a:defRPr sz="1304"/>
+              <a:defRPr sz="1026"/>
             </a:lvl6pPr>
-            <a:lvl7pPr marL="3576858" indent="0">
+            <a:lvl7pPr marL="2813700" indent="0">
               <a:buNone/>
-              <a:defRPr sz="1304"/>
+              <a:defRPr sz="1026"/>
             </a:lvl7pPr>
-            <a:lvl8pPr marL="4173002" indent="0">
+            <a:lvl8pPr marL="3282650" indent="0">
               <a:buNone/>
-              <a:defRPr sz="1304"/>
+              <a:defRPr sz="1026"/>
             </a:lvl8pPr>
-            <a:lvl9pPr marL="4769145" indent="0">
+            <a:lvl9pPr marL="3751600" indent="0">
               <a:buNone/>
-              <a:defRPr sz="1304"/>
+              <a:defRPr sz="1026"/>
             </a:lvl9pPr>
           </a:lstStyle>
           <a:p>
@@ -2098,7 +2098,7 @@
           <a:p>
             <a:fld id="{87F3BBB2-E533-43A8-AA78-2DC6FC5FE5A0}" type="datetimeFigureOut">
               <a:rPr lang="en-US" smtClean="0"/>
-              <a:t>12/11/22</a:t>
+              <a:t>12/12/22</a:t>
             </a:fld>
             <a:endParaRPr lang="en-US"/>
           </a:p>
@@ -2149,7 +2149,7 @@
     </p:spTree>
     <p:extLst>
       <p:ext uri="{BB962C8B-B14F-4D97-AF65-F5344CB8AC3E}">
-        <p14:creationId xmlns:p14="http://schemas.microsoft.com/office/powerpoint/2010/main" val="2567607622"/>
+        <p14:creationId xmlns:p14="http://schemas.microsoft.com/office/powerpoint/2010/main" val="798630674"/>
       </p:ext>
     </p:extLst>
   </p:cSld>
@@ -2188,15 +2188,15 @@
         </p:nvSpPr>
         <p:spPr>
           <a:xfrm>
-            <a:off x="1099926" y="596159"/>
-            <a:ext cx="5150309" cy="2086557"/>
+            <a:off x="1099926" y="468948"/>
+            <a:ext cx="5150309" cy="1641316"/>
           </a:xfrm>
         </p:spPr>
         <p:txBody>
           <a:bodyPr anchor="b"/>
           <a:lstStyle>
             <a:lvl1pPr>
-              <a:defRPr sz="4172"/>
+              <a:defRPr sz="3282"/>
             </a:lvl1pPr>
           </a:lstStyle>
           <a:p>
@@ -2220,8 +2220,8 @@
         </p:nvSpPr>
         <p:spPr>
           <a:xfrm>
-            <a:off x="6788762" y="1287539"/>
-            <a:ext cx="8084136" cy="6354891"/>
+            <a:off x="6788762" y="1012797"/>
+            <a:ext cx="8084136" cy="4998850"/>
           </a:xfrm>
         </p:spPr>
         <p:txBody>
@@ -2229,39 +2229,39 @@
           <a:lstStyle>
             <a:lvl1pPr marL="0" indent="0">
               <a:buNone/>
-              <a:defRPr sz="4172"/>
+              <a:defRPr sz="3282"/>
             </a:lvl1pPr>
-            <a:lvl2pPr marL="596143" indent="0">
+            <a:lvl2pPr marL="468950" indent="0">
               <a:buNone/>
-              <a:defRPr sz="3651"/>
+              <a:defRPr sz="2872"/>
             </a:lvl2pPr>
-            <a:lvl3pPr marL="1192286" indent="0">
+            <a:lvl3pPr marL="937900" indent="0">
               <a:buNone/>
-              <a:defRPr sz="3129"/>
+              <a:defRPr sz="2462"/>
             </a:lvl3pPr>
-            <a:lvl4pPr marL="1788429" indent="0">
+            <a:lvl4pPr marL="1406850" indent="0">
               <a:buNone/>
-              <a:defRPr sz="2608"/>
+              <a:defRPr sz="2051"/>
             </a:lvl4pPr>
-            <a:lvl5pPr marL="2384572" indent="0">
+            <a:lvl5pPr marL="1875800" indent="0">
               <a:buNone/>
-              <a:defRPr sz="2608"/>
+              <a:defRPr sz="2051"/>
             </a:lvl5pPr>
-            <a:lvl6pPr marL="2980715" indent="0">
+            <a:lvl6pPr marL="2344750" indent="0">
               <a:buNone/>
-              <a:defRPr sz="2608"/>
+              <a:defRPr sz="2051"/>
             </a:lvl6pPr>
-            <a:lvl7pPr marL="3576858" indent="0">
+            <a:lvl7pPr marL="2813700" indent="0">
               <a:buNone/>
-              <a:defRPr sz="2608"/>
+              <a:defRPr sz="2051"/>
             </a:lvl7pPr>
-            <a:lvl8pPr marL="4173002" indent="0">
+            <a:lvl8pPr marL="3282650" indent="0">
               <a:buNone/>
-              <a:defRPr sz="2608"/>
+              <a:defRPr sz="2051"/>
             </a:lvl8pPr>
-            <a:lvl9pPr marL="4769145" indent="0">
+            <a:lvl9pPr marL="3751600" indent="0">
               <a:buNone/>
-              <a:defRPr sz="2608"/>
+              <a:defRPr sz="2051"/>
             </a:lvl9pPr>
           </a:lstStyle>
           <a:p>
@@ -2285,8 +2285,8 @@
         </p:nvSpPr>
         <p:spPr>
           <a:xfrm>
-            <a:off x="1099926" y="2682716"/>
-            <a:ext cx="5150309" cy="4970064"/>
+            <a:off x="1099926" y="2110264"/>
+            <a:ext cx="5150309" cy="3909525"/>
           </a:xfrm>
         </p:spPr>
         <p:txBody>
@@ -2294,39 +2294,39 @@
           <a:lstStyle>
             <a:lvl1pPr marL="0" indent="0">
               <a:buNone/>
-              <a:defRPr sz="2086"/>
+              <a:defRPr sz="1641"/>
             </a:lvl1pPr>
-            <a:lvl2pPr marL="596143" indent="0">
+            <a:lvl2pPr marL="468950" indent="0">
               <a:buNone/>
-              <a:defRPr sz="1825"/>
+              <a:defRPr sz="1436"/>
             </a:lvl2pPr>
-            <a:lvl3pPr marL="1192286" indent="0">
+            <a:lvl3pPr marL="937900" indent="0">
               <a:buNone/>
-              <a:defRPr sz="1565"/>
+              <a:defRPr sz="1231"/>
             </a:lvl3pPr>
-            <a:lvl4pPr marL="1788429" indent="0">
+            <a:lvl4pPr marL="1406850" indent="0">
               <a:buNone/>
-              <a:defRPr sz="1304"/>
+              <a:defRPr sz="1026"/>
             </a:lvl4pPr>
-            <a:lvl5pPr marL="2384572" indent="0">
+            <a:lvl5pPr marL="1875800" indent="0">
               <a:buNone/>
-              <a:defRPr sz="1304"/>
+              <a:defRPr sz="1026"/>
             </a:lvl5pPr>
-            <a:lvl6pPr marL="2980715" indent="0">
+            <a:lvl6pPr marL="2344750" indent="0">
               <a:buNone/>
-              <a:defRPr sz="1304"/>
+              <a:defRPr sz="1026"/>
             </a:lvl6pPr>
-            <a:lvl7pPr marL="3576858" indent="0">
+            <a:lvl7pPr marL="2813700" indent="0">
               <a:buNone/>
-              <a:defRPr sz="1304"/>
+              <a:defRPr sz="1026"/>
             </a:lvl7pPr>
-            <a:lvl8pPr marL="4173002" indent="0">
+            <a:lvl8pPr marL="3282650" indent="0">
               <a:buNone/>
-              <a:defRPr sz="1304"/>
+              <a:defRPr sz="1026"/>
             </a:lvl8pPr>
-            <a:lvl9pPr marL="4769145" indent="0">
+            <a:lvl9pPr marL="3751600" indent="0">
               <a:buNone/>
-              <a:defRPr sz="1304"/>
+              <a:defRPr sz="1026"/>
             </a:lvl9pPr>
           </a:lstStyle>
           <a:p>
@@ -2355,7 +2355,7 @@
           <a:p>
             <a:fld id="{87F3BBB2-E533-43A8-AA78-2DC6FC5FE5A0}" type="datetimeFigureOut">
               <a:rPr lang="en-US" smtClean="0"/>
-              <a:t>12/11/22</a:t>
+              <a:t>12/12/22</a:t>
             </a:fld>
             <a:endParaRPr lang="en-US"/>
           </a:p>
@@ -2406,7 +2406,7 @@
     </p:spTree>
     <p:extLst>
       <p:ext uri="{BB962C8B-B14F-4D97-AF65-F5344CB8AC3E}">
-        <p14:creationId xmlns:p14="http://schemas.microsoft.com/office/powerpoint/2010/main" val="63912615"/>
+        <p14:creationId xmlns:p14="http://schemas.microsoft.com/office/powerpoint/2010/main" val="4257546580"/>
       </p:ext>
     </p:extLst>
   </p:cSld>
@@ -2450,8 +2450,8 @@
         </p:nvSpPr>
         <p:spPr>
           <a:xfrm>
-            <a:off x="1097846" y="476100"/>
-            <a:ext cx="13772972" cy="1728448"/>
+            <a:off x="1097846" y="374507"/>
+            <a:ext cx="13772972" cy="1359623"/>
           </a:xfrm>
           <a:prstGeom prst="rect">
             <a:avLst/>
@@ -2483,8 +2483,8 @@
         </p:nvSpPr>
         <p:spPr>
           <a:xfrm>
-            <a:off x="1097846" y="2380497"/>
-            <a:ext cx="13772972" cy="5673863"/>
+            <a:off x="1097846" y="1872533"/>
+            <a:ext cx="13772972" cy="4463144"/>
           </a:xfrm>
           <a:prstGeom prst="rect">
             <a:avLst/>
@@ -2545,8 +2545,8 @@
         </p:nvSpPr>
         <p:spPr>
           <a:xfrm>
-            <a:off x="1097846" y="8288270"/>
-            <a:ext cx="3592949" cy="476099"/>
+            <a:off x="1097846" y="6519674"/>
+            <a:ext cx="3592949" cy="374507"/>
           </a:xfrm>
           <a:prstGeom prst="rect">
             <a:avLst/>
@@ -2556,7 +2556,7 @@
           <a:bodyPr vert="horz" lIns="91440" tIns="45720" rIns="91440" bIns="45720" rtlCol="0" anchor="ctr"/>
           <a:lstStyle>
             <a:lvl1pPr algn="l">
-              <a:defRPr sz="1565">
+              <a:defRPr sz="1231">
                 <a:solidFill>
                   <a:schemeClr val="tx1">
                     <a:tint val="75000"/>
@@ -2568,7 +2568,7 @@
           <a:p>
             <a:fld id="{87F3BBB2-E533-43A8-AA78-2DC6FC5FE5A0}" type="datetimeFigureOut">
               <a:rPr lang="en-US" smtClean="0"/>
-              <a:t>12/11/22</a:t>
+              <a:t>12/12/22</a:t>
             </a:fld>
             <a:endParaRPr lang="en-US"/>
           </a:p>
@@ -2586,8 +2586,8 @@
         </p:nvSpPr>
         <p:spPr>
           <a:xfrm>
-            <a:off x="5289620" y="8288270"/>
-            <a:ext cx="5389424" cy="476099"/>
+            <a:off x="5289620" y="6519674"/>
+            <a:ext cx="5389424" cy="374507"/>
           </a:xfrm>
           <a:prstGeom prst="rect">
             <a:avLst/>
@@ -2597,7 +2597,7 @@
           <a:bodyPr vert="horz" lIns="91440" tIns="45720" rIns="91440" bIns="45720" rtlCol="0" anchor="ctr"/>
           <a:lstStyle>
             <a:lvl1pPr algn="ctr">
-              <a:defRPr sz="1565">
+              <a:defRPr sz="1231">
                 <a:solidFill>
                   <a:schemeClr val="tx1">
                     <a:tint val="75000"/>
@@ -2623,8 +2623,8 @@
         </p:nvSpPr>
         <p:spPr>
           <a:xfrm>
-            <a:off x="11277868" y="8288270"/>
-            <a:ext cx="3592949" cy="476099"/>
+            <a:off x="11277868" y="6519674"/>
+            <a:ext cx="3592949" cy="374507"/>
           </a:xfrm>
           <a:prstGeom prst="rect">
             <a:avLst/>
@@ -2634,7 +2634,7 @@
           <a:bodyPr vert="horz" lIns="91440" tIns="45720" rIns="91440" bIns="45720" rtlCol="0" anchor="ctr"/>
           <a:lstStyle>
             <a:lvl1pPr algn="r">
-              <a:defRPr sz="1565">
+              <a:defRPr sz="1231">
                 <a:solidFill>
                   <a:schemeClr val="tx1">
                     <a:tint val="75000"/>
@@ -2655,27 +2655,27 @@
     </p:spTree>
     <p:extLst>
       <p:ext uri="{BB962C8B-B14F-4D97-AF65-F5344CB8AC3E}">
-        <p14:creationId xmlns:p14="http://schemas.microsoft.com/office/powerpoint/2010/main" val="837744823"/>
+        <p14:creationId xmlns:p14="http://schemas.microsoft.com/office/powerpoint/2010/main" val="2188914295"/>
       </p:ext>
     </p:extLst>
   </p:cSld>
   <p:clrMap bg1="lt1" tx1="dk1" bg2="lt2" tx2="dk2" accent1="accent1" accent2="accent2" accent3="accent3" accent4="accent4" accent5="accent5" accent6="accent6" hlink="hlink" folHlink="folHlink"/>
   <p:sldLayoutIdLst>
-    <p:sldLayoutId id="2147483721" r:id="rId1"/>
-    <p:sldLayoutId id="2147483722" r:id="rId2"/>
-    <p:sldLayoutId id="2147483723" r:id="rId3"/>
-    <p:sldLayoutId id="2147483724" r:id="rId4"/>
-    <p:sldLayoutId id="2147483725" r:id="rId5"/>
-    <p:sldLayoutId id="2147483726" r:id="rId6"/>
-    <p:sldLayoutId id="2147483727" r:id="rId7"/>
-    <p:sldLayoutId id="2147483728" r:id="rId8"/>
-    <p:sldLayoutId id="2147483729" r:id="rId9"/>
-    <p:sldLayoutId id="2147483730" r:id="rId10"/>
-    <p:sldLayoutId id="2147483731" r:id="rId11"/>
+    <p:sldLayoutId id="2147483757" r:id="rId1"/>
+    <p:sldLayoutId id="2147483758" r:id="rId2"/>
+    <p:sldLayoutId id="2147483759" r:id="rId3"/>
+    <p:sldLayoutId id="2147483760" r:id="rId4"/>
+    <p:sldLayoutId id="2147483761" r:id="rId5"/>
+    <p:sldLayoutId id="2147483762" r:id="rId6"/>
+    <p:sldLayoutId id="2147483763" r:id="rId7"/>
+    <p:sldLayoutId id="2147483764" r:id="rId8"/>
+    <p:sldLayoutId id="2147483765" r:id="rId9"/>
+    <p:sldLayoutId id="2147483766" r:id="rId10"/>
+    <p:sldLayoutId id="2147483767" r:id="rId11"/>
   </p:sldLayoutIdLst>
   <p:txStyles>
     <p:titleStyle>
-      <a:lvl1pPr algn="l" defTabSz="1192286" rtl="0" eaLnBrk="1" latinLnBrk="0" hangingPunct="1">
+      <a:lvl1pPr algn="l" defTabSz="937900" rtl="0" eaLnBrk="1" latinLnBrk="0" hangingPunct="1">
         <a:lnSpc>
           <a:spcPct val="90000"/>
         </a:lnSpc>
@@ -2683,7 +2683,7 @@
           <a:spcPct val="0"/>
         </a:spcBef>
         <a:buNone/>
-        <a:defRPr sz="5737" kern="1200">
+        <a:defRPr sz="4513" kern="1200">
           <a:solidFill>
             <a:schemeClr val="tx1"/>
           </a:solidFill>
@@ -2694,16 +2694,16 @@
       </a:lvl1pPr>
     </p:titleStyle>
     <p:bodyStyle>
-      <a:lvl1pPr marL="298072" indent="-298072" algn="l" defTabSz="1192286" rtl="0" eaLnBrk="1" latinLnBrk="0" hangingPunct="1">
+      <a:lvl1pPr marL="234475" indent="-234475" algn="l" defTabSz="937900" rtl="0" eaLnBrk="1" latinLnBrk="0" hangingPunct="1">
         <a:lnSpc>
           <a:spcPct val="90000"/>
         </a:lnSpc>
         <a:spcBef>
-          <a:spcPts val="1304"/>
+          <a:spcPts val="1026"/>
         </a:spcBef>
         <a:buFont typeface="Arial" panose="020B0604020202020204" pitchFamily="34" charset="0"/>
         <a:buChar char="•"/>
-        <a:defRPr sz="3651" kern="1200">
+        <a:defRPr sz="2872" kern="1200">
           <a:solidFill>
             <a:schemeClr val="tx1"/>
           </a:solidFill>
@@ -2712,16 +2712,16 @@
           <a:cs typeface="+mn-cs"/>
         </a:defRPr>
       </a:lvl1pPr>
-      <a:lvl2pPr marL="894215" indent="-298072" algn="l" defTabSz="1192286" rtl="0" eaLnBrk="1" latinLnBrk="0" hangingPunct="1">
+      <a:lvl2pPr marL="703425" indent="-234475" algn="l" defTabSz="937900" rtl="0" eaLnBrk="1" latinLnBrk="0" hangingPunct="1">
         <a:lnSpc>
           <a:spcPct val="90000"/>
         </a:lnSpc>
         <a:spcBef>
-          <a:spcPts val="652"/>
+          <a:spcPts val="513"/>
         </a:spcBef>
         <a:buFont typeface="Arial" panose="020B0604020202020204" pitchFamily="34" charset="0"/>
         <a:buChar char="•"/>
-        <a:defRPr sz="3129" kern="1200">
+        <a:defRPr sz="2462" kern="1200">
           <a:solidFill>
             <a:schemeClr val="tx1"/>
           </a:solidFill>
@@ -2730,16 +2730,16 @@
           <a:cs typeface="+mn-cs"/>
         </a:defRPr>
       </a:lvl2pPr>
-      <a:lvl3pPr marL="1490358" indent="-298072" algn="l" defTabSz="1192286" rtl="0" eaLnBrk="1" latinLnBrk="0" hangingPunct="1">
+      <a:lvl3pPr marL="1172375" indent="-234475" algn="l" defTabSz="937900" rtl="0" eaLnBrk="1" latinLnBrk="0" hangingPunct="1">
         <a:lnSpc>
           <a:spcPct val="90000"/>
         </a:lnSpc>
         <a:spcBef>
-          <a:spcPts val="652"/>
+          <a:spcPts val="513"/>
         </a:spcBef>
         <a:buFont typeface="Arial" panose="020B0604020202020204" pitchFamily="34" charset="0"/>
         <a:buChar char="•"/>
-        <a:defRPr sz="2608" kern="1200">
+        <a:defRPr sz="2051" kern="1200">
           <a:solidFill>
             <a:schemeClr val="tx1"/>
           </a:solidFill>
@@ -2748,16 +2748,16 @@
           <a:cs typeface="+mn-cs"/>
         </a:defRPr>
       </a:lvl3pPr>
-      <a:lvl4pPr marL="2086501" indent="-298072" algn="l" defTabSz="1192286" rtl="0" eaLnBrk="1" latinLnBrk="0" hangingPunct="1">
+      <a:lvl4pPr marL="1641325" indent="-234475" algn="l" defTabSz="937900" rtl="0" eaLnBrk="1" latinLnBrk="0" hangingPunct="1">
         <a:lnSpc>
           <a:spcPct val="90000"/>
         </a:lnSpc>
         <a:spcBef>
-          <a:spcPts val="652"/>
+          <a:spcPts val="513"/>
         </a:spcBef>
         <a:buFont typeface="Arial" panose="020B0604020202020204" pitchFamily="34" charset="0"/>
         <a:buChar char="•"/>
-        <a:defRPr sz="2347" kern="1200">
+        <a:defRPr sz="1846" kern="1200">
           <a:solidFill>
             <a:schemeClr val="tx1"/>
           </a:solidFill>
@@ -2766,16 +2766,16 @@
           <a:cs typeface="+mn-cs"/>
         </a:defRPr>
       </a:lvl4pPr>
-      <a:lvl5pPr marL="2682644" indent="-298072" algn="l" defTabSz="1192286" rtl="0" eaLnBrk="1" latinLnBrk="0" hangingPunct="1">
+      <a:lvl5pPr marL="2110275" indent="-234475" algn="l" defTabSz="937900" rtl="0" eaLnBrk="1" latinLnBrk="0" hangingPunct="1">
         <a:lnSpc>
           <a:spcPct val="90000"/>
         </a:lnSpc>
         <a:spcBef>
-          <a:spcPts val="652"/>
+          <a:spcPts val="513"/>
         </a:spcBef>
         <a:buFont typeface="Arial" panose="020B0604020202020204" pitchFamily="34" charset="0"/>
         <a:buChar char="•"/>
-        <a:defRPr sz="2347" kern="1200">
+        <a:defRPr sz="1846" kern="1200">
           <a:solidFill>
             <a:schemeClr val="tx1"/>
           </a:solidFill>
@@ -2784,16 +2784,16 @@
           <a:cs typeface="+mn-cs"/>
         </a:defRPr>
       </a:lvl5pPr>
-      <a:lvl6pPr marL="3278787" indent="-298072" algn="l" defTabSz="1192286" rtl="0" eaLnBrk="1" latinLnBrk="0" hangingPunct="1">
+      <a:lvl6pPr marL="2579225" indent="-234475" algn="l" defTabSz="937900" rtl="0" eaLnBrk="1" latinLnBrk="0" hangingPunct="1">
         <a:lnSpc>
           <a:spcPct val="90000"/>
         </a:lnSpc>
         <a:spcBef>
-          <a:spcPts val="652"/>
+          <a:spcPts val="513"/>
         </a:spcBef>
         <a:buFont typeface="Arial" panose="020B0604020202020204" pitchFamily="34" charset="0"/>
         <a:buChar char="•"/>
-        <a:defRPr sz="2347" kern="1200">
+        <a:defRPr sz="1846" kern="1200">
           <a:solidFill>
             <a:schemeClr val="tx1"/>
           </a:solidFill>
@@ -2802,16 +2802,16 @@
           <a:cs typeface="+mn-cs"/>
         </a:defRPr>
       </a:lvl6pPr>
-      <a:lvl7pPr marL="3874930" indent="-298072" algn="l" defTabSz="1192286" rtl="0" eaLnBrk="1" latinLnBrk="0" hangingPunct="1">
+      <a:lvl7pPr marL="3048175" indent="-234475" algn="l" defTabSz="937900" rtl="0" eaLnBrk="1" latinLnBrk="0" hangingPunct="1">
         <a:lnSpc>
           <a:spcPct val="90000"/>
         </a:lnSpc>
         <a:spcBef>
-          <a:spcPts val="652"/>
+          <a:spcPts val="513"/>
         </a:spcBef>
         <a:buFont typeface="Arial" panose="020B0604020202020204" pitchFamily="34" charset="0"/>
         <a:buChar char="•"/>
-        <a:defRPr sz="2347" kern="1200">
+        <a:defRPr sz="1846" kern="1200">
           <a:solidFill>
             <a:schemeClr val="tx1"/>
           </a:solidFill>
@@ -2820,16 +2820,16 @@
           <a:cs typeface="+mn-cs"/>
         </a:defRPr>
       </a:lvl7pPr>
-      <a:lvl8pPr marL="4471073" indent="-298072" algn="l" defTabSz="1192286" rtl="0" eaLnBrk="1" latinLnBrk="0" hangingPunct="1">
+      <a:lvl8pPr marL="3517125" indent="-234475" algn="l" defTabSz="937900" rtl="0" eaLnBrk="1" latinLnBrk="0" hangingPunct="1">
         <a:lnSpc>
           <a:spcPct val="90000"/>
         </a:lnSpc>
         <a:spcBef>
-          <a:spcPts val="652"/>
+          <a:spcPts val="513"/>
         </a:spcBef>
         <a:buFont typeface="Arial" panose="020B0604020202020204" pitchFamily="34" charset="0"/>
         <a:buChar char="•"/>
-        <a:defRPr sz="2347" kern="1200">
+        <a:defRPr sz="1846" kern="1200">
           <a:solidFill>
             <a:schemeClr val="tx1"/>
           </a:solidFill>
@@ -2838,16 +2838,16 @@
           <a:cs typeface="+mn-cs"/>
         </a:defRPr>
       </a:lvl8pPr>
-      <a:lvl9pPr marL="5067216" indent="-298072" algn="l" defTabSz="1192286" rtl="0" eaLnBrk="1" latinLnBrk="0" hangingPunct="1">
+      <a:lvl9pPr marL="3986075" indent="-234475" algn="l" defTabSz="937900" rtl="0" eaLnBrk="1" latinLnBrk="0" hangingPunct="1">
         <a:lnSpc>
           <a:spcPct val="90000"/>
         </a:lnSpc>
         <a:spcBef>
-          <a:spcPts val="652"/>
+          <a:spcPts val="513"/>
         </a:spcBef>
         <a:buFont typeface="Arial" panose="020B0604020202020204" pitchFamily="34" charset="0"/>
         <a:buChar char="•"/>
-        <a:defRPr sz="2347" kern="1200">
+        <a:defRPr sz="1846" kern="1200">
           <a:solidFill>
             <a:schemeClr val="tx1"/>
           </a:solidFill>
@@ -2861,8 +2861,8 @@
       <a:defPPr>
         <a:defRPr lang="en-US"/>
       </a:defPPr>
-      <a:lvl1pPr marL="0" algn="l" defTabSz="1192286" rtl="0" eaLnBrk="1" latinLnBrk="0" hangingPunct="1">
-        <a:defRPr sz="2347" kern="1200">
+      <a:lvl1pPr marL="0" algn="l" defTabSz="937900" rtl="0" eaLnBrk="1" latinLnBrk="0" hangingPunct="1">
+        <a:defRPr sz="1846" kern="1200">
           <a:solidFill>
             <a:schemeClr val="tx1"/>
           </a:solidFill>
@@ -2871,8 +2871,8 @@
           <a:cs typeface="+mn-cs"/>
         </a:defRPr>
       </a:lvl1pPr>
-      <a:lvl2pPr marL="596143" algn="l" defTabSz="1192286" rtl="0" eaLnBrk="1" latinLnBrk="0" hangingPunct="1">
-        <a:defRPr sz="2347" kern="1200">
+      <a:lvl2pPr marL="468950" algn="l" defTabSz="937900" rtl="0" eaLnBrk="1" latinLnBrk="0" hangingPunct="1">
+        <a:defRPr sz="1846" kern="1200">
           <a:solidFill>
             <a:schemeClr val="tx1"/>
           </a:solidFill>
@@ -2881,8 +2881,8 @@
           <a:cs typeface="+mn-cs"/>
         </a:defRPr>
       </a:lvl2pPr>
-      <a:lvl3pPr marL="1192286" algn="l" defTabSz="1192286" rtl="0" eaLnBrk="1" latinLnBrk="0" hangingPunct="1">
-        <a:defRPr sz="2347" kern="1200">
+      <a:lvl3pPr marL="937900" algn="l" defTabSz="937900" rtl="0" eaLnBrk="1" latinLnBrk="0" hangingPunct="1">
+        <a:defRPr sz="1846" kern="1200">
           <a:solidFill>
             <a:schemeClr val="tx1"/>
           </a:solidFill>
@@ -2891,8 +2891,8 @@
           <a:cs typeface="+mn-cs"/>
         </a:defRPr>
       </a:lvl3pPr>
-      <a:lvl4pPr marL="1788429" algn="l" defTabSz="1192286" rtl="0" eaLnBrk="1" latinLnBrk="0" hangingPunct="1">
-        <a:defRPr sz="2347" kern="1200">
+      <a:lvl4pPr marL="1406850" algn="l" defTabSz="937900" rtl="0" eaLnBrk="1" latinLnBrk="0" hangingPunct="1">
+        <a:defRPr sz="1846" kern="1200">
           <a:solidFill>
             <a:schemeClr val="tx1"/>
           </a:solidFill>
@@ -2901,8 +2901,8 @@
           <a:cs typeface="+mn-cs"/>
         </a:defRPr>
       </a:lvl4pPr>
-      <a:lvl5pPr marL="2384572" algn="l" defTabSz="1192286" rtl="0" eaLnBrk="1" latinLnBrk="0" hangingPunct="1">
-        <a:defRPr sz="2347" kern="1200">
+      <a:lvl5pPr marL="1875800" algn="l" defTabSz="937900" rtl="0" eaLnBrk="1" latinLnBrk="0" hangingPunct="1">
+        <a:defRPr sz="1846" kern="1200">
           <a:solidFill>
             <a:schemeClr val="tx1"/>
           </a:solidFill>
@@ -2911,8 +2911,8 @@
           <a:cs typeface="+mn-cs"/>
         </a:defRPr>
       </a:lvl5pPr>
-      <a:lvl6pPr marL="2980715" algn="l" defTabSz="1192286" rtl="0" eaLnBrk="1" latinLnBrk="0" hangingPunct="1">
-        <a:defRPr sz="2347" kern="1200">
+      <a:lvl6pPr marL="2344750" algn="l" defTabSz="937900" rtl="0" eaLnBrk="1" latinLnBrk="0" hangingPunct="1">
+        <a:defRPr sz="1846" kern="1200">
           <a:solidFill>
             <a:schemeClr val="tx1"/>
           </a:solidFill>
@@ -2921,8 +2921,8 @@
           <a:cs typeface="+mn-cs"/>
         </a:defRPr>
       </a:lvl6pPr>
-      <a:lvl7pPr marL="3576858" algn="l" defTabSz="1192286" rtl="0" eaLnBrk="1" latinLnBrk="0" hangingPunct="1">
-        <a:defRPr sz="2347" kern="1200">
+      <a:lvl7pPr marL="2813700" algn="l" defTabSz="937900" rtl="0" eaLnBrk="1" latinLnBrk="0" hangingPunct="1">
+        <a:defRPr sz="1846" kern="1200">
           <a:solidFill>
             <a:schemeClr val="tx1"/>
           </a:solidFill>
@@ -2931,8 +2931,8 @@
           <a:cs typeface="+mn-cs"/>
         </a:defRPr>
       </a:lvl7pPr>
-      <a:lvl8pPr marL="4173002" algn="l" defTabSz="1192286" rtl="0" eaLnBrk="1" latinLnBrk="0" hangingPunct="1">
-        <a:defRPr sz="2347" kern="1200">
+      <a:lvl8pPr marL="3282650" algn="l" defTabSz="937900" rtl="0" eaLnBrk="1" latinLnBrk="0" hangingPunct="1">
+        <a:defRPr sz="1846" kern="1200">
           <a:solidFill>
             <a:schemeClr val="tx1"/>
           </a:solidFill>
@@ -2941,8 +2941,8 @@
           <a:cs typeface="+mn-cs"/>
         </a:defRPr>
       </a:lvl8pPr>
-      <a:lvl9pPr marL="4769145" algn="l" defTabSz="1192286" rtl="0" eaLnBrk="1" latinLnBrk="0" hangingPunct="1">
-        <a:defRPr sz="2347" kern="1200">
+      <a:lvl9pPr marL="3751600" algn="l" defTabSz="937900" rtl="0" eaLnBrk="1" latinLnBrk="0" hangingPunct="1">
+        <a:defRPr sz="1846" kern="1200">
           <a:solidFill>
             <a:schemeClr val="tx1"/>
           </a:solidFill>
@@ -2987,7 +2987,7 @@
         </p:nvSpPr>
         <p:spPr>
           <a:xfrm>
-            <a:off x="4342834" y="5662933"/>
+            <a:off x="4233357" y="3520950"/>
             <a:ext cx="8229600" cy="928444"/>
           </a:xfrm>
           <a:prstGeom prst="rect">
@@ -3075,7 +3075,7 @@
         </p:nvSpPr>
         <p:spPr>
           <a:xfrm>
-            <a:off x="2643178" y="3712242"/>
+            <a:off x="2533701" y="1570259"/>
             <a:ext cx="10565894" cy="3135942"/>
           </a:xfrm>
           <a:prstGeom prst="rect">
@@ -3139,8 +3139,8 @@
         </p:nvSpPr>
         <p:spPr>
           <a:xfrm>
-            <a:off x="1195956" y="539274"/>
-            <a:ext cx="13914081" cy="8046720"/>
+            <a:off x="1086482" y="590202"/>
+            <a:ext cx="13984123" cy="5853811"/>
           </a:xfrm>
           <a:prstGeom prst="rect">
             <a:avLst/>
@@ -3215,7 +3215,7 @@
         </p:blipFill>
         <p:spPr>
           <a:xfrm>
-            <a:off x="1195950" y="539274"/>
+            <a:off x="1086479" y="590199"/>
             <a:ext cx="381000" cy="381000"/>
           </a:xfrm>
           <a:prstGeom prst="rect">
@@ -3251,7 +3251,7 @@
         </p:blipFill>
         <p:spPr>
           <a:xfrm>
-            <a:off x="2643177" y="3712242"/>
+            <a:off x="2533700" y="1570259"/>
             <a:ext cx="381000" cy="381000"/>
           </a:xfrm>
           <a:prstGeom prst="rect">
@@ -3273,7 +3273,7 @@
         </p:nvSpPr>
         <p:spPr>
           <a:xfrm>
-            <a:off x="3897429" y="3346487"/>
+            <a:off x="3787952" y="1204507"/>
             <a:ext cx="2468880" cy="3561663"/>
           </a:xfrm>
           <a:prstGeom prst="rect">
@@ -3337,7 +3337,7 @@
         </p:nvSpPr>
         <p:spPr>
           <a:xfrm>
-            <a:off x="4068514" y="5297172"/>
+            <a:off x="3959037" y="3155189"/>
             <a:ext cx="2103120" cy="1396108"/>
           </a:xfrm>
           <a:prstGeom prst="rect">
@@ -3394,7 +3394,7 @@
         </p:nvSpPr>
         <p:spPr>
           <a:xfrm>
-            <a:off x="4080309" y="3895122"/>
+            <a:off x="3970832" y="1753139"/>
             <a:ext cx="2103120" cy="1280160"/>
           </a:xfrm>
           <a:prstGeom prst="rect">
@@ -3465,7 +3465,7 @@
         </p:blipFill>
         <p:spPr>
           <a:xfrm>
-            <a:off x="4080309" y="3895122"/>
+            <a:off x="3970832" y="1753139"/>
             <a:ext cx="274320" cy="274320"/>
           </a:xfrm>
           <a:prstGeom prst="rect">
@@ -3501,7 +3501,7 @@
         </p:blipFill>
         <p:spPr>
           <a:xfrm>
-            <a:off x="4068514" y="5297172"/>
+            <a:off x="3959037" y="3155189"/>
             <a:ext cx="274320" cy="274320"/>
           </a:xfrm>
           <a:prstGeom prst="rect">
@@ -3525,7 +3525,7 @@
         </p:nvSpPr>
         <p:spPr bwMode="auto">
           <a:xfrm>
-            <a:off x="4583599" y="4720922"/>
+            <a:off x="4474122" y="2578939"/>
             <a:ext cx="1097280" cy="261610"/>
           </a:xfrm>
           <a:prstGeom prst="rect">
@@ -3699,7 +3699,7 @@
         </p:blipFill>
         <p:spPr bwMode="auto">
           <a:xfrm>
-            <a:off x="4903269" y="4260882"/>
+            <a:off x="4793792" y="2118899"/>
             <a:ext cx="457200" cy="457200"/>
           </a:xfrm>
           <a:prstGeom prst="rect">
@@ -3758,7 +3758,7 @@
         </p:blipFill>
         <p:spPr>
           <a:xfrm>
-            <a:off x="6903154" y="5662932"/>
+            <a:off x="6793677" y="3520949"/>
             <a:ext cx="381000" cy="381000"/>
           </a:xfrm>
           <a:prstGeom prst="rect">
@@ -3780,7 +3780,7 @@
         </p:nvSpPr>
         <p:spPr>
           <a:xfrm>
-            <a:off x="7829349" y="3346487"/>
+            <a:off x="7719872" y="1204507"/>
             <a:ext cx="2468880" cy="3561663"/>
           </a:xfrm>
           <a:prstGeom prst="rect">
@@ -3844,7 +3844,7 @@
         </p:nvSpPr>
         <p:spPr>
           <a:xfrm>
-            <a:off x="8012229" y="3895122"/>
+            <a:off x="7902752" y="1753139"/>
             <a:ext cx="2103120" cy="1280160"/>
           </a:xfrm>
           <a:prstGeom prst="rect">
@@ -3915,7 +3915,7 @@
         </p:blipFill>
         <p:spPr>
           <a:xfrm>
-            <a:off x="8012229" y="3895122"/>
+            <a:off x="7902752" y="1753139"/>
             <a:ext cx="274320" cy="274320"/>
           </a:xfrm>
           <a:prstGeom prst="rect">
@@ -3939,7 +3939,7 @@
         </p:nvSpPr>
         <p:spPr bwMode="auto">
           <a:xfrm>
-            <a:off x="8516455" y="4719987"/>
+            <a:off x="8406978" y="2578004"/>
             <a:ext cx="1097280" cy="261610"/>
           </a:xfrm>
           <a:prstGeom prst="rect">
@@ -4113,7 +4113,7 @@
         </p:blipFill>
         <p:spPr bwMode="auto">
           <a:xfrm>
-            <a:off x="8835189" y="4260882"/>
+            <a:off x="8725712" y="2118899"/>
             <a:ext cx="457200" cy="457200"/>
           </a:xfrm>
           <a:prstGeom prst="rect">
@@ -4158,7 +4158,7 @@
         </p:nvSpPr>
         <p:spPr>
           <a:xfrm>
-            <a:off x="10572549" y="3346487"/>
+            <a:off x="10463072" y="1204507"/>
             <a:ext cx="2468880" cy="3561663"/>
           </a:xfrm>
           <a:prstGeom prst="rect">
@@ -4222,7 +4222,7 @@
         </p:nvSpPr>
         <p:spPr>
           <a:xfrm>
-            <a:off x="10755429" y="3895122"/>
+            <a:off x="10645952" y="1753139"/>
             <a:ext cx="2103120" cy="1266260"/>
           </a:xfrm>
           <a:prstGeom prst="rect">
@@ -4293,7 +4293,7 @@
         </p:blipFill>
         <p:spPr>
           <a:xfrm>
-            <a:off x="10755429" y="3895122"/>
+            <a:off x="10645952" y="1753139"/>
             <a:ext cx="274320" cy="274320"/>
           </a:xfrm>
           <a:prstGeom prst="rect">
@@ -4317,7 +4317,7 @@
         </p:nvSpPr>
         <p:spPr bwMode="auto">
           <a:xfrm>
-            <a:off x="11258686" y="4720922"/>
+            <a:off x="11149209" y="2578939"/>
             <a:ext cx="1097280" cy="261610"/>
           </a:xfrm>
           <a:prstGeom prst="rect">
@@ -4491,7 +4491,7 @@
         </p:blipFill>
         <p:spPr bwMode="auto">
           <a:xfrm>
-            <a:off x="11578389" y="4260882"/>
+            <a:off x="11468912" y="2118899"/>
             <a:ext cx="457200" cy="457200"/>
           </a:xfrm>
           <a:prstGeom prst="rect">
@@ -4551,7 +4551,7 @@
         </p:blipFill>
         <p:spPr bwMode="auto">
           <a:xfrm>
-            <a:off x="13734743" y="5497420"/>
+            <a:off x="13591847" y="4362237"/>
             <a:ext cx="762000" cy="762000"/>
           </a:xfrm>
           <a:prstGeom prst="rect">
@@ -4598,7 +4598,7 @@
         </p:nvSpPr>
         <p:spPr bwMode="auto">
           <a:xfrm>
-            <a:off x="13009283" y="6290323"/>
+            <a:off x="12866387" y="5155143"/>
             <a:ext cx="2292350" cy="276999"/>
           </a:xfrm>
           <a:prstGeom prst="rect">
@@ -4772,7 +4772,7 @@
         </p:blipFill>
         <p:spPr bwMode="auto">
           <a:xfrm>
-            <a:off x="13734743" y="3974797"/>
+            <a:off x="13591847" y="2839614"/>
             <a:ext cx="762000" cy="762000"/>
           </a:xfrm>
           <a:prstGeom prst="rect">
@@ -4819,7 +4819,7 @@
         </p:nvSpPr>
         <p:spPr bwMode="auto">
           <a:xfrm>
-            <a:off x="12991256" y="4768616"/>
+            <a:off x="12848363" y="3633436"/>
             <a:ext cx="2243137" cy="276999"/>
           </a:xfrm>
           <a:prstGeom prst="rect">
@@ -4964,72 +4964,12 @@
           </a:p>
         </p:txBody>
       </p:sp>
-      <p:pic>
-        <p:nvPicPr>
-          <p:cNvPr id="28" name="Graphic 35">
+      <p:sp>
+        <p:nvSpPr>
+          <p:cNvPr id="124" name="TextBox 22">
             <a:extLst>
               <a:ext uri="{FF2B5EF4-FFF2-40B4-BE49-F238E27FC236}">
-                <a16:creationId xmlns:a16="http://schemas.microsoft.com/office/drawing/2014/main" id="{A7EEE92C-510B-8F59-3CE1-B871E893C9C8}"/>
-              </a:ext>
-            </a:extLst>
-          </p:cNvPr>
-          <p:cNvPicPr>
-            <a:picLocks noChangeAspect="1" noChangeArrowheads="1"/>
-          </p:cNvPicPr>
-          <p:nvPr/>
-        </p:nvPicPr>
-        <p:blipFill>
-          <a:blip r:embed="rId15">
-            <a:extLst>
-              <a:ext uri="{28A0092B-C50C-407E-A947-70E740481C1C}">
-                <a14:useLocalDpi xmlns:a14="http://schemas.microsoft.com/office/drawing/2010/main" val="0"/>
-              </a:ext>
-            </a:extLst>
-          </a:blip>
-          <a:srcRect/>
-          <a:stretch>
-            <a:fillRect/>
-          </a:stretch>
-        </p:blipFill>
-        <p:spPr bwMode="auto">
-          <a:xfrm>
-            <a:off x="2414047" y="2007250"/>
-            <a:ext cx="474871" cy="457200"/>
-          </a:xfrm>
-          <a:prstGeom prst="rect">
-            <a:avLst/>
-          </a:prstGeom>
-          <a:noFill/>
-          <a:ln>
-            <a:noFill/>
-          </a:ln>
-          <a:extLst>
-            <a:ext uri="{909E8E84-426E-40DD-AFC4-6F175D3DCCD1}">
-              <a14:hiddenFill xmlns:a14="http://schemas.microsoft.com/office/drawing/2010/main">
-                <a:solidFill>
-                  <a:srgbClr val="FFFFFF"/>
-                </a:solidFill>
-              </a14:hiddenFill>
-            </a:ext>
-            <a:ext uri="{91240B29-F687-4F45-9708-019B960494DF}">
-              <a14:hiddenLine xmlns:a14="http://schemas.microsoft.com/office/drawing/2010/main" w="9525">
-                <a:solidFill>
-                  <a:srgbClr val="000000"/>
-                </a:solidFill>
-                <a:miter lim="800000"/>
-                <a:headEnd/>
-                <a:tailEnd/>
-              </a14:hiddenLine>
-            </a:ext>
-          </a:extLst>
-        </p:spPr>
-      </p:pic>
-      <p:sp>
-        <p:nvSpPr>
-          <p:cNvPr id="29" name="TextBox 17">
-            <a:extLst>
-              <a:ext uri="{FF2B5EF4-FFF2-40B4-BE49-F238E27FC236}">
-                <a16:creationId xmlns:a16="http://schemas.microsoft.com/office/drawing/2014/main" id="{03958754-B992-6318-6756-15824420C634}"/>
+                <a16:creationId xmlns:a16="http://schemas.microsoft.com/office/drawing/2014/main" id="{269BFA4D-9F8D-E8F3-D0F3-27206733DCDA}"/>
               </a:ext>
             </a:extLst>
           </p:cNvPr>
@@ -5040,801 +4980,7 @@
         </p:nvSpPr>
         <p:spPr bwMode="auto">
           <a:xfrm>
-            <a:off x="1942905" y="2501472"/>
-            <a:ext cx="1519589" cy="261610"/>
-          </a:xfrm>
-          <a:prstGeom prst="rect">
-            <a:avLst/>
-          </a:prstGeom>
-          <a:noFill/>
-          <a:ln>
-            <a:noFill/>
-          </a:ln>
-          <a:extLst>
-            <a:ext uri="{909E8E84-426E-40DD-AFC4-6F175D3DCCD1}">
-              <a14:hiddenFill xmlns:a14="http://schemas.microsoft.com/office/drawing/2010/main">
-                <a:solidFill>
-                  <a:srgbClr val="FFFFFF"/>
-                </a:solidFill>
-              </a14:hiddenFill>
-            </a:ext>
-            <a:ext uri="{91240B29-F687-4F45-9708-019B960494DF}">
-              <a14:hiddenLine xmlns:a14="http://schemas.microsoft.com/office/drawing/2010/main" w="9525">
-                <a:solidFill>
-                  <a:srgbClr val="000000"/>
-                </a:solidFill>
-                <a:miter lim="800000"/>
-                <a:headEnd/>
-                <a:tailEnd/>
-              </a14:hiddenLine>
-            </a:ext>
-          </a:extLst>
-        </p:spPr>
-        <p:txBody>
-          <a:bodyPr wrap="square">
-            <a:spAutoFit/>
-          </a:bodyPr>
-          <a:lstStyle>
-            <a:lvl1pPr>
-              <a:defRPr>
-                <a:solidFill>
-                  <a:schemeClr val="tx1"/>
-                </a:solidFill>
-                <a:latin typeface="Calibri" panose="020F0502020204030204" pitchFamily="34" charset="0"/>
-              </a:defRPr>
-            </a:lvl1pPr>
-            <a:lvl2pPr marL="742950" indent="-285750">
-              <a:defRPr>
-                <a:solidFill>
-                  <a:schemeClr val="tx1"/>
-                </a:solidFill>
-                <a:latin typeface="Calibri" panose="020F0502020204030204" pitchFamily="34" charset="0"/>
-              </a:defRPr>
-            </a:lvl2pPr>
-            <a:lvl3pPr marL="1143000" indent="-228600">
-              <a:defRPr>
-                <a:solidFill>
-                  <a:schemeClr val="tx1"/>
-                </a:solidFill>
-                <a:latin typeface="Calibri" panose="020F0502020204030204" pitchFamily="34" charset="0"/>
-              </a:defRPr>
-            </a:lvl3pPr>
-            <a:lvl4pPr marL="1600200" indent="-228600">
-              <a:defRPr>
-                <a:solidFill>
-                  <a:schemeClr val="tx1"/>
-                </a:solidFill>
-                <a:latin typeface="Calibri" panose="020F0502020204030204" pitchFamily="34" charset="0"/>
-              </a:defRPr>
-            </a:lvl4pPr>
-            <a:lvl5pPr marL="2057400" indent="-228600">
-              <a:defRPr>
-                <a:solidFill>
-                  <a:schemeClr val="tx1"/>
-                </a:solidFill>
-                <a:latin typeface="Calibri" panose="020F0502020204030204" pitchFamily="34" charset="0"/>
-              </a:defRPr>
-            </a:lvl5pPr>
-            <a:lvl6pPr marL="2514600" indent="-228600" eaLnBrk="0" fontAlgn="base" hangingPunct="0">
-              <a:spcBef>
-                <a:spcPct val="0"/>
-              </a:spcBef>
-              <a:spcAft>
-                <a:spcPct val="0"/>
-              </a:spcAft>
-              <a:defRPr>
-                <a:solidFill>
-                  <a:schemeClr val="tx1"/>
-                </a:solidFill>
-                <a:latin typeface="Calibri" panose="020F0502020204030204" pitchFamily="34" charset="0"/>
-              </a:defRPr>
-            </a:lvl6pPr>
-            <a:lvl7pPr marL="2971800" indent="-228600" eaLnBrk="0" fontAlgn="base" hangingPunct="0">
-              <a:spcBef>
-                <a:spcPct val="0"/>
-              </a:spcBef>
-              <a:spcAft>
-                <a:spcPct val="0"/>
-              </a:spcAft>
-              <a:defRPr>
-                <a:solidFill>
-                  <a:schemeClr val="tx1"/>
-                </a:solidFill>
-                <a:latin typeface="Calibri" panose="020F0502020204030204" pitchFamily="34" charset="0"/>
-              </a:defRPr>
-            </a:lvl7pPr>
-            <a:lvl8pPr marL="3429000" indent="-228600" eaLnBrk="0" fontAlgn="base" hangingPunct="0">
-              <a:spcBef>
-                <a:spcPct val="0"/>
-              </a:spcBef>
-              <a:spcAft>
-                <a:spcPct val="0"/>
-              </a:spcAft>
-              <a:defRPr>
-                <a:solidFill>
-                  <a:schemeClr val="tx1"/>
-                </a:solidFill>
-                <a:latin typeface="Calibri" panose="020F0502020204030204" pitchFamily="34" charset="0"/>
-              </a:defRPr>
-            </a:lvl8pPr>
-            <a:lvl9pPr marL="3886200" indent="-228600" eaLnBrk="0" fontAlgn="base" hangingPunct="0">
-              <a:spcBef>
-                <a:spcPct val="0"/>
-              </a:spcBef>
-              <a:spcAft>
-                <a:spcPct val="0"/>
-              </a:spcAft>
-              <a:defRPr>
-                <a:solidFill>
-                  <a:schemeClr val="tx1"/>
-                </a:solidFill>
-                <a:latin typeface="Calibri" panose="020F0502020204030204" pitchFamily="34" charset="0"/>
-              </a:defRPr>
-            </a:lvl9pPr>
-          </a:lstStyle>
-          <a:p>
-            <a:pPr algn="ctr" eaLnBrk="1" hangingPunct="1"/>
-            <a:r>
-              <a:rPr lang="en-US" altLang="en-US" sz="1100" dirty="0">
-                <a:latin typeface="Arial" panose="020B0604020202020204" pitchFamily="34" charset="0"/>
-                <a:ea typeface="Amazon Ember" panose="020B0603020204020204" pitchFamily="34" charset="0"/>
-                <a:cs typeface="Arial" panose="020B0604020202020204" pitchFamily="34" charset="0"/>
-              </a:rPr>
-              <a:t>EKS public endpoint</a:t>
-            </a:r>
-          </a:p>
-        </p:txBody>
-      </p:sp>
-      <p:sp>
-        <p:nvSpPr>
-          <p:cNvPr id="36" name="Rectangle 35">
-            <a:extLst>
-              <a:ext uri="{FF2B5EF4-FFF2-40B4-BE49-F238E27FC236}">
-                <a16:creationId xmlns:a16="http://schemas.microsoft.com/office/drawing/2014/main" id="{AE67BD9A-110C-1879-C2A4-FC3DAEC2B655}"/>
-              </a:ext>
-            </a:extLst>
-          </p:cNvPr>
-          <p:cNvSpPr/>
-          <p:nvPr/>
-        </p:nvSpPr>
-        <p:spPr>
-          <a:xfrm>
-            <a:off x="2643182" y="1177210"/>
-            <a:ext cx="10565895" cy="1792018"/>
-          </a:xfrm>
-          <a:prstGeom prst="rect">
-            <a:avLst/>
-          </a:prstGeom>
-          <a:noFill/>
-          <a:ln w="12700">
-            <a:solidFill>
-              <a:srgbClr val="1E8900"/>
-            </a:solidFill>
-          </a:ln>
-        </p:spPr>
-        <p:style>
-          <a:lnRef idx="2">
-            <a:schemeClr val="accent1">
-              <a:shade val="50000"/>
-            </a:schemeClr>
-          </a:lnRef>
-          <a:fillRef idx="1">
-            <a:schemeClr val="accent1"/>
-          </a:fillRef>
-          <a:effectRef idx="0">
-            <a:schemeClr val="accent1"/>
-          </a:effectRef>
-          <a:fontRef idx="minor">
-            <a:schemeClr val="lt1"/>
-          </a:fontRef>
-        </p:style>
-        <p:txBody>
-          <a:bodyPr lIns="502920" tIns="91440"/>
-          <a:lstStyle/>
-          <a:p>
-            <a:pPr>
-              <a:defRPr/>
-            </a:pPr>
-            <a:r>
-              <a:rPr lang="en-US" sz="1200" dirty="0">
-                <a:ln w="0"/>
-                <a:solidFill>
-                  <a:srgbClr val="1E8900"/>
-                </a:solidFill>
-                <a:latin typeface="Arial" panose="020B0604020202020204" pitchFamily="34" charset="0"/>
-                <a:cs typeface="Arial" panose="020B0604020202020204" pitchFamily="34" charset="0"/>
-              </a:rPr>
-              <a:t>AWS VPC </a:t>
-            </a:r>
-          </a:p>
-        </p:txBody>
-      </p:sp>
-      <p:pic>
-        <p:nvPicPr>
-          <p:cNvPr id="37" name="Graphic 36">
-            <a:extLst>
-              <a:ext uri="{FF2B5EF4-FFF2-40B4-BE49-F238E27FC236}">
-                <a16:creationId xmlns:a16="http://schemas.microsoft.com/office/drawing/2014/main" id="{8D881B0F-301C-C1D9-13A0-FD4337D05370}"/>
-              </a:ext>
-            </a:extLst>
-          </p:cNvPr>
-          <p:cNvPicPr>
-            <a:picLocks noChangeAspect="1"/>
-          </p:cNvPicPr>
-          <p:nvPr/>
-        </p:nvPicPr>
-        <p:blipFill>
-          <a:blip r:embed="rId4">
-            <a:extLst>
-              <a:ext uri="{96DAC541-7B7A-43D3-8B79-37D633B846F1}">
-                <asvg:svgBlip xmlns:asvg="http://schemas.microsoft.com/office/drawing/2016/SVG/main" r:embed="rId5"/>
-              </a:ext>
-            </a:extLst>
-          </a:blip>
-          <a:stretch>
-            <a:fillRect/>
-          </a:stretch>
-        </p:blipFill>
-        <p:spPr>
-          <a:xfrm>
-            <a:off x="2646532" y="1177209"/>
-            <a:ext cx="381000" cy="381000"/>
-          </a:xfrm>
-          <a:prstGeom prst="rect">
-            <a:avLst/>
-          </a:prstGeom>
-        </p:spPr>
-      </p:pic>
-      <p:sp>
-        <p:nvSpPr>
-          <p:cNvPr id="41" name="Rectangle 40">
-            <a:extLst>
-              <a:ext uri="{FF2B5EF4-FFF2-40B4-BE49-F238E27FC236}">
-                <a16:creationId xmlns:a16="http://schemas.microsoft.com/office/drawing/2014/main" id="{C3D226AB-E799-7F20-5853-3AE1D44A9C89}"/>
-              </a:ext>
-            </a:extLst>
-          </p:cNvPr>
-          <p:cNvSpPr/>
-          <p:nvPr/>
-        </p:nvSpPr>
-        <p:spPr>
-          <a:xfrm>
-            <a:off x="3903148" y="840622"/>
-            <a:ext cx="2457451" cy="2187697"/>
-          </a:xfrm>
-          <a:prstGeom prst="rect">
-            <a:avLst/>
-          </a:prstGeom>
-          <a:noFill/>
-          <a:ln w="12700">
-            <a:solidFill>
-              <a:srgbClr val="5B9CD5"/>
-            </a:solidFill>
-            <a:prstDash val="dash"/>
-          </a:ln>
-        </p:spPr>
-        <p:style>
-          <a:lnRef idx="2">
-            <a:schemeClr val="accent1">
-              <a:shade val="50000"/>
-            </a:schemeClr>
-          </a:lnRef>
-          <a:fillRef idx="1">
-            <a:schemeClr val="accent1"/>
-          </a:fillRef>
-          <a:effectRef idx="0">
-            <a:schemeClr val="accent1"/>
-          </a:effectRef>
-          <a:fontRef idx="minor">
-            <a:schemeClr val="lt1"/>
-          </a:fontRef>
-        </p:style>
-        <p:txBody>
-          <a:bodyPr tIns="91440"/>
-          <a:lstStyle/>
-          <a:p>
-            <a:pPr algn="ctr">
-              <a:defRPr/>
-            </a:pPr>
-            <a:r>
-              <a:rPr lang="en-US" sz="1200" dirty="0">
-                <a:solidFill>
-                  <a:srgbClr val="5B9CD5"/>
-                </a:solidFill>
-                <a:latin typeface="Arial" panose="020B0604020202020204" pitchFamily="34" charset="0"/>
-                <a:cs typeface="Arial" panose="020B0604020202020204" pitchFamily="34" charset="0"/>
-              </a:rPr>
-              <a:t>Availability Zone 1</a:t>
-            </a:r>
-          </a:p>
-        </p:txBody>
-      </p:sp>
-      <p:sp>
-        <p:nvSpPr>
-          <p:cNvPr id="42" name="Rectangle 41">
-            <a:extLst>
-              <a:ext uri="{FF2B5EF4-FFF2-40B4-BE49-F238E27FC236}">
-                <a16:creationId xmlns:a16="http://schemas.microsoft.com/office/drawing/2014/main" id="{949833D1-9C22-CB00-CE5C-47972D241446}"/>
-              </a:ext>
-            </a:extLst>
-          </p:cNvPr>
-          <p:cNvSpPr/>
-          <p:nvPr/>
-        </p:nvSpPr>
-        <p:spPr>
-          <a:xfrm>
-            <a:off x="7829354" y="840622"/>
-            <a:ext cx="2457451" cy="2187697"/>
-          </a:xfrm>
-          <a:prstGeom prst="rect">
-            <a:avLst/>
-          </a:prstGeom>
-          <a:noFill/>
-          <a:ln w="12700">
-            <a:solidFill>
-              <a:srgbClr val="5B9CD5"/>
-            </a:solidFill>
-            <a:prstDash val="dash"/>
-          </a:ln>
-        </p:spPr>
-        <p:style>
-          <a:lnRef idx="2">
-            <a:schemeClr val="accent1">
-              <a:shade val="50000"/>
-            </a:schemeClr>
-          </a:lnRef>
-          <a:fillRef idx="1">
-            <a:schemeClr val="accent1"/>
-          </a:fillRef>
-          <a:effectRef idx="0">
-            <a:schemeClr val="accent1"/>
-          </a:effectRef>
-          <a:fontRef idx="minor">
-            <a:schemeClr val="lt1"/>
-          </a:fontRef>
-        </p:style>
-        <p:txBody>
-          <a:bodyPr tIns="91440"/>
-          <a:lstStyle/>
-          <a:p>
-            <a:pPr algn="ctr">
-              <a:defRPr/>
-            </a:pPr>
-            <a:r>
-              <a:rPr lang="en-US" sz="1200" dirty="0">
-                <a:solidFill>
-                  <a:srgbClr val="5B9CD5"/>
-                </a:solidFill>
-                <a:latin typeface="Arial" panose="020B0604020202020204" pitchFamily="34" charset="0"/>
-                <a:cs typeface="Arial" panose="020B0604020202020204" pitchFamily="34" charset="0"/>
-              </a:rPr>
-              <a:t>Availability Zone 2</a:t>
-            </a:r>
-          </a:p>
-        </p:txBody>
-      </p:sp>
-      <p:sp>
-        <p:nvSpPr>
-          <p:cNvPr id="43" name="Rectangle 42">
-            <a:extLst>
-              <a:ext uri="{FF2B5EF4-FFF2-40B4-BE49-F238E27FC236}">
-                <a16:creationId xmlns:a16="http://schemas.microsoft.com/office/drawing/2014/main" id="{C4DBAE2B-48F2-BAB4-8FB3-737748DA4EA3}"/>
-              </a:ext>
-            </a:extLst>
-          </p:cNvPr>
-          <p:cNvSpPr/>
-          <p:nvPr/>
-        </p:nvSpPr>
-        <p:spPr>
-          <a:xfrm>
-            <a:off x="10572554" y="840619"/>
-            <a:ext cx="2457451" cy="2187696"/>
-          </a:xfrm>
-          <a:prstGeom prst="rect">
-            <a:avLst/>
-          </a:prstGeom>
-          <a:noFill/>
-          <a:ln w="12700">
-            <a:solidFill>
-              <a:srgbClr val="5B9CD5"/>
-            </a:solidFill>
-            <a:prstDash val="dash"/>
-          </a:ln>
-        </p:spPr>
-        <p:style>
-          <a:lnRef idx="2">
-            <a:schemeClr val="accent1">
-              <a:shade val="50000"/>
-            </a:schemeClr>
-          </a:lnRef>
-          <a:fillRef idx="1">
-            <a:schemeClr val="accent1"/>
-          </a:fillRef>
-          <a:effectRef idx="0">
-            <a:schemeClr val="accent1"/>
-          </a:effectRef>
-          <a:fontRef idx="minor">
-            <a:schemeClr val="lt1"/>
-          </a:fontRef>
-        </p:style>
-        <p:txBody>
-          <a:bodyPr tIns="91440"/>
-          <a:lstStyle/>
-          <a:p>
-            <a:pPr algn="ctr">
-              <a:defRPr/>
-            </a:pPr>
-            <a:r>
-              <a:rPr lang="en-US" sz="1200" dirty="0">
-                <a:solidFill>
-                  <a:srgbClr val="5B9CD5"/>
-                </a:solidFill>
-                <a:latin typeface="Arial" panose="020B0604020202020204" pitchFamily="34" charset="0"/>
-                <a:cs typeface="Arial" panose="020B0604020202020204" pitchFamily="34" charset="0"/>
-              </a:rPr>
-              <a:t>Availability Zone 3</a:t>
-            </a:r>
-          </a:p>
-        </p:txBody>
-      </p:sp>
-      <p:pic>
-        <p:nvPicPr>
-          <p:cNvPr id="49" name="Graphic 48">
-            <a:extLst>
-              <a:ext uri="{FF2B5EF4-FFF2-40B4-BE49-F238E27FC236}">
-                <a16:creationId xmlns:a16="http://schemas.microsoft.com/office/drawing/2014/main" id="{A9080BDE-E3AE-E618-73F4-E7A9BF70928A}"/>
-              </a:ext>
-            </a:extLst>
-          </p:cNvPr>
-          <p:cNvPicPr>
-            <a:picLocks noChangeAspect="1"/>
-          </p:cNvPicPr>
-          <p:nvPr/>
-        </p:nvPicPr>
-        <p:blipFill>
-          <a:blip r:embed="rId16">
-            <a:extLst>
-              <a:ext uri="{96DAC541-7B7A-43D3-8B79-37D633B846F1}">
-                <asvg:svgBlip xmlns:asvg="http://schemas.microsoft.com/office/drawing/2016/SVG/main" r:embed="rId17"/>
-              </a:ext>
-            </a:extLst>
-          </a:blip>
-          <a:stretch>
-            <a:fillRect/>
-          </a:stretch>
-        </p:blipFill>
-        <p:spPr>
-          <a:xfrm>
-            <a:off x="4736584" y="1386915"/>
-            <a:ext cx="762000" cy="762000"/>
-          </a:xfrm>
-          <a:prstGeom prst="rect">
-            <a:avLst/>
-          </a:prstGeom>
-        </p:spPr>
-      </p:pic>
-      <p:sp>
-        <p:nvSpPr>
-          <p:cNvPr id="51" name="TextBox 17">
-            <a:extLst>
-              <a:ext uri="{FF2B5EF4-FFF2-40B4-BE49-F238E27FC236}">
-                <a16:creationId xmlns:a16="http://schemas.microsoft.com/office/drawing/2014/main" id="{38585DD2-64DA-F320-29EA-460EACE71A87}"/>
-              </a:ext>
-            </a:extLst>
-          </p:cNvPr>
-          <p:cNvSpPr txBox="1">
-            <a:spLocks noChangeArrowheads="1"/>
-          </p:cNvSpPr>
-          <p:nvPr/>
-        </p:nvSpPr>
-        <p:spPr bwMode="auto">
-          <a:xfrm>
-            <a:off x="4568944" y="2213506"/>
-            <a:ext cx="1097280" cy="430887"/>
-          </a:xfrm>
-          <a:prstGeom prst="rect">
-            <a:avLst/>
-          </a:prstGeom>
-          <a:noFill/>
-          <a:ln>
-            <a:noFill/>
-          </a:ln>
-          <a:extLst>
-            <a:ext uri="{909E8E84-426E-40DD-AFC4-6F175D3DCCD1}">
-              <a14:hiddenFill xmlns:a14="http://schemas.microsoft.com/office/drawing/2010/main">
-                <a:solidFill>
-                  <a:srgbClr val="FFFFFF"/>
-                </a:solidFill>
-              </a14:hiddenFill>
-            </a:ext>
-            <a:ext uri="{91240B29-F687-4F45-9708-019B960494DF}">
-              <a14:hiddenLine xmlns:a14="http://schemas.microsoft.com/office/drawing/2010/main" w="9525">
-                <a:solidFill>
-                  <a:srgbClr val="000000"/>
-                </a:solidFill>
-                <a:miter lim="800000"/>
-                <a:headEnd/>
-                <a:tailEnd/>
-              </a14:hiddenLine>
-            </a:ext>
-          </a:extLst>
-        </p:spPr>
-        <p:txBody>
-          <a:bodyPr wrap="square">
-            <a:spAutoFit/>
-          </a:bodyPr>
-          <a:lstStyle>
-            <a:lvl1pPr>
-              <a:defRPr>
-                <a:solidFill>
-                  <a:schemeClr val="tx1"/>
-                </a:solidFill>
-                <a:latin typeface="Calibri" panose="020F0502020204030204" pitchFamily="34" charset="0"/>
-              </a:defRPr>
-            </a:lvl1pPr>
-            <a:lvl2pPr marL="742950" indent="-285750">
-              <a:defRPr>
-                <a:solidFill>
-                  <a:schemeClr val="tx1"/>
-                </a:solidFill>
-                <a:latin typeface="Calibri" panose="020F0502020204030204" pitchFamily="34" charset="0"/>
-              </a:defRPr>
-            </a:lvl2pPr>
-            <a:lvl3pPr marL="1143000" indent="-228600">
-              <a:defRPr>
-                <a:solidFill>
-                  <a:schemeClr val="tx1"/>
-                </a:solidFill>
-                <a:latin typeface="Calibri" panose="020F0502020204030204" pitchFamily="34" charset="0"/>
-              </a:defRPr>
-            </a:lvl3pPr>
-            <a:lvl4pPr marL="1600200" indent="-228600">
-              <a:defRPr>
-                <a:solidFill>
-                  <a:schemeClr val="tx1"/>
-                </a:solidFill>
-                <a:latin typeface="Calibri" panose="020F0502020204030204" pitchFamily="34" charset="0"/>
-              </a:defRPr>
-            </a:lvl4pPr>
-            <a:lvl5pPr marL="2057400" indent="-228600">
-              <a:defRPr>
-                <a:solidFill>
-                  <a:schemeClr val="tx1"/>
-                </a:solidFill>
-                <a:latin typeface="Calibri" panose="020F0502020204030204" pitchFamily="34" charset="0"/>
-              </a:defRPr>
-            </a:lvl5pPr>
-            <a:lvl6pPr marL="2514600" indent="-228600" eaLnBrk="0" fontAlgn="base" hangingPunct="0">
-              <a:spcBef>
-                <a:spcPct val="0"/>
-              </a:spcBef>
-              <a:spcAft>
-                <a:spcPct val="0"/>
-              </a:spcAft>
-              <a:defRPr>
-                <a:solidFill>
-                  <a:schemeClr val="tx1"/>
-                </a:solidFill>
-                <a:latin typeface="Calibri" panose="020F0502020204030204" pitchFamily="34" charset="0"/>
-              </a:defRPr>
-            </a:lvl6pPr>
-            <a:lvl7pPr marL="2971800" indent="-228600" eaLnBrk="0" fontAlgn="base" hangingPunct="0">
-              <a:spcBef>
-                <a:spcPct val="0"/>
-              </a:spcBef>
-              <a:spcAft>
-                <a:spcPct val="0"/>
-              </a:spcAft>
-              <a:defRPr>
-                <a:solidFill>
-                  <a:schemeClr val="tx1"/>
-                </a:solidFill>
-                <a:latin typeface="Calibri" panose="020F0502020204030204" pitchFamily="34" charset="0"/>
-              </a:defRPr>
-            </a:lvl7pPr>
-            <a:lvl8pPr marL="3429000" indent="-228600" eaLnBrk="0" fontAlgn="base" hangingPunct="0">
-              <a:spcBef>
-                <a:spcPct val="0"/>
-              </a:spcBef>
-              <a:spcAft>
-                <a:spcPct val="0"/>
-              </a:spcAft>
-              <a:defRPr>
-                <a:solidFill>
-                  <a:schemeClr val="tx1"/>
-                </a:solidFill>
-                <a:latin typeface="Calibri" panose="020F0502020204030204" pitchFamily="34" charset="0"/>
-              </a:defRPr>
-            </a:lvl8pPr>
-            <a:lvl9pPr marL="3886200" indent="-228600" eaLnBrk="0" fontAlgn="base" hangingPunct="0">
-              <a:spcBef>
-                <a:spcPct val="0"/>
-              </a:spcBef>
-              <a:spcAft>
-                <a:spcPct val="0"/>
-              </a:spcAft>
-              <a:defRPr>
-                <a:solidFill>
-                  <a:schemeClr val="tx1"/>
-                </a:solidFill>
-                <a:latin typeface="Calibri" panose="020F0502020204030204" pitchFamily="34" charset="0"/>
-              </a:defRPr>
-            </a:lvl9pPr>
-          </a:lstStyle>
-          <a:p>
-            <a:pPr algn="ctr" eaLnBrk="1" hangingPunct="1"/>
-            <a:r>
-              <a:rPr lang="en-US" altLang="en-US" sz="1100" dirty="0">
-                <a:latin typeface="Arial" panose="020B0604020202020204" pitchFamily="34" charset="0"/>
-                <a:ea typeface="Amazon Ember" panose="020B0603020204020204" pitchFamily="34" charset="0"/>
-                <a:cs typeface="Arial" panose="020B0604020202020204" pitchFamily="34" charset="0"/>
-              </a:rPr>
-              <a:t>Kubernetes control pane</a:t>
-            </a:r>
-          </a:p>
-        </p:txBody>
-      </p:sp>
-      <p:cxnSp>
-        <p:nvCxnSpPr>
-          <p:cNvPr id="110" name="Straight Arrow Connector 109">
-            <a:extLst>
-              <a:ext uri="{FF2B5EF4-FFF2-40B4-BE49-F238E27FC236}">
-                <a16:creationId xmlns:a16="http://schemas.microsoft.com/office/drawing/2014/main" id="{B3D22AD0-994E-6972-B60C-6CCC35EA69F4}"/>
-              </a:ext>
-            </a:extLst>
-          </p:cNvPr>
-          <p:cNvCxnSpPr>
-            <a:cxnSpLocks/>
-          </p:cNvCxnSpPr>
-          <p:nvPr/>
-        </p:nvCxnSpPr>
-        <p:spPr>
-          <a:xfrm>
-            <a:off x="2873278" y="2238792"/>
-            <a:ext cx="2228671" cy="408538"/>
-          </a:xfrm>
-          <a:prstGeom prst="bentConnector4">
-            <a:avLst>
-              <a:gd name="adj1" fmla="val 25238"/>
-              <a:gd name="adj2" fmla="val 154843"/>
-            </a:avLst>
-          </a:prstGeom>
-          <a:ln w="12700">
-            <a:solidFill>
-              <a:srgbClr val="545B64"/>
-            </a:solidFill>
-            <a:headEnd type="none" w="med" len="sm"/>
-            <a:tailEnd type="arrow" w="med" len="sm"/>
-          </a:ln>
-        </p:spPr>
-        <p:style>
-          <a:lnRef idx="1">
-            <a:schemeClr val="accent1"/>
-          </a:lnRef>
-          <a:fillRef idx="0">
-            <a:schemeClr val="accent1"/>
-          </a:fillRef>
-          <a:effectRef idx="0">
-            <a:schemeClr val="accent1"/>
-          </a:effectRef>
-          <a:fontRef idx="minor">
-            <a:schemeClr val="tx1"/>
-          </a:fontRef>
-        </p:style>
-      </p:cxnSp>
-      <p:cxnSp>
-        <p:nvCxnSpPr>
-          <p:cNvPr id="113" name="Straight Arrow Connector 112">
-            <a:extLst>
-              <a:ext uri="{FF2B5EF4-FFF2-40B4-BE49-F238E27FC236}">
-                <a16:creationId xmlns:a16="http://schemas.microsoft.com/office/drawing/2014/main" id="{4B725595-71C0-3875-F819-7264B68676C5}"/>
-              </a:ext>
-            </a:extLst>
-          </p:cNvPr>
-          <p:cNvCxnSpPr>
-            <a:cxnSpLocks/>
-          </p:cNvCxnSpPr>
-          <p:nvPr/>
-        </p:nvCxnSpPr>
-        <p:spPr>
-          <a:xfrm>
-            <a:off x="2879018" y="2240907"/>
-            <a:ext cx="6184199" cy="408538"/>
-          </a:xfrm>
-          <a:prstGeom prst="bentConnector4">
-            <a:avLst>
-              <a:gd name="adj1" fmla="val 8979"/>
-              <a:gd name="adj2" fmla="val 154842"/>
-            </a:avLst>
-          </a:prstGeom>
-          <a:ln w="12700">
-            <a:solidFill>
-              <a:srgbClr val="545B64"/>
-            </a:solidFill>
-            <a:headEnd type="none" w="med" len="sm"/>
-            <a:tailEnd type="arrow" w="med" len="sm"/>
-          </a:ln>
-        </p:spPr>
-        <p:style>
-          <a:lnRef idx="1">
-            <a:schemeClr val="accent1"/>
-          </a:lnRef>
-          <a:fillRef idx="0">
-            <a:schemeClr val="accent1"/>
-          </a:fillRef>
-          <a:effectRef idx="0">
-            <a:schemeClr val="accent1"/>
-          </a:effectRef>
-          <a:fontRef idx="minor">
-            <a:schemeClr val="tx1"/>
-          </a:fontRef>
-        </p:style>
-      </p:cxnSp>
-      <p:cxnSp>
-        <p:nvCxnSpPr>
-          <p:cNvPr id="119" name="Straight Arrow Connector 112">
-            <a:extLst>
-              <a:ext uri="{FF2B5EF4-FFF2-40B4-BE49-F238E27FC236}">
-                <a16:creationId xmlns:a16="http://schemas.microsoft.com/office/drawing/2014/main" id="{E144C842-1028-2BCB-E7A3-099BEC300139}"/>
-              </a:ext>
-            </a:extLst>
-          </p:cNvPr>
-          <p:cNvCxnSpPr>
-            <a:cxnSpLocks/>
-          </p:cNvCxnSpPr>
-          <p:nvPr/>
-        </p:nvCxnSpPr>
-        <p:spPr>
-          <a:xfrm>
-            <a:off x="2869594" y="2238692"/>
-            <a:ext cx="8928117" cy="415193"/>
-          </a:xfrm>
-          <a:prstGeom prst="bentConnector4">
-            <a:avLst>
-              <a:gd name="adj1" fmla="val 6376"/>
-              <a:gd name="adj2" fmla="val 152533"/>
-            </a:avLst>
-          </a:prstGeom>
-          <a:ln w="12700">
-            <a:solidFill>
-              <a:srgbClr val="545B64"/>
-            </a:solidFill>
-            <a:headEnd type="none" w="med" len="sm"/>
-            <a:tailEnd type="arrow" w="med" len="sm"/>
-          </a:ln>
-        </p:spPr>
-        <p:style>
-          <a:lnRef idx="1">
-            <a:schemeClr val="accent1"/>
-          </a:lnRef>
-          <a:fillRef idx="0">
-            <a:schemeClr val="accent1"/>
-          </a:fillRef>
-          <a:effectRef idx="0">
-            <a:schemeClr val="accent1"/>
-          </a:effectRef>
-          <a:fontRef idx="minor">
-            <a:schemeClr val="tx1"/>
-          </a:fontRef>
-        </p:style>
-      </p:cxnSp>
-      <p:sp>
-        <p:nvSpPr>
-          <p:cNvPr id="124" name="TextBox 22">
-            <a:extLst>
-              <a:ext uri="{FF2B5EF4-FFF2-40B4-BE49-F238E27FC236}">
-                <a16:creationId xmlns:a16="http://schemas.microsoft.com/office/drawing/2014/main" id="{269BFA4D-9F8D-E8F3-D0F3-27206733DCDA}"/>
-              </a:ext>
-            </a:extLst>
-          </p:cNvPr>
-          <p:cNvSpPr txBox="1">
-            <a:spLocks noChangeArrowheads="1"/>
-          </p:cNvSpPr>
-          <p:nvPr/>
-        </p:nvSpPr>
-        <p:spPr bwMode="auto">
-          <a:xfrm>
-            <a:off x="2155404" y="5622126"/>
+            <a:off x="2045930" y="3480146"/>
             <a:ext cx="1053039" cy="430887"/>
           </a:xfrm>
           <a:prstGeom prst="rect">
@@ -6009,7 +5155,7 @@
           <p:nvPr/>
         </p:nvPicPr>
         <p:blipFill>
-          <a:blip r:embed="rId18">
+          <a:blip r:embed="rId15">
             <a:extLst>
               <a:ext uri="{28A0092B-C50C-407E-A947-70E740481C1C}">
                 <a14:useLocalDpi xmlns:a14="http://schemas.microsoft.com/office/drawing/2010/main" val="0"/>
@@ -6023,7 +5169,7 @@
         </p:blipFill>
         <p:spPr bwMode="auto">
           <a:xfrm>
-            <a:off x="2445606" y="5150633"/>
+            <a:off x="2336129" y="3008650"/>
             <a:ext cx="457200" cy="457200"/>
           </a:xfrm>
           <a:prstGeom prst="rect">
@@ -6054,53 +5200,6 @@
           </a:extLst>
         </p:spPr>
       </p:pic>
-      <p:cxnSp>
-        <p:nvCxnSpPr>
-          <p:cNvPr id="136" name="Straight Arrow Connector 135">
-            <a:extLst>
-              <a:ext uri="{FF2B5EF4-FFF2-40B4-BE49-F238E27FC236}">
-                <a16:creationId xmlns:a16="http://schemas.microsoft.com/office/drawing/2014/main" id="{BD185E53-3751-45E1-0CDA-966001E57F4E}"/>
-              </a:ext>
-            </a:extLst>
-          </p:cNvPr>
-          <p:cNvCxnSpPr>
-            <a:cxnSpLocks/>
-            <a:stCxn id="272" idx="3"/>
-            <a:endCxn id="28" idx="1"/>
-          </p:cNvCxnSpPr>
-          <p:nvPr/>
-        </p:nvCxnSpPr>
-        <p:spPr>
-          <a:xfrm>
-            <a:off x="858626" y="2229500"/>
-            <a:ext cx="1555416" cy="6350"/>
-          </a:xfrm>
-          <a:prstGeom prst="straightConnector1">
-            <a:avLst/>
-          </a:prstGeom>
-          <a:ln w="12700">
-            <a:solidFill>
-              <a:srgbClr val="545B64"/>
-            </a:solidFill>
-            <a:headEnd type="none" w="med" len="sm"/>
-            <a:tailEnd type="arrow" w="med" len="sm"/>
-          </a:ln>
-        </p:spPr>
-        <p:style>
-          <a:lnRef idx="1">
-            <a:schemeClr val="accent1"/>
-          </a:lnRef>
-          <a:fillRef idx="0">
-            <a:schemeClr val="accent1"/>
-          </a:fillRef>
-          <a:effectRef idx="0">
-            <a:schemeClr val="accent1"/>
-          </a:effectRef>
-          <a:fontRef idx="minor">
-            <a:schemeClr val="tx1"/>
-          </a:fontRef>
-        </p:style>
-      </p:cxnSp>
       <p:pic>
         <p:nvPicPr>
           <p:cNvPr id="137" name="Graphic 62">
@@ -6116,7 +5215,7 @@
           <p:nvPr/>
         </p:nvPicPr>
         <p:blipFill>
-          <a:blip r:embed="rId19" cstate="print">
+          <a:blip r:embed="rId16" cstate="print">
             <a:extLst>
               <a:ext uri="{28A0092B-C50C-407E-A947-70E740481C1C}">
                 <a14:useLocalDpi xmlns:a14="http://schemas.microsoft.com/office/drawing/2010/main" val="0"/>
@@ -6130,7 +5229,7 @@
         </p:blipFill>
         <p:spPr bwMode="auto">
           <a:xfrm>
-            <a:off x="4982914" y="5722726"/>
+            <a:off x="4873437" y="3580743"/>
             <a:ext cx="457200" cy="457200"/>
           </a:xfrm>
           <a:prstGeom prst="rect">
@@ -6177,7 +5276,7 @@
         </p:nvSpPr>
         <p:spPr bwMode="auto">
           <a:xfrm>
-            <a:off x="4480091" y="6180963"/>
+            <a:off x="4370614" y="4038980"/>
             <a:ext cx="1463040" cy="261610"/>
           </a:xfrm>
           <a:prstGeom prst="rect">
@@ -6336,7 +5435,7 @@
         </p:nvSpPr>
         <p:spPr>
           <a:xfrm>
-            <a:off x="8017354" y="5297172"/>
+            <a:off x="7907877" y="3155189"/>
             <a:ext cx="2103120" cy="1396108"/>
           </a:xfrm>
           <a:prstGeom prst="rect">
@@ -6407,7 +5506,7 @@
         </p:blipFill>
         <p:spPr>
           <a:xfrm>
-            <a:off x="8017354" y="5297172"/>
+            <a:off x="7907877" y="3155189"/>
             <a:ext cx="274320" cy="274320"/>
           </a:xfrm>
           <a:prstGeom prst="rect">
@@ -6430,7 +5529,7 @@
           <p:nvPr/>
         </p:nvPicPr>
         <p:blipFill>
-          <a:blip r:embed="rId19" cstate="print">
+          <a:blip r:embed="rId16" cstate="print">
             <a:extLst>
               <a:ext uri="{28A0092B-C50C-407E-A947-70E740481C1C}">
                 <a14:useLocalDpi xmlns:a14="http://schemas.microsoft.com/office/drawing/2010/main" val="0"/>
@@ -6444,7 +5543,7 @@
         </p:blipFill>
         <p:spPr bwMode="auto">
           <a:xfrm>
-            <a:off x="8931754" y="5722726"/>
+            <a:off x="8822277" y="3580743"/>
             <a:ext cx="457200" cy="457200"/>
           </a:xfrm>
           <a:prstGeom prst="rect">
@@ -6491,7 +5590,7 @@
         </p:nvSpPr>
         <p:spPr bwMode="auto">
           <a:xfrm>
-            <a:off x="8428931" y="6180963"/>
+            <a:off x="8319454" y="4038980"/>
             <a:ext cx="1463040" cy="261610"/>
           </a:xfrm>
           <a:prstGeom prst="rect">
@@ -6650,7 +5749,7 @@
         </p:nvSpPr>
         <p:spPr>
           <a:xfrm>
-            <a:off x="10739356" y="5275786"/>
+            <a:off x="10629879" y="3133803"/>
             <a:ext cx="2103120" cy="1396108"/>
           </a:xfrm>
           <a:prstGeom prst="rect">
@@ -6721,7 +5820,7 @@
         </p:blipFill>
         <p:spPr>
           <a:xfrm>
-            <a:off x="10739356" y="5275786"/>
+            <a:off x="10629879" y="3133803"/>
             <a:ext cx="274320" cy="274320"/>
           </a:xfrm>
           <a:prstGeom prst="rect">
@@ -6744,7 +5843,7 @@
           <p:nvPr/>
         </p:nvPicPr>
         <p:blipFill>
-          <a:blip r:embed="rId19" cstate="print">
+          <a:blip r:embed="rId16" cstate="print">
             <a:extLst>
               <a:ext uri="{28A0092B-C50C-407E-A947-70E740481C1C}">
                 <a14:useLocalDpi xmlns:a14="http://schemas.microsoft.com/office/drawing/2010/main" val="0"/>
@@ -6758,7 +5857,7 @@
         </p:blipFill>
         <p:spPr bwMode="auto">
           <a:xfrm>
-            <a:off x="11653756" y="5701340"/>
+            <a:off x="11544279" y="3559357"/>
             <a:ext cx="457200" cy="457200"/>
           </a:xfrm>
           <a:prstGeom prst="rect">
@@ -6805,7 +5904,7 @@
         </p:nvSpPr>
         <p:spPr bwMode="auto">
           <a:xfrm>
-            <a:off x="11150933" y="6159577"/>
+            <a:off x="11041456" y="4017594"/>
             <a:ext cx="1463040" cy="261610"/>
           </a:xfrm>
           <a:prstGeom prst="rect">
@@ -6966,7 +6065,7 @@
         </p:nvCxnSpPr>
         <p:spPr>
           <a:xfrm>
-            <a:off x="2865953" y="5380041"/>
+            <a:off x="2756476" y="3238058"/>
             <a:ext cx="2330152" cy="1098390"/>
           </a:xfrm>
           <a:prstGeom prst="bentConnector4">
@@ -7016,7 +6115,7 @@
         </p:nvCxnSpPr>
         <p:spPr>
           <a:xfrm>
-            <a:off x="2902811" y="5379233"/>
+            <a:off x="2793337" y="3237250"/>
             <a:ext cx="8979647" cy="1041954"/>
           </a:xfrm>
           <a:prstGeom prst="bentConnector4">
@@ -7066,7 +6165,7 @@
         </p:nvCxnSpPr>
         <p:spPr>
           <a:xfrm>
-            <a:off x="2902811" y="5379233"/>
+            <a:off x="2793337" y="3237250"/>
             <a:ext cx="6257645" cy="1063340"/>
           </a:xfrm>
           <a:prstGeom prst="bentConnector4">
@@ -7100,400 +6199,6 @@
       </p:cxnSp>
       <p:pic>
         <p:nvPicPr>
-          <p:cNvPr id="197" name="Graphic 196">
-            <a:extLst>
-              <a:ext uri="{FF2B5EF4-FFF2-40B4-BE49-F238E27FC236}">
-                <a16:creationId xmlns:a16="http://schemas.microsoft.com/office/drawing/2014/main" id="{68E0CA86-93EF-6E00-81A6-F135CB604E48}"/>
-              </a:ext>
-            </a:extLst>
-          </p:cNvPr>
-          <p:cNvPicPr>
-            <a:picLocks noChangeAspect="1"/>
-          </p:cNvPicPr>
-          <p:nvPr/>
-        </p:nvPicPr>
-        <p:blipFill>
-          <a:blip r:embed="rId16">
-            <a:extLst>
-              <a:ext uri="{96DAC541-7B7A-43D3-8B79-37D633B846F1}">
-                <asvg:svgBlip xmlns:asvg="http://schemas.microsoft.com/office/drawing/2016/SVG/main" r:embed="rId17"/>
-              </a:ext>
-            </a:extLst>
-          </a:blip>
-          <a:stretch>
-            <a:fillRect/>
-          </a:stretch>
-        </p:blipFill>
-        <p:spPr>
-          <a:xfrm>
-            <a:off x="8692112" y="1386915"/>
-            <a:ext cx="762000" cy="762000"/>
-          </a:xfrm>
-          <a:prstGeom prst="rect">
-            <a:avLst/>
-          </a:prstGeom>
-        </p:spPr>
-      </p:pic>
-      <p:sp>
-        <p:nvSpPr>
-          <p:cNvPr id="198" name="TextBox 17">
-            <a:extLst>
-              <a:ext uri="{FF2B5EF4-FFF2-40B4-BE49-F238E27FC236}">
-                <a16:creationId xmlns:a16="http://schemas.microsoft.com/office/drawing/2014/main" id="{4BCC482B-5462-C13A-D3F7-DAA559C341EC}"/>
-              </a:ext>
-            </a:extLst>
-          </p:cNvPr>
-          <p:cNvSpPr txBox="1">
-            <a:spLocks noChangeArrowheads="1"/>
-          </p:cNvSpPr>
-          <p:nvPr/>
-        </p:nvSpPr>
-        <p:spPr bwMode="auto">
-          <a:xfrm>
-            <a:off x="8524472" y="2213506"/>
-            <a:ext cx="1097280" cy="430887"/>
-          </a:xfrm>
-          <a:prstGeom prst="rect">
-            <a:avLst/>
-          </a:prstGeom>
-          <a:noFill/>
-          <a:ln>
-            <a:noFill/>
-          </a:ln>
-          <a:extLst>
-            <a:ext uri="{909E8E84-426E-40DD-AFC4-6F175D3DCCD1}">
-              <a14:hiddenFill xmlns:a14="http://schemas.microsoft.com/office/drawing/2010/main">
-                <a:solidFill>
-                  <a:srgbClr val="FFFFFF"/>
-                </a:solidFill>
-              </a14:hiddenFill>
-            </a:ext>
-            <a:ext uri="{91240B29-F687-4F45-9708-019B960494DF}">
-              <a14:hiddenLine xmlns:a14="http://schemas.microsoft.com/office/drawing/2010/main" w="9525">
-                <a:solidFill>
-                  <a:srgbClr val="000000"/>
-                </a:solidFill>
-                <a:miter lim="800000"/>
-                <a:headEnd/>
-                <a:tailEnd/>
-              </a14:hiddenLine>
-            </a:ext>
-          </a:extLst>
-        </p:spPr>
-        <p:txBody>
-          <a:bodyPr wrap="square">
-            <a:spAutoFit/>
-          </a:bodyPr>
-          <a:lstStyle>
-            <a:lvl1pPr>
-              <a:defRPr>
-                <a:solidFill>
-                  <a:schemeClr val="tx1"/>
-                </a:solidFill>
-                <a:latin typeface="Calibri" panose="020F0502020204030204" pitchFamily="34" charset="0"/>
-              </a:defRPr>
-            </a:lvl1pPr>
-            <a:lvl2pPr marL="742950" indent="-285750">
-              <a:defRPr>
-                <a:solidFill>
-                  <a:schemeClr val="tx1"/>
-                </a:solidFill>
-                <a:latin typeface="Calibri" panose="020F0502020204030204" pitchFamily="34" charset="0"/>
-              </a:defRPr>
-            </a:lvl2pPr>
-            <a:lvl3pPr marL="1143000" indent="-228600">
-              <a:defRPr>
-                <a:solidFill>
-                  <a:schemeClr val="tx1"/>
-                </a:solidFill>
-                <a:latin typeface="Calibri" panose="020F0502020204030204" pitchFamily="34" charset="0"/>
-              </a:defRPr>
-            </a:lvl3pPr>
-            <a:lvl4pPr marL="1600200" indent="-228600">
-              <a:defRPr>
-                <a:solidFill>
-                  <a:schemeClr val="tx1"/>
-                </a:solidFill>
-                <a:latin typeface="Calibri" panose="020F0502020204030204" pitchFamily="34" charset="0"/>
-              </a:defRPr>
-            </a:lvl4pPr>
-            <a:lvl5pPr marL="2057400" indent="-228600">
-              <a:defRPr>
-                <a:solidFill>
-                  <a:schemeClr val="tx1"/>
-                </a:solidFill>
-                <a:latin typeface="Calibri" panose="020F0502020204030204" pitchFamily="34" charset="0"/>
-              </a:defRPr>
-            </a:lvl5pPr>
-            <a:lvl6pPr marL="2514600" indent="-228600" eaLnBrk="0" fontAlgn="base" hangingPunct="0">
-              <a:spcBef>
-                <a:spcPct val="0"/>
-              </a:spcBef>
-              <a:spcAft>
-                <a:spcPct val="0"/>
-              </a:spcAft>
-              <a:defRPr>
-                <a:solidFill>
-                  <a:schemeClr val="tx1"/>
-                </a:solidFill>
-                <a:latin typeface="Calibri" panose="020F0502020204030204" pitchFamily="34" charset="0"/>
-              </a:defRPr>
-            </a:lvl6pPr>
-            <a:lvl7pPr marL="2971800" indent="-228600" eaLnBrk="0" fontAlgn="base" hangingPunct="0">
-              <a:spcBef>
-                <a:spcPct val="0"/>
-              </a:spcBef>
-              <a:spcAft>
-                <a:spcPct val="0"/>
-              </a:spcAft>
-              <a:defRPr>
-                <a:solidFill>
-                  <a:schemeClr val="tx1"/>
-                </a:solidFill>
-                <a:latin typeface="Calibri" panose="020F0502020204030204" pitchFamily="34" charset="0"/>
-              </a:defRPr>
-            </a:lvl7pPr>
-            <a:lvl8pPr marL="3429000" indent="-228600" eaLnBrk="0" fontAlgn="base" hangingPunct="0">
-              <a:spcBef>
-                <a:spcPct val="0"/>
-              </a:spcBef>
-              <a:spcAft>
-                <a:spcPct val="0"/>
-              </a:spcAft>
-              <a:defRPr>
-                <a:solidFill>
-                  <a:schemeClr val="tx1"/>
-                </a:solidFill>
-                <a:latin typeface="Calibri" panose="020F0502020204030204" pitchFamily="34" charset="0"/>
-              </a:defRPr>
-            </a:lvl8pPr>
-            <a:lvl9pPr marL="3886200" indent="-228600" eaLnBrk="0" fontAlgn="base" hangingPunct="0">
-              <a:spcBef>
-                <a:spcPct val="0"/>
-              </a:spcBef>
-              <a:spcAft>
-                <a:spcPct val="0"/>
-              </a:spcAft>
-              <a:defRPr>
-                <a:solidFill>
-                  <a:schemeClr val="tx1"/>
-                </a:solidFill>
-                <a:latin typeface="Calibri" panose="020F0502020204030204" pitchFamily="34" charset="0"/>
-              </a:defRPr>
-            </a:lvl9pPr>
-          </a:lstStyle>
-          <a:p>
-            <a:pPr algn="ctr" eaLnBrk="1" hangingPunct="1"/>
-            <a:r>
-              <a:rPr lang="en-US" altLang="en-US" sz="1100" dirty="0">
-                <a:latin typeface="Arial" panose="020B0604020202020204" pitchFamily="34" charset="0"/>
-                <a:ea typeface="Amazon Ember" panose="020B0603020204020204" pitchFamily="34" charset="0"/>
-                <a:cs typeface="Arial" panose="020B0604020202020204" pitchFamily="34" charset="0"/>
-              </a:rPr>
-              <a:t>Kubernetes control pane</a:t>
-            </a:r>
-          </a:p>
-        </p:txBody>
-      </p:sp>
-      <p:pic>
-        <p:nvPicPr>
-          <p:cNvPr id="199" name="Graphic 198">
-            <a:extLst>
-              <a:ext uri="{FF2B5EF4-FFF2-40B4-BE49-F238E27FC236}">
-                <a16:creationId xmlns:a16="http://schemas.microsoft.com/office/drawing/2014/main" id="{4D15EED3-E0A3-26CC-1744-77215B0E07F3}"/>
-              </a:ext>
-            </a:extLst>
-          </p:cNvPr>
-          <p:cNvPicPr>
-            <a:picLocks noChangeAspect="1"/>
-          </p:cNvPicPr>
-          <p:nvPr/>
-        </p:nvPicPr>
-        <p:blipFill>
-          <a:blip r:embed="rId16">
-            <a:extLst>
-              <a:ext uri="{96DAC541-7B7A-43D3-8B79-37D633B846F1}">
-                <asvg:svgBlip xmlns:asvg="http://schemas.microsoft.com/office/drawing/2016/SVG/main" r:embed="rId17"/>
-              </a:ext>
-            </a:extLst>
-          </a:blip>
-          <a:stretch>
-            <a:fillRect/>
-          </a:stretch>
-        </p:blipFill>
-        <p:spPr>
-          <a:xfrm>
-            <a:off x="11446688" y="1373850"/>
-            <a:ext cx="762000" cy="762000"/>
-          </a:xfrm>
-          <a:prstGeom prst="rect">
-            <a:avLst/>
-          </a:prstGeom>
-        </p:spPr>
-      </p:pic>
-      <p:sp>
-        <p:nvSpPr>
-          <p:cNvPr id="200" name="TextBox 17">
-            <a:extLst>
-              <a:ext uri="{FF2B5EF4-FFF2-40B4-BE49-F238E27FC236}">
-                <a16:creationId xmlns:a16="http://schemas.microsoft.com/office/drawing/2014/main" id="{A76C2993-9F2F-DB9D-4365-E0C3879342D2}"/>
-              </a:ext>
-            </a:extLst>
-          </p:cNvPr>
-          <p:cNvSpPr txBox="1">
-            <a:spLocks noChangeArrowheads="1"/>
-          </p:cNvSpPr>
-          <p:nvPr/>
-        </p:nvSpPr>
-        <p:spPr bwMode="auto">
-          <a:xfrm>
-            <a:off x="11279048" y="2200441"/>
-            <a:ext cx="1097280" cy="430887"/>
-          </a:xfrm>
-          <a:prstGeom prst="rect">
-            <a:avLst/>
-          </a:prstGeom>
-          <a:noFill/>
-          <a:ln>
-            <a:noFill/>
-          </a:ln>
-          <a:extLst>
-            <a:ext uri="{909E8E84-426E-40DD-AFC4-6F175D3DCCD1}">
-              <a14:hiddenFill xmlns:a14="http://schemas.microsoft.com/office/drawing/2010/main">
-                <a:solidFill>
-                  <a:srgbClr val="FFFFFF"/>
-                </a:solidFill>
-              </a14:hiddenFill>
-            </a:ext>
-            <a:ext uri="{91240B29-F687-4F45-9708-019B960494DF}">
-              <a14:hiddenLine xmlns:a14="http://schemas.microsoft.com/office/drawing/2010/main" w="9525">
-                <a:solidFill>
-                  <a:srgbClr val="000000"/>
-                </a:solidFill>
-                <a:miter lim="800000"/>
-                <a:headEnd/>
-                <a:tailEnd/>
-              </a14:hiddenLine>
-            </a:ext>
-          </a:extLst>
-        </p:spPr>
-        <p:txBody>
-          <a:bodyPr wrap="square">
-            <a:spAutoFit/>
-          </a:bodyPr>
-          <a:lstStyle>
-            <a:lvl1pPr>
-              <a:defRPr>
-                <a:solidFill>
-                  <a:schemeClr val="tx1"/>
-                </a:solidFill>
-                <a:latin typeface="Calibri" panose="020F0502020204030204" pitchFamily="34" charset="0"/>
-              </a:defRPr>
-            </a:lvl1pPr>
-            <a:lvl2pPr marL="742950" indent="-285750">
-              <a:defRPr>
-                <a:solidFill>
-                  <a:schemeClr val="tx1"/>
-                </a:solidFill>
-                <a:latin typeface="Calibri" panose="020F0502020204030204" pitchFamily="34" charset="0"/>
-              </a:defRPr>
-            </a:lvl2pPr>
-            <a:lvl3pPr marL="1143000" indent="-228600">
-              <a:defRPr>
-                <a:solidFill>
-                  <a:schemeClr val="tx1"/>
-                </a:solidFill>
-                <a:latin typeface="Calibri" panose="020F0502020204030204" pitchFamily="34" charset="0"/>
-              </a:defRPr>
-            </a:lvl3pPr>
-            <a:lvl4pPr marL="1600200" indent="-228600">
-              <a:defRPr>
-                <a:solidFill>
-                  <a:schemeClr val="tx1"/>
-                </a:solidFill>
-                <a:latin typeface="Calibri" panose="020F0502020204030204" pitchFamily="34" charset="0"/>
-              </a:defRPr>
-            </a:lvl4pPr>
-            <a:lvl5pPr marL="2057400" indent="-228600">
-              <a:defRPr>
-                <a:solidFill>
-                  <a:schemeClr val="tx1"/>
-                </a:solidFill>
-                <a:latin typeface="Calibri" panose="020F0502020204030204" pitchFamily="34" charset="0"/>
-              </a:defRPr>
-            </a:lvl5pPr>
-            <a:lvl6pPr marL="2514600" indent="-228600" eaLnBrk="0" fontAlgn="base" hangingPunct="0">
-              <a:spcBef>
-                <a:spcPct val="0"/>
-              </a:spcBef>
-              <a:spcAft>
-                <a:spcPct val="0"/>
-              </a:spcAft>
-              <a:defRPr>
-                <a:solidFill>
-                  <a:schemeClr val="tx1"/>
-                </a:solidFill>
-                <a:latin typeface="Calibri" panose="020F0502020204030204" pitchFamily="34" charset="0"/>
-              </a:defRPr>
-            </a:lvl6pPr>
-            <a:lvl7pPr marL="2971800" indent="-228600" eaLnBrk="0" fontAlgn="base" hangingPunct="0">
-              <a:spcBef>
-                <a:spcPct val="0"/>
-              </a:spcBef>
-              <a:spcAft>
-                <a:spcPct val="0"/>
-              </a:spcAft>
-              <a:defRPr>
-                <a:solidFill>
-                  <a:schemeClr val="tx1"/>
-                </a:solidFill>
-                <a:latin typeface="Calibri" panose="020F0502020204030204" pitchFamily="34" charset="0"/>
-              </a:defRPr>
-            </a:lvl7pPr>
-            <a:lvl8pPr marL="3429000" indent="-228600" eaLnBrk="0" fontAlgn="base" hangingPunct="0">
-              <a:spcBef>
-                <a:spcPct val="0"/>
-              </a:spcBef>
-              <a:spcAft>
-                <a:spcPct val="0"/>
-              </a:spcAft>
-              <a:defRPr>
-                <a:solidFill>
-                  <a:schemeClr val="tx1"/>
-                </a:solidFill>
-                <a:latin typeface="Calibri" panose="020F0502020204030204" pitchFamily="34" charset="0"/>
-              </a:defRPr>
-            </a:lvl8pPr>
-            <a:lvl9pPr marL="3886200" indent="-228600" eaLnBrk="0" fontAlgn="base" hangingPunct="0">
-              <a:spcBef>
-                <a:spcPct val="0"/>
-              </a:spcBef>
-              <a:spcAft>
-                <a:spcPct val="0"/>
-              </a:spcAft>
-              <a:defRPr>
-                <a:solidFill>
-                  <a:schemeClr val="tx1"/>
-                </a:solidFill>
-                <a:latin typeface="Calibri" panose="020F0502020204030204" pitchFamily="34" charset="0"/>
-              </a:defRPr>
-            </a:lvl9pPr>
-          </a:lstStyle>
-          <a:p>
-            <a:pPr algn="ctr" eaLnBrk="1" hangingPunct="1"/>
-            <a:r>
-              <a:rPr lang="en-US" altLang="en-US" sz="1100" dirty="0">
-                <a:latin typeface="Arial" panose="020B0604020202020204" pitchFamily="34" charset="0"/>
-                <a:ea typeface="Amazon Ember" panose="020B0603020204020204" pitchFamily="34" charset="0"/>
-                <a:cs typeface="Arial" panose="020B0604020202020204" pitchFamily="34" charset="0"/>
-              </a:rPr>
-              <a:t>Kubernetes control pane</a:t>
-            </a:r>
-          </a:p>
-        </p:txBody>
-      </p:sp>
-      <p:pic>
-        <p:nvPicPr>
           <p:cNvPr id="243" name="Graphic 23">
             <a:extLst>
               <a:ext uri="{FF2B5EF4-FFF2-40B4-BE49-F238E27FC236}">
@@ -7507,7 +6212,7 @@
           <p:nvPr/>
         </p:nvPicPr>
         <p:blipFill>
-          <a:blip r:embed="rId20">
+          <a:blip r:embed="rId17">
             <a:extLst>
               <a:ext uri="{28A0092B-C50C-407E-A947-70E740481C1C}">
                 <a14:useLocalDpi xmlns:a14="http://schemas.microsoft.com/office/drawing/2010/main" val="0"/>
@@ -7521,7 +6226,7 @@
         </p:blipFill>
         <p:spPr bwMode="auto">
           <a:xfrm>
-            <a:off x="13734743" y="1368799"/>
+            <a:off x="13600359" y="1446713"/>
             <a:ext cx="762000" cy="762000"/>
           </a:xfrm>
           <a:prstGeom prst="rect">
@@ -7568,7 +6273,7 @@
         </p:nvSpPr>
         <p:spPr bwMode="auto">
           <a:xfrm>
-            <a:off x="12989640" y="2151254"/>
+            <a:off x="12855256" y="2229171"/>
             <a:ext cx="2268538" cy="276999"/>
           </a:xfrm>
           <a:prstGeom prst="rect">
@@ -7728,13 +6433,13 @@
           <p:nvPr/>
         </p:nvPicPr>
         <p:blipFill>
-          <a:blip r:embed="rId21"/>
+          <a:blip r:embed="rId18"/>
           <a:srcRect/>
           <a:stretch/>
         </p:blipFill>
         <p:spPr bwMode="auto">
           <a:xfrm>
-            <a:off x="5086884" y="7114115"/>
+            <a:off x="4977407" y="4972132"/>
             <a:ext cx="762000" cy="762000"/>
           </a:xfrm>
           <a:prstGeom prst="rect">
@@ -7781,7 +6486,7 @@
         </p:nvSpPr>
         <p:spPr bwMode="auto">
           <a:xfrm>
-            <a:off x="4342347" y="7874532"/>
+            <a:off x="4232870" y="5732552"/>
             <a:ext cx="2279650" cy="276999"/>
           </a:xfrm>
           <a:prstGeom prst="rect">
@@ -7941,7 +6646,7 @@
           <p:nvPr/>
         </p:nvPicPr>
         <p:blipFill>
-          <a:blip r:embed="rId22">
+          <a:blip r:embed="rId19">
             <a:extLst>
               <a:ext uri="{28A0092B-C50C-407E-A947-70E740481C1C}">
                 <a14:useLocalDpi xmlns:a14="http://schemas.microsoft.com/office/drawing/2010/main" val="0"/>
@@ -7955,7 +6660,7 @@
         </p:blipFill>
         <p:spPr bwMode="auto">
           <a:xfrm>
-            <a:off x="6791365" y="7111218"/>
+            <a:off x="6681888" y="4969235"/>
             <a:ext cx="762000" cy="762000"/>
           </a:xfrm>
           <a:prstGeom prst="rect">
@@ -8002,7 +6707,7 @@
         </p:nvSpPr>
         <p:spPr bwMode="auto">
           <a:xfrm>
-            <a:off x="6051590" y="7874810"/>
+            <a:off x="5942113" y="5732830"/>
             <a:ext cx="2239962" cy="276999"/>
           </a:xfrm>
           <a:prstGeom prst="rect">
@@ -8162,7 +6867,7 @@
           <p:nvPr/>
         </p:nvPicPr>
         <p:blipFill>
-          <a:blip r:embed="rId23">
+          <a:blip r:embed="rId20">
             <a:extLst>
               <a:ext uri="{28A0092B-C50C-407E-A947-70E740481C1C}">
                 <a14:useLocalDpi xmlns:a14="http://schemas.microsoft.com/office/drawing/2010/main" val="0"/>
@@ -8176,7 +6881,7 @@
         </p:blipFill>
         <p:spPr bwMode="auto">
           <a:xfrm>
-            <a:off x="8417491" y="7107356"/>
+            <a:off x="8308014" y="4965373"/>
             <a:ext cx="762000" cy="762000"/>
           </a:xfrm>
           <a:prstGeom prst="rect">
@@ -8223,7 +6928,7 @@
         </p:nvSpPr>
         <p:spPr bwMode="auto">
           <a:xfrm>
-            <a:off x="7677721" y="7870948"/>
+            <a:off x="7568247" y="5728968"/>
             <a:ext cx="2243137" cy="276999"/>
           </a:xfrm>
           <a:prstGeom prst="rect">
@@ -8383,7 +7088,7 @@
           <p:nvPr/>
         </p:nvPicPr>
         <p:blipFill>
-          <a:blip r:embed="rId24">
+          <a:blip r:embed="rId21">
             <a:extLst>
               <a:ext uri="{28A0092B-C50C-407E-A947-70E740481C1C}">
                 <a14:useLocalDpi xmlns:a14="http://schemas.microsoft.com/office/drawing/2010/main" val="0"/>
@@ -8397,7 +7102,7 @@
         </p:blipFill>
         <p:spPr bwMode="auto">
           <a:xfrm>
-            <a:off x="10045658" y="7114115"/>
+            <a:off x="9936181" y="4972132"/>
             <a:ext cx="762000" cy="762000"/>
           </a:xfrm>
           <a:prstGeom prst="rect">
@@ -8444,7 +7149,7 @@
         </p:nvSpPr>
         <p:spPr bwMode="auto">
           <a:xfrm>
-            <a:off x="9366445" y="7862944"/>
+            <a:off x="9256971" y="5720964"/>
             <a:ext cx="2243137" cy="276999"/>
           </a:xfrm>
           <a:prstGeom prst="rect">
@@ -8604,7 +7309,7 @@
           <p:nvPr/>
         </p:nvPicPr>
         <p:blipFill>
-          <a:blip r:embed="rId25">
+          <a:blip r:embed="rId22">
             <a:extLst>
               <a:ext uri="{28A0092B-C50C-407E-A947-70E740481C1C}">
                 <a14:useLocalDpi xmlns:a14="http://schemas.microsoft.com/office/drawing/2010/main" val="0"/>
@@ -8618,7 +7323,7 @@
         </p:blipFill>
         <p:spPr bwMode="auto">
           <a:xfrm>
-            <a:off x="3370544" y="7114115"/>
+            <a:off x="3261067" y="4972132"/>
             <a:ext cx="762000" cy="762000"/>
           </a:xfrm>
           <a:prstGeom prst="rect">
@@ -8665,7 +7370,7 @@
         </p:nvSpPr>
         <p:spPr bwMode="auto">
           <a:xfrm>
-            <a:off x="2609695" y="7881908"/>
+            <a:off x="2500218" y="5739928"/>
             <a:ext cx="2279650" cy="276999"/>
           </a:xfrm>
           <a:prstGeom prst="rect">
@@ -8805,7 +7510,7 @@
         </p:nvSpPr>
         <p:spPr bwMode="auto">
           <a:xfrm>
-            <a:off x="1088862" y="5618582"/>
+            <a:off x="979385" y="3476599"/>
             <a:ext cx="1270000" cy="261610"/>
           </a:xfrm>
           <a:prstGeom prst="rect">
@@ -8965,10 +7670,10 @@
           <p:nvPr/>
         </p:nvPicPr>
         <p:blipFill>
-          <a:blip r:embed="rId26">
+          <a:blip r:embed="rId23">
             <a:extLst>
               <a:ext uri="{96DAC541-7B7A-43D3-8B79-37D633B846F1}">
-                <asvg:svgBlip xmlns:asvg="http://schemas.microsoft.com/office/drawing/2016/SVG/main" r:embed="rId27"/>
+                <asvg:svgBlip xmlns:asvg="http://schemas.microsoft.com/office/drawing/2016/SVG/main" r:embed="rId24"/>
               </a:ext>
             </a:extLst>
           </a:blip>
@@ -8977,7 +7682,7 @@
         </p:blipFill>
         <p:spPr bwMode="auto">
           <a:xfrm>
-            <a:off x="1513652" y="5148091"/>
+            <a:off x="1404175" y="3006108"/>
             <a:ext cx="457200" cy="457200"/>
           </a:xfrm>
           <a:prstGeom prst="rect">
@@ -9023,10 +7728,10 @@
           <p:nvPr/>
         </p:nvPicPr>
         <p:blipFill>
-          <a:blip r:embed="rId28">
+          <a:blip r:embed="rId25">
             <a:extLst>
               <a:ext uri="{96DAC541-7B7A-43D3-8B79-37D633B846F1}">
-                <asvg:svgBlip xmlns:asvg="http://schemas.microsoft.com/office/drawing/2016/SVG/main" r:embed="rId29"/>
+                <asvg:svgBlip xmlns:asvg="http://schemas.microsoft.com/office/drawing/2016/SVG/main" r:embed="rId26"/>
               </a:ext>
             </a:extLst>
           </a:blip>
@@ -9035,7 +7740,7 @@
         </p:blipFill>
         <p:spPr bwMode="auto">
           <a:xfrm flipH="1">
-            <a:off x="318684" y="5141741"/>
+            <a:off x="209207" y="2999758"/>
             <a:ext cx="469900" cy="469900"/>
           </a:xfrm>
           <a:prstGeom prst="rect">
@@ -9082,7 +7787,7 @@
         </p:nvSpPr>
         <p:spPr bwMode="auto">
           <a:xfrm>
-            <a:off x="13330" y="5617402"/>
+            <a:off x="-105185" y="3449938"/>
             <a:ext cx="1073150" cy="261610"/>
           </a:xfrm>
           <a:prstGeom prst="rect">
@@ -9229,227 +7934,6 @@
           </a:p>
         </p:txBody>
       </p:sp>
-      <p:pic>
-        <p:nvPicPr>
-          <p:cNvPr id="272" name="Graphic 22">
-            <a:extLst>
-              <a:ext uri="{FF2B5EF4-FFF2-40B4-BE49-F238E27FC236}">
-                <a16:creationId xmlns:a16="http://schemas.microsoft.com/office/drawing/2014/main" id="{AEF8713F-70F0-2E6F-1AE7-479F17899F3A}"/>
-              </a:ext>
-            </a:extLst>
-          </p:cNvPr>
-          <p:cNvPicPr>
-            <a:picLocks noChangeAspect="1" noChangeArrowheads="1"/>
-          </p:cNvPicPr>
-          <p:nvPr/>
-        </p:nvPicPr>
-        <p:blipFill>
-          <a:blip r:embed="rId30">
-            <a:extLst>
-              <a:ext uri="{96DAC541-7B7A-43D3-8B79-37D633B846F1}">
-                <asvg:svgBlip xmlns:asvg="http://schemas.microsoft.com/office/drawing/2016/SVG/main" r:embed="rId31"/>
-              </a:ext>
-            </a:extLst>
-          </a:blip>
-          <a:srcRect/>
-          <a:stretch/>
-        </p:blipFill>
-        <p:spPr bwMode="auto">
-          <a:xfrm>
-            <a:off x="388726" y="1994550"/>
-            <a:ext cx="469900" cy="469900"/>
-          </a:xfrm>
-          <a:prstGeom prst="rect">
-            <a:avLst/>
-          </a:prstGeom>
-          <a:noFill/>
-          <a:ln>
-            <a:noFill/>
-          </a:ln>
-          <a:extLst>
-            <a:ext uri="{909E8E84-426E-40DD-AFC4-6F175D3DCCD1}">
-              <a14:hiddenFill xmlns:a14="http://schemas.microsoft.com/office/drawing/2010/main">
-                <a:solidFill>
-                  <a:srgbClr val="FFFFFF"/>
-                </a:solidFill>
-              </a14:hiddenFill>
-            </a:ext>
-            <a:ext uri="{91240B29-F687-4F45-9708-019B960494DF}">
-              <a14:hiddenLine xmlns:a14="http://schemas.microsoft.com/office/drawing/2010/main" w="9525">
-                <a:solidFill>
-                  <a:srgbClr val="000000"/>
-                </a:solidFill>
-                <a:miter lim="800000"/>
-                <a:headEnd/>
-                <a:tailEnd/>
-              </a14:hiddenLine>
-            </a:ext>
-          </a:extLst>
-        </p:spPr>
-      </p:pic>
-      <p:sp>
-        <p:nvSpPr>
-          <p:cNvPr id="273" name="TextBox 39">
-            <a:extLst>
-              <a:ext uri="{FF2B5EF4-FFF2-40B4-BE49-F238E27FC236}">
-                <a16:creationId xmlns:a16="http://schemas.microsoft.com/office/drawing/2014/main" id="{233AB1E3-0A3C-1F6F-969F-D1C7C1689758}"/>
-              </a:ext>
-            </a:extLst>
-          </p:cNvPr>
-          <p:cNvSpPr txBox="1">
-            <a:spLocks noChangeArrowheads="1"/>
-          </p:cNvSpPr>
-          <p:nvPr/>
-        </p:nvSpPr>
-        <p:spPr bwMode="auto">
-          <a:xfrm>
-            <a:off x="87101" y="2540540"/>
-            <a:ext cx="1073150" cy="261610"/>
-          </a:xfrm>
-          <a:prstGeom prst="rect">
-            <a:avLst/>
-          </a:prstGeom>
-          <a:noFill/>
-          <a:ln>
-            <a:noFill/>
-          </a:ln>
-          <a:extLst>
-            <a:ext uri="{909E8E84-426E-40DD-AFC4-6F175D3DCCD1}">
-              <a14:hiddenFill xmlns:a14="http://schemas.microsoft.com/office/drawing/2010/main">
-                <a:solidFill>
-                  <a:srgbClr val="FFFFFF"/>
-                </a:solidFill>
-              </a14:hiddenFill>
-            </a:ext>
-            <a:ext uri="{91240B29-F687-4F45-9708-019B960494DF}">
-              <a14:hiddenLine xmlns:a14="http://schemas.microsoft.com/office/drawing/2010/main" w="9525">
-                <a:solidFill>
-                  <a:srgbClr val="000000"/>
-                </a:solidFill>
-                <a:miter lim="800000"/>
-                <a:headEnd/>
-                <a:tailEnd/>
-              </a14:hiddenLine>
-            </a:ext>
-          </a:extLst>
-        </p:spPr>
-        <p:txBody>
-          <a:bodyPr>
-            <a:spAutoFit/>
-          </a:bodyPr>
-          <a:lstStyle>
-            <a:lvl1pPr>
-              <a:defRPr>
-                <a:solidFill>
-                  <a:schemeClr val="tx1"/>
-                </a:solidFill>
-                <a:latin typeface="Calibri" panose="020F0502020204030204" pitchFamily="34" charset="0"/>
-              </a:defRPr>
-            </a:lvl1pPr>
-            <a:lvl2pPr marL="742950" indent="-285750">
-              <a:defRPr>
-                <a:solidFill>
-                  <a:schemeClr val="tx1"/>
-                </a:solidFill>
-                <a:latin typeface="Calibri" panose="020F0502020204030204" pitchFamily="34" charset="0"/>
-              </a:defRPr>
-            </a:lvl2pPr>
-            <a:lvl3pPr marL="1143000" indent="-228600">
-              <a:defRPr>
-                <a:solidFill>
-                  <a:schemeClr val="tx1"/>
-                </a:solidFill>
-                <a:latin typeface="Calibri" panose="020F0502020204030204" pitchFamily="34" charset="0"/>
-              </a:defRPr>
-            </a:lvl3pPr>
-            <a:lvl4pPr marL="1600200" indent="-228600">
-              <a:defRPr>
-                <a:solidFill>
-                  <a:schemeClr val="tx1"/>
-                </a:solidFill>
-                <a:latin typeface="Calibri" panose="020F0502020204030204" pitchFamily="34" charset="0"/>
-              </a:defRPr>
-            </a:lvl4pPr>
-            <a:lvl5pPr marL="2057400" indent="-228600">
-              <a:defRPr>
-                <a:solidFill>
-                  <a:schemeClr val="tx1"/>
-                </a:solidFill>
-                <a:latin typeface="Calibri" panose="020F0502020204030204" pitchFamily="34" charset="0"/>
-              </a:defRPr>
-            </a:lvl5pPr>
-            <a:lvl6pPr marL="2514600" indent="-228600" eaLnBrk="0" fontAlgn="base" hangingPunct="0">
-              <a:spcBef>
-                <a:spcPct val="0"/>
-              </a:spcBef>
-              <a:spcAft>
-                <a:spcPct val="0"/>
-              </a:spcAft>
-              <a:defRPr>
-                <a:solidFill>
-                  <a:schemeClr val="tx1"/>
-                </a:solidFill>
-                <a:latin typeface="Calibri" panose="020F0502020204030204" pitchFamily="34" charset="0"/>
-              </a:defRPr>
-            </a:lvl6pPr>
-            <a:lvl7pPr marL="2971800" indent="-228600" eaLnBrk="0" fontAlgn="base" hangingPunct="0">
-              <a:spcBef>
-                <a:spcPct val="0"/>
-              </a:spcBef>
-              <a:spcAft>
-                <a:spcPct val="0"/>
-              </a:spcAft>
-              <a:defRPr>
-                <a:solidFill>
-                  <a:schemeClr val="tx1"/>
-                </a:solidFill>
-                <a:latin typeface="Calibri" panose="020F0502020204030204" pitchFamily="34" charset="0"/>
-              </a:defRPr>
-            </a:lvl7pPr>
-            <a:lvl8pPr marL="3429000" indent="-228600" eaLnBrk="0" fontAlgn="base" hangingPunct="0">
-              <a:spcBef>
-                <a:spcPct val="0"/>
-              </a:spcBef>
-              <a:spcAft>
-                <a:spcPct val="0"/>
-              </a:spcAft>
-              <a:defRPr>
-                <a:solidFill>
-                  <a:schemeClr val="tx1"/>
-                </a:solidFill>
-                <a:latin typeface="Calibri" panose="020F0502020204030204" pitchFamily="34" charset="0"/>
-              </a:defRPr>
-            </a:lvl8pPr>
-            <a:lvl9pPr marL="3886200" indent="-228600" eaLnBrk="0" fontAlgn="base" hangingPunct="0">
-              <a:spcBef>
-                <a:spcPct val="0"/>
-              </a:spcBef>
-              <a:spcAft>
-                <a:spcPct val="0"/>
-              </a:spcAft>
-              <a:defRPr>
-                <a:solidFill>
-                  <a:schemeClr val="tx1"/>
-                </a:solidFill>
-                <a:latin typeface="Calibri" panose="020F0502020204030204" pitchFamily="34" charset="0"/>
-              </a:defRPr>
-            </a:lvl9pPr>
-          </a:lstStyle>
-          <a:p>
-            <a:pPr algn="ctr" eaLnBrk="1" hangingPunct="1"/>
-            <a:r>
-              <a:rPr lang="en-US" altLang="en-US" sz="1100" dirty="0">
-                <a:solidFill>
-                  <a:srgbClr val="000000"/>
-                </a:solidFill>
-                <a:latin typeface="Arial" panose="020B0604020202020204" pitchFamily="34" charset="0"/>
-                <a:cs typeface="Arial" panose="020B0604020202020204" pitchFamily="34" charset="0"/>
-              </a:rPr>
-              <a:t>User</a:t>
-            </a:r>
-          </a:p>
-        </p:txBody>
-      </p:sp>
       <p:cxnSp>
         <p:nvCxnSpPr>
           <p:cNvPr id="282" name="Straight Arrow Connector 281">
@@ -9468,7 +7952,7 @@
         </p:nvCxnSpPr>
         <p:spPr>
           <a:xfrm>
-            <a:off x="788584" y="5376691"/>
+            <a:off x="679107" y="3234708"/>
             <a:ext cx="725068" cy="0"/>
           </a:xfrm>
           <a:prstGeom prst="straightConnector1">
@@ -9515,7 +7999,7 @@
         </p:nvCxnSpPr>
         <p:spPr>
           <a:xfrm>
-            <a:off x="1970852" y="5376691"/>
+            <a:off x="1861375" y="3234708"/>
             <a:ext cx="474754" cy="2542"/>
           </a:xfrm>
           <a:prstGeom prst="straightConnector1">
@@ -9559,7 +8043,7 @@
           <p:nvPr/>
         </p:nvPicPr>
         <p:blipFill>
-          <a:blip r:embed="rId32">
+          <a:blip r:embed="rId27">
             <a:extLst>
               <a:ext uri="{28A0092B-C50C-407E-A947-70E740481C1C}">
                 <a14:useLocalDpi xmlns:a14="http://schemas.microsoft.com/office/drawing/2010/main" val="0"/>
@@ -9573,7 +8057,7 @@
         </p:blipFill>
         <p:spPr bwMode="auto">
           <a:xfrm>
-            <a:off x="11484173" y="7112101"/>
+            <a:off x="11374696" y="4970118"/>
             <a:ext cx="762000" cy="762000"/>
           </a:xfrm>
           <a:prstGeom prst="rect">
@@ -9620,7 +8104,7 @@
         </p:nvSpPr>
         <p:spPr bwMode="auto">
           <a:xfrm>
-            <a:off x="10750982" y="7848360"/>
+            <a:off x="10641505" y="5706380"/>
             <a:ext cx="2281238" cy="276999"/>
           </a:xfrm>
           <a:prstGeom prst="rect">

</xml_diff>

<commit_message>
Update monitoring and logging related documentation.
</commit_message>
<xml_diff>
--- a/doc/deployment_guide/images/terraform-mendix-private-cloud-diagram.pptx
+++ b/doc/deployment_guide/images/terraform-mendix-private-cloud-diagram.pptx
@@ -243,7 +243,7 @@
           <a:p>
             <a:fld id="{87F3BBB2-E533-43A8-AA78-2DC6FC5FE5A0}" type="datetimeFigureOut">
               <a:rPr lang="en-US" smtClean="0"/>
-              <a:t>1/30/2023</a:t>
+              <a:t>11/14/23</a:t>
             </a:fld>
             <a:endParaRPr lang="en-US" dirty="0"/>
           </a:p>
@@ -413,7 +413,7 @@
           <a:p>
             <a:fld id="{87F3BBB2-E533-43A8-AA78-2DC6FC5FE5A0}" type="datetimeFigureOut">
               <a:rPr lang="en-US" smtClean="0"/>
-              <a:t>1/30/2023</a:t>
+              <a:t>11/14/23</a:t>
             </a:fld>
             <a:endParaRPr lang="en-US" dirty="0"/>
           </a:p>
@@ -593,7 +593,7 @@
           <a:p>
             <a:fld id="{87F3BBB2-E533-43A8-AA78-2DC6FC5FE5A0}" type="datetimeFigureOut">
               <a:rPr lang="en-US" smtClean="0"/>
-              <a:t>1/30/2023</a:t>
+              <a:t>11/14/23</a:t>
             </a:fld>
             <a:endParaRPr lang="en-US" dirty="0"/>
           </a:p>
@@ -763,7 +763,7 @@
           <a:p>
             <a:fld id="{87F3BBB2-E533-43A8-AA78-2DC6FC5FE5A0}" type="datetimeFigureOut">
               <a:rPr lang="en-US" smtClean="0"/>
-              <a:t>1/30/2023</a:t>
+              <a:t>11/14/23</a:t>
             </a:fld>
             <a:endParaRPr lang="en-US" dirty="0"/>
           </a:p>
@@ -1009,7 +1009,7 @@
           <a:p>
             <a:fld id="{87F3BBB2-E533-43A8-AA78-2DC6FC5FE5A0}" type="datetimeFigureOut">
               <a:rPr lang="en-US" smtClean="0"/>
-              <a:t>1/30/2023</a:t>
+              <a:t>11/14/23</a:t>
             </a:fld>
             <a:endParaRPr lang="en-US" dirty="0"/>
           </a:p>
@@ -1241,7 +1241,7 @@
           <a:p>
             <a:fld id="{87F3BBB2-E533-43A8-AA78-2DC6FC5FE5A0}" type="datetimeFigureOut">
               <a:rPr lang="en-US" smtClean="0"/>
-              <a:t>1/30/2023</a:t>
+              <a:t>11/14/23</a:t>
             </a:fld>
             <a:endParaRPr lang="en-US" dirty="0"/>
           </a:p>
@@ -1608,7 +1608,7 @@
           <a:p>
             <a:fld id="{87F3BBB2-E533-43A8-AA78-2DC6FC5FE5A0}" type="datetimeFigureOut">
               <a:rPr lang="en-US" smtClean="0"/>
-              <a:t>1/30/2023</a:t>
+              <a:t>11/14/23</a:t>
             </a:fld>
             <a:endParaRPr lang="en-US" dirty="0"/>
           </a:p>
@@ -1726,7 +1726,7 @@
           <a:p>
             <a:fld id="{87F3BBB2-E533-43A8-AA78-2DC6FC5FE5A0}" type="datetimeFigureOut">
               <a:rPr lang="en-US" smtClean="0"/>
-              <a:t>1/30/2023</a:t>
+              <a:t>11/14/23</a:t>
             </a:fld>
             <a:endParaRPr lang="en-US" dirty="0"/>
           </a:p>
@@ -1821,7 +1821,7 @@
           <a:p>
             <a:fld id="{87F3BBB2-E533-43A8-AA78-2DC6FC5FE5A0}" type="datetimeFigureOut">
               <a:rPr lang="en-US" smtClean="0"/>
-              <a:t>1/30/2023</a:t>
+              <a:t>11/14/23</a:t>
             </a:fld>
             <a:endParaRPr lang="en-US" dirty="0"/>
           </a:p>
@@ -2098,7 +2098,7 @@
           <a:p>
             <a:fld id="{87F3BBB2-E533-43A8-AA78-2DC6FC5FE5A0}" type="datetimeFigureOut">
               <a:rPr lang="en-US" smtClean="0"/>
-              <a:t>1/30/2023</a:t>
+              <a:t>11/14/23</a:t>
             </a:fld>
             <a:endParaRPr lang="en-US" dirty="0"/>
           </a:p>
@@ -2355,7 +2355,7 @@
           <a:p>
             <a:fld id="{87F3BBB2-E533-43A8-AA78-2DC6FC5FE5A0}" type="datetimeFigureOut">
               <a:rPr lang="en-US" smtClean="0"/>
-              <a:t>1/30/2023</a:t>
+              <a:t>11/14/23</a:t>
             </a:fld>
             <a:endParaRPr lang="en-US" dirty="0"/>
           </a:p>
@@ -2568,7 +2568,7 @@
           <a:p>
             <a:fld id="{87F3BBB2-E533-43A8-AA78-2DC6FC5FE5A0}" type="datetimeFigureOut">
               <a:rPr lang="en-US" smtClean="0"/>
-              <a:t>1/30/2023</a:t>
+              <a:t>11/14/23</a:t>
             </a:fld>
             <a:endParaRPr lang="en-US" dirty="0"/>
           </a:p>
@@ -4451,7 +4451,7 @@
         </p:blipFill>
         <p:spPr bwMode="auto">
           <a:xfrm>
-            <a:off x="9945938" y="4792048"/>
+            <a:off x="8443548" y="4781348"/>
             <a:ext cx="762000" cy="762000"/>
           </a:xfrm>
           <a:prstGeom prst="rect">
@@ -4498,7 +4498,7 @@
         </p:nvSpPr>
         <p:spPr bwMode="auto">
           <a:xfrm>
-            <a:off x="9674568" y="5558222"/>
+            <a:off x="8172178" y="5547522"/>
             <a:ext cx="1346444" cy="276999"/>
           </a:xfrm>
           <a:prstGeom prst="rect">
@@ -4672,7 +4672,7 @@
         </p:blipFill>
         <p:spPr bwMode="auto">
           <a:xfrm>
-            <a:off x="8638287" y="4792048"/>
+            <a:off x="7135897" y="4781348"/>
             <a:ext cx="762000" cy="762000"/>
           </a:xfrm>
           <a:prstGeom prst="rect">
@@ -4719,7 +4719,7 @@
         </p:nvSpPr>
         <p:spPr bwMode="auto">
           <a:xfrm>
-            <a:off x="8471927" y="5558222"/>
+            <a:off x="6969537" y="5547522"/>
             <a:ext cx="1133980" cy="276999"/>
           </a:xfrm>
           <a:prstGeom prst="rect">
@@ -5944,7 +5944,7 @@
         </p:blipFill>
         <p:spPr bwMode="auto">
           <a:xfrm>
-            <a:off x="3419175" y="4792048"/>
+            <a:off x="1916785" y="4781348"/>
             <a:ext cx="762000" cy="762000"/>
           </a:xfrm>
           <a:prstGeom prst="rect">
@@ -5991,7 +5991,7 @@
         </p:nvSpPr>
         <p:spPr bwMode="auto">
           <a:xfrm>
-            <a:off x="3282332" y="5558222"/>
+            <a:off x="1779942" y="5547522"/>
             <a:ext cx="1035687" cy="276999"/>
           </a:xfrm>
           <a:prstGeom prst="rect">
@@ -6165,7 +6165,7 @@
         </p:blipFill>
         <p:spPr bwMode="auto">
           <a:xfrm>
-            <a:off x="4724912" y="4792048"/>
+            <a:off x="3222522" y="4781348"/>
             <a:ext cx="762000" cy="762000"/>
           </a:xfrm>
           <a:prstGeom prst="rect">
@@ -6212,7 +6212,7 @@
         </p:nvSpPr>
         <p:spPr bwMode="auto">
           <a:xfrm>
-            <a:off x="4488915" y="5558222"/>
+            <a:off x="2986525" y="5547522"/>
             <a:ext cx="1233994" cy="276999"/>
           </a:xfrm>
           <a:prstGeom prst="rect">
@@ -6386,7 +6386,7 @@
         </p:blipFill>
         <p:spPr bwMode="auto">
           <a:xfrm>
-            <a:off x="6034473" y="4792048"/>
+            <a:off x="4532083" y="4781348"/>
             <a:ext cx="762000" cy="762000"/>
           </a:xfrm>
           <a:prstGeom prst="rect">
@@ -6433,7 +6433,7 @@
         </p:nvSpPr>
         <p:spPr bwMode="auto">
           <a:xfrm>
-            <a:off x="5829489" y="5558222"/>
+            <a:off x="4327099" y="5547522"/>
             <a:ext cx="1175109" cy="276999"/>
           </a:xfrm>
           <a:prstGeom prst="rect">
@@ -7156,7 +7156,7 @@
         </p:blipFill>
         <p:spPr bwMode="auto">
           <a:xfrm>
-            <a:off x="7342122" y="4792048"/>
+            <a:off x="5839732" y="4781348"/>
             <a:ext cx="762000" cy="762000"/>
           </a:xfrm>
           <a:prstGeom prst="rect">
@@ -7203,7 +7203,7 @@
         </p:nvSpPr>
         <p:spPr bwMode="auto">
           <a:xfrm>
-            <a:off x="7073565" y="5558222"/>
+            <a:off x="5571175" y="5547522"/>
             <a:ext cx="1333117" cy="276999"/>
           </a:xfrm>
           <a:prstGeom prst="rect">
@@ -7453,6 +7453,450 @@
           </a:prstGeom>
         </p:spPr>
       </p:pic>
+      <p:pic>
+        <p:nvPicPr>
+          <p:cNvPr id="9" name="Graphic 17">
+            <a:extLst>
+              <a:ext uri="{FF2B5EF4-FFF2-40B4-BE49-F238E27FC236}">
+                <a16:creationId xmlns:a16="http://schemas.microsoft.com/office/drawing/2014/main" id="{5F084505-D9F0-61A9-F328-C7D3678518A4}"/>
+              </a:ext>
+            </a:extLst>
+          </p:cNvPr>
+          <p:cNvPicPr>
+            <a:picLocks noChangeAspect="1" noChangeArrowheads="1"/>
+          </p:cNvPicPr>
+          <p:nvPr/>
+        </p:nvPicPr>
+        <p:blipFill>
+          <a:blip r:embed="rId25">
+            <a:extLst>
+              <a:ext uri="{28A0092B-C50C-407E-A947-70E740481C1C}">
+                <a14:useLocalDpi xmlns:a14="http://schemas.microsoft.com/office/drawing/2010/main" val="0"/>
+              </a:ext>
+              <a:ext uri="{96DAC541-7B7A-43D3-8B79-37D633B846F1}">
+                <asvg:svgBlip xmlns:asvg="http://schemas.microsoft.com/office/drawing/2016/SVG/main" r:embed="rId26"/>
+              </a:ext>
+            </a:extLst>
+          </a:blip>
+          <a:srcRect/>
+          <a:stretch/>
+        </p:blipFill>
+        <p:spPr bwMode="auto">
+          <a:xfrm>
+            <a:off x="9753107" y="4783546"/>
+            <a:ext cx="762000" cy="762000"/>
+          </a:xfrm>
+          <a:prstGeom prst="rect">
+            <a:avLst/>
+          </a:prstGeom>
+          <a:noFill/>
+          <a:ln>
+            <a:noFill/>
+          </a:ln>
+          <a:extLst>
+            <a:ext uri="{909E8E84-426E-40DD-AFC4-6F175D3DCCD1}">
+              <a14:hiddenFill xmlns:a14="http://schemas.microsoft.com/office/drawing/2010/main">
+                <a:solidFill>
+                  <a:srgbClr val="FFFFFF"/>
+                </a:solidFill>
+              </a14:hiddenFill>
+            </a:ext>
+            <a:ext uri="{91240B29-F687-4F45-9708-019B960494DF}">
+              <a14:hiddenLine xmlns:a14="http://schemas.microsoft.com/office/drawing/2010/main" w="9525">
+                <a:solidFill>
+                  <a:srgbClr val="000000"/>
+                </a:solidFill>
+                <a:miter lim="800000"/>
+                <a:headEnd/>
+                <a:tailEnd/>
+              </a14:hiddenLine>
+            </a:ext>
+          </a:extLst>
+        </p:spPr>
+      </p:pic>
+      <p:sp>
+        <p:nvSpPr>
+          <p:cNvPr id="16" name="TextBox 11">
+            <a:extLst>
+              <a:ext uri="{FF2B5EF4-FFF2-40B4-BE49-F238E27FC236}">
+                <a16:creationId xmlns:a16="http://schemas.microsoft.com/office/drawing/2014/main" id="{BFF2C928-CB79-2C9B-316D-A4B08B017539}"/>
+              </a:ext>
+            </a:extLst>
+          </p:cNvPr>
+          <p:cNvSpPr txBox="1">
+            <a:spLocks noChangeArrowheads="1"/>
+          </p:cNvSpPr>
+          <p:nvPr/>
+        </p:nvSpPr>
+        <p:spPr bwMode="auto">
+          <a:xfrm>
+            <a:off x="9440763" y="5547522"/>
+            <a:ext cx="1443072" cy="276999"/>
+          </a:xfrm>
+          <a:prstGeom prst="rect">
+            <a:avLst/>
+          </a:prstGeom>
+          <a:noFill/>
+          <a:ln>
+            <a:noFill/>
+          </a:ln>
+          <a:extLst>
+            <a:ext uri="{909E8E84-426E-40DD-AFC4-6F175D3DCCD1}">
+              <a14:hiddenFill xmlns:a14="http://schemas.microsoft.com/office/drawing/2010/main">
+                <a:solidFill>
+                  <a:srgbClr val="FFFFFF"/>
+                </a:solidFill>
+              </a14:hiddenFill>
+            </a:ext>
+            <a:ext uri="{91240B29-F687-4F45-9708-019B960494DF}">
+              <a14:hiddenLine xmlns:a14="http://schemas.microsoft.com/office/drawing/2010/main" w="9525">
+                <a:solidFill>
+                  <a:srgbClr val="000000"/>
+                </a:solidFill>
+                <a:miter lim="800000"/>
+                <a:headEnd/>
+                <a:tailEnd/>
+              </a14:hiddenLine>
+            </a:ext>
+          </a:extLst>
+        </p:spPr>
+        <p:txBody>
+          <a:bodyPr wrap="square">
+            <a:spAutoFit/>
+          </a:bodyPr>
+          <a:lstStyle>
+            <a:lvl1pPr>
+              <a:defRPr>
+                <a:solidFill>
+                  <a:schemeClr val="tx1"/>
+                </a:solidFill>
+                <a:latin typeface="Calibri" panose="020F0502020204030204" pitchFamily="34" charset="0"/>
+              </a:defRPr>
+            </a:lvl1pPr>
+            <a:lvl2pPr marL="742950" indent="-285750">
+              <a:defRPr>
+                <a:solidFill>
+                  <a:schemeClr val="tx1"/>
+                </a:solidFill>
+                <a:latin typeface="Calibri" panose="020F0502020204030204" pitchFamily="34" charset="0"/>
+              </a:defRPr>
+            </a:lvl2pPr>
+            <a:lvl3pPr marL="1143000" indent="-228600">
+              <a:defRPr>
+                <a:solidFill>
+                  <a:schemeClr val="tx1"/>
+                </a:solidFill>
+                <a:latin typeface="Calibri" panose="020F0502020204030204" pitchFamily="34" charset="0"/>
+              </a:defRPr>
+            </a:lvl3pPr>
+            <a:lvl4pPr marL="1600200" indent="-228600">
+              <a:defRPr>
+                <a:solidFill>
+                  <a:schemeClr val="tx1"/>
+                </a:solidFill>
+                <a:latin typeface="Calibri" panose="020F0502020204030204" pitchFamily="34" charset="0"/>
+              </a:defRPr>
+            </a:lvl4pPr>
+            <a:lvl5pPr marL="2057400" indent="-228600">
+              <a:defRPr>
+                <a:solidFill>
+                  <a:schemeClr val="tx1"/>
+                </a:solidFill>
+                <a:latin typeface="Calibri" panose="020F0502020204030204" pitchFamily="34" charset="0"/>
+              </a:defRPr>
+            </a:lvl5pPr>
+            <a:lvl6pPr marL="2514600" indent="-228600" eaLnBrk="0" fontAlgn="base" hangingPunct="0">
+              <a:spcBef>
+                <a:spcPct val="0"/>
+              </a:spcBef>
+              <a:spcAft>
+                <a:spcPct val="0"/>
+              </a:spcAft>
+              <a:defRPr>
+                <a:solidFill>
+                  <a:schemeClr val="tx1"/>
+                </a:solidFill>
+                <a:latin typeface="Calibri" panose="020F0502020204030204" pitchFamily="34" charset="0"/>
+              </a:defRPr>
+            </a:lvl6pPr>
+            <a:lvl7pPr marL="2971800" indent="-228600" eaLnBrk="0" fontAlgn="base" hangingPunct="0">
+              <a:spcBef>
+                <a:spcPct val="0"/>
+              </a:spcBef>
+              <a:spcAft>
+                <a:spcPct val="0"/>
+              </a:spcAft>
+              <a:defRPr>
+                <a:solidFill>
+                  <a:schemeClr val="tx1"/>
+                </a:solidFill>
+                <a:latin typeface="Calibri" panose="020F0502020204030204" pitchFamily="34" charset="0"/>
+              </a:defRPr>
+            </a:lvl7pPr>
+            <a:lvl8pPr marL="3429000" indent="-228600" eaLnBrk="0" fontAlgn="base" hangingPunct="0">
+              <a:spcBef>
+                <a:spcPct val="0"/>
+              </a:spcBef>
+              <a:spcAft>
+                <a:spcPct val="0"/>
+              </a:spcAft>
+              <a:defRPr>
+                <a:solidFill>
+                  <a:schemeClr val="tx1"/>
+                </a:solidFill>
+                <a:latin typeface="Calibri" panose="020F0502020204030204" pitchFamily="34" charset="0"/>
+              </a:defRPr>
+            </a:lvl8pPr>
+            <a:lvl9pPr marL="3886200" indent="-228600" eaLnBrk="0" fontAlgn="base" hangingPunct="0">
+              <a:spcBef>
+                <a:spcPct val="0"/>
+              </a:spcBef>
+              <a:spcAft>
+                <a:spcPct val="0"/>
+              </a:spcAft>
+              <a:defRPr>
+                <a:solidFill>
+                  <a:schemeClr val="tx1"/>
+                </a:solidFill>
+                <a:latin typeface="Calibri" panose="020F0502020204030204" pitchFamily="34" charset="0"/>
+              </a:defRPr>
+            </a:lvl9pPr>
+          </a:lstStyle>
+          <a:p>
+            <a:pPr algn="ctr" eaLnBrk="1" hangingPunct="1"/>
+            <a:r>
+              <a:rPr lang="en-US" altLang="en-US" sz="1200" dirty="0">
+                <a:latin typeface="Arial" panose="020B0604020202020204" pitchFamily="34" charset="0"/>
+                <a:ea typeface="Amazon Ember" panose="020B0603020204020204" pitchFamily="34" charset="0"/>
+                <a:cs typeface="Arial" panose="020B0604020202020204" pitchFamily="34" charset="0"/>
+              </a:rPr>
+              <a:t>AWS Prometheus</a:t>
+            </a:r>
+          </a:p>
+        </p:txBody>
+      </p:sp>
+      <p:pic>
+        <p:nvPicPr>
+          <p:cNvPr id="22" name="Graphic 17">
+            <a:extLst>
+              <a:ext uri="{FF2B5EF4-FFF2-40B4-BE49-F238E27FC236}">
+                <a16:creationId xmlns:a16="http://schemas.microsoft.com/office/drawing/2014/main" id="{CE75F8BB-0D8E-D613-54EC-593CC651592F}"/>
+              </a:ext>
+            </a:extLst>
+          </p:cNvPr>
+          <p:cNvPicPr>
+            <a:picLocks noChangeAspect="1" noChangeArrowheads="1"/>
+          </p:cNvPicPr>
+          <p:nvPr/>
+        </p:nvPicPr>
+        <p:blipFill>
+          <a:blip r:embed="rId27">
+            <a:extLst>
+              <a:ext uri="{28A0092B-C50C-407E-A947-70E740481C1C}">
+                <a14:useLocalDpi xmlns:a14="http://schemas.microsoft.com/office/drawing/2010/main" val="0"/>
+              </a:ext>
+              <a:ext uri="{96DAC541-7B7A-43D3-8B79-37D633B846F1}">
+                <asvg:svgBlip xmlns:asvg="http://schemas.microsoft.com/office/drawing/2016/SVG/main" r:embed="rId28"/>
+              </a:ext>
+            </a:extLst>
+          </a:blip>
+          <a:srcRect/>
+          <a:stretch/>
+        </p:blipFill>
+        <p:spPr bwMode="auto">
+          <a:xfrm>
+            <a:off x="11047362" y="4777853"/>
+            <a:ext cx="762000" cy="762000"/>
+          </a:xfrm>
+          <a:prstGeom prst="rect">
+            <a:avLst/>
+          </a:prstGeom>
+          <a:noFill/>
+          <a:ln>
+            <a:noFill/>
+          </a:ln>
+          <a:extLst>
+            <a:ext uri="{909E8E84-426E-40DD-AFC4-6F175D3DCCD1}">
+              <a14:hiddenFill xmlns:a14="http://schemas.microsoft.com/office/drawing/2010/main">
+                <a:solidFill>
+                  <a:srgbClr val="FFFFFF"/>
+                </a:solidFill>
+              </a14:hiddenFill>
+            </a:ext>
+            <a:ext uri="{91240B29-F687-4F45-9708-019B960494DF}">
+              <a14:hiddenLine xmlns:a14="http://schemas.microsoft.com/office/drawing/2010/main" w="9525">
+                <a:solidFill>
+                  <a:srgbClr val="000000"/>
+                </a:solidFill>
+                <a:miter lim="800000"/>
+                <a:headEnd/>
+                <a:tailEnd/>
+              </a14:hiddenLine>
+            </a:ext>
+          </a:extLst>
+        </p:spPr>
+      </p:pic>
+      <p:sp>
+        <p:nvSpPr>
+          <p:cNvPr id="23" name="TextBox 11">
+            <a:extLst>
+              <a:ext uri="{FF2B5EF4-FFF2-40B4-BE49-F238E27FC236}">
+                <a16:creationId xmlns:a16="http://schemas.microsoft.com/office/drawing/2014/main" id="{D3802BB5-7816-50F9-BD49-F09C8950C3BD}"/>
+              </a:ext>
+            </a:extLst>
+          </p:cNvPr>
+          <p:cNvSpPr txBox="1">
+            <a:spLocks noChangeArrowheads="1"/>
+          </p:cNvSpPr>
+          <p:nvPr/>
+        </p:nvSpPr>
+        <p:spPr bwMode="auto">
+          <a:xfrm>
+            <a:off x="10702733" y="5547522"/>
+            <a:ext cx="1443072" cy="276999"/>
+          </a:xfrm>
+          <a:prstGeom prst="rect">
+            <a:avLst/>
+          </a:prstGeom>
+          <a:noFill/>
+          <a:ln>
+            <a:noFill/>
+          </a:ln>
+          <a:extLst>
+            <a:ext uri="{909E8E84-426E-40DD-AFC4-6F175D3DCCD1}">
+              <a14:hiddenFill xmlns:a14="http://schemas.microsoft.com/office/drawing/2010/main">
+                <a:solidFill>
+                  <a:srgbClr val="FFFFFF"/>
+                </a:solidFill>
+              </a14:hiddenFill>
+            </a:ext>
+            <a:ext uri="{91240B29-F687-4F45-9708-019B960494DF}">
+              <a14:hiddenLine xmlns:a14="http://schemas.microsoft.com/office/drawing/2010/main" w="9525">
+                <a:solidFill>
+                  <a:srgbClr val="000000"/>
+                </a:solidFill>
+                <a:miter lim="800000"/>
+                <a:headEnd/>
+                <a:tailEnd/>
+              </a14:hiddenLine>
+            </a:ext>
+          </a:extLst>
+        </p:spPr>
+        <p:txBody>
+          <a:bodyPr wrap="square">
+            <a:spAutoFit/>
+          </a:bodyPr>
+          <a:lstStyle>
+            <a:lvl1pPr>
+              <a:defRPr>
+                <a:solidFill>
+                  <a:schemeClr val="tx1"/>
+                </a:solidFill>
+                <a:latin typeface="Calibri" panose="020F0502020204030204" pitchFamily="34" charset="0"/>
+              </a:defRPr>
+            </a:lvl1pPr>
+            <a:lvl2pPr marL="742950" indent="-285750">
+              <a:defRPr>
+                <a:solidFill>
+                  <a:schemeClr val="tx1"/>
+                </a:solidFill>
+                <a:latin typeface="Calibri" panose="020F0502020204030204" pitchFamily="34" charset="0"/>
+              </a:defRPr>
+            </a:lvl2pPr>
+            <a:lvl3pPr marL="1143000" indent="-228600">
+              <a:defRPr>
+                <a:solidFill>
+                  <a:schemeClr val="tx1"/>
+                </a:solidFill>
+                <a:latin typeface="Calibri" panose="020F0502020204030204" pitchFamily="34" charset="0"/>
+              </a:defRPr>
+            </a:lvl3pPr>
+            <a:lvl4pPr marL="1600200" indent="-228600">
+              <a:defRPr>
+                <a:solidFill>
+                  <a:schemeClr val="tx1"/>
+                </a:solidFill>
+                <a:latin typeface="Calibri" panose="020F0502020204030204" pitchFamily="34" charset="0"/>
+              </a:defRPr>
+            </a:lvl4pPr>
+            <a:lvl5pPr marL="2057400" indent="-228600">
+              <a:defRPr>
+                <a:solidFill>
+                  <a:schemeClr val="tx1"/>
+                </a:solidFill>
+                <a:latin typeface="Calibri" panose="020F0502020204030204" pitchFamily="34" charset="0"/>
+              </a:defRPr>
+            </a:lvl5pPr>
+            <a:lvl6pPr marL="2514600" indent="-228600" eaLnBrk="0" fontAlgn="base" hangingPunct="0">
+              <a:spcBef>
+                <a:spcPct val="0"/>
+              </a:spcBef>
+              <a:spcAft>
+                <a:spcPct val="0"/>
+              </a:spcAft>
+              <a:defRPr>
+                <a:solidFill>
+                  <a:schemeClr val="tx1"/>
+                </a:solidFill>
+                <a:latin typeface="Calibri" panose="020F0502020204030204" pitchFamily="34" charset="0"/>
+              </a:defRPr>
+            </a:lvl6pPr>
+            <a:lvl7pPr marL="2971800" indent="-228600" eaLnBrk="0" fontAlgn="base" hangingPunct="0">
+              <a:spcBef>
+                <a:spcPct val="0"/>
+              </a:spcBef>
+              <a:spcAft>
+                <a:spcPct val="0"/>
+              </a:spcAft>
+              <a:defRPr>
+                <a:solidFill>
+                  <a:schemeClr val="tx1"/>
+                </a:solidFill>
+                <a:latin typeface="Calibri" panose="020F0502020204030204" pitchFamily="34" charset="0"/>
+              </a:defRPr>
+            </a:lvl7pPr>
+            <a:lvl8pPr marL="3429000" indent="-228600" eaLnBrk="0" fontAlgn="base" hangingPunct="0">
+              <a:spcBef>
+                <a:spcPct val="0"/>
+              </a:spcBef>
+              <a:spcAft>
+                <a:spcPct val="0"/>
+              </a:spcAft>
+              <a:defRPr>
+                <a:solidFill>
+                  <a:schemeClr val="tx1"/>
+                </a:solidFill>
+                <a:latin typeface="Calibri" panose="020F0502020204030204" pitchFamily="34" charset="0"/>
+              </a:defRPr>
+            </a:lvl8pPr>
+            <a:lvl9pPr marL="3886200" indent="-228600" eaLnBrk="0" fontAlgn="base" hangingPunct="0">
+              <a:spcBef>
+                <a:spcPct val="0"/>
+              </a:spcBef>
+              <a:spcAft>
+                <a:spcPct val="0"/>
+              </a:spcAft>
+              <a:defRPr>
+                <a:solidFill>
+                  <a:schemeClr val="tx1"/>
+                </a:solidFill>
+                <a:latin typeface="Calibri" panose="020F0502020204030204" pitchFamily="34" charset="0"/>
+              </a:defRPr>
+            </a:lvl9pPr>
+          </a:lstStyle>
+          <a:p>
+            <a:pPr algn="ctr" eaLnBrk="1" hangingPunct="1"/>
+            <a:r>
+              <a:rPr lang="en-US" altLang="en-US" sz="1200" dirty="0">
+                <a:latin typeface="Arial" panose="020B0604020202020204" pitchFamily="34" charset="0"/>
+                <a:ea typeface="Amazon Ember" panose="020B0603020204020204" pitchFamily="34" charset="0"/>
+                <a:cs typeface="Arial" panose="020B0604020202020204" pitchFamily="34" charset="0"/>
+              </a:rPr>
+              <a:t>CloudWatch</a:t>
+            </a:r>
+          </a:p>
+        </p:txBody>
+      </p:sp>
     </p:spTree>
     <p:extLst>
       <p:ext uri="{BB962C8B-B14F-4D97-AF65-F5344CB8AC3E}">

</xml_diff>

<commit_message>
Update diagram to show connection to the private cloud portal.
</commit_message>
<xml_diff>
--- a/doc/deployment_guide/images/terraform-mendix-private-cloud-diagram.pptx
+++ b/doc/deployment_guide/images/terraform-mendix-private-cloud-diagram.pptx
@@ -243,7 +243,7 @@
           <a:p>
             <a:fld id="{87F3BBB2-E533-43A8-AA78-2DC6FC5FE5A0}" type="datetimeFigureOut">
               <a:rPr lang="en-US" smtClean="0"/>
-              <a:t>11/14/23</a:t>
+              <a:t>4/28/25</a:t>
             </a:fld>
             <a:endParaRPr lang="en-US" dirty="0"/>
           </a:p>
@@ -413,7 +413,7 @@
           <a:p>
             <a:fld id="{87F3BBB2-E533-43A8-AA78-2DC6FC5FE5A0}" type="datetimeFigureOut">
               <a:rPr lang="en-US" smtClean="0"/>
-              <a:t>11/14/23</a:t>
+              <a:t>4/28/25</a:t>
             </a:fld>
             <a:endParaRPr lang="en-US" dirty="0"/>
           </a:p>
@@ -593,7 +593,7 @@
           <a:p>
             <a:fld id="{87F3BBB2-E533-43A8-AA78-2DC6FC5FE5A0}" type="datetimeFigureOut">
               <a:rPr lang="en-US" smtClean="0"/>
-              <a:t>11/14/23</a:t>
+              <a:t>4/28/25</a:t>
             </a:fld>
             <a:endParaRPr lang="en-US" dirty="0"/>
           </a:p>
@@ -763,7 +763,7 @@
           <a:p>
             <a:fld id="{87F3BBB2-E533-43A8-AA78-2DC6FC5FE5A0}" type="datetimeFigureOut">
               <a:rPr lang="en-US" smtClean="0"/>
-              <a:t>11/14/23</a:t>
+              <a:t>4/28/25</a:t>
             </a:fld>
             <a:endParaRPr lang="en-US" dirty="0"/>
           </a:p>
@@ -1009,7 +1009,7 @@
           <a:p>
             <a:fld id="{87F3BBB2-E533-43A8-AA78-2DC6FC5FE5A0}" type="datetimeFigureOut">
               <a:rPr lang="en-US" smtClean="0"/>
-              <a:t>11/14/23</a:t>
+              <a:t>4/28/25</a:t>
             </a:fld>
             <a:endParaRPr lang="en-US" dirty="0"/>
           </a:p>
@@ -1241,7 +1241,7 @@
           <a:p>
             <a:fld id="{87F3BBB2-E533-43A8-AA78-2DC6FC5FE5A0}" type="datetimeFigureOut">
               <a:rPr lang="en-US" smtClean="0"/>
-              <a:t>11/14/23</a:t>
+              <a:t>4/28/25</a:t>
             </a:fld>
             <a:endParaRPr lang="en-US" dirty="0"/>
           </a:p>
@@ -1608,7 +1608,7 @@
           <a:p>
             <a:fld id="{87F3BBB2-E533-43A8-AA78-2DC6FC5FE5A0}" type="datetimeFigureOut">
               <a:rPr lang="en-US" smtClean="0"/>
-              <a:t>11/14/23</a:t>
+              <a:t>4/28/25</a:t>
             </a:fld>
             <a:endParaRPr lang="en-US" dirty="0"/>
           </a:p>
@@ -1726,7 +1726,7 @@
           <a:p>
             <a:fld id="{87F3BBB2-E533-43A8-AA78-2DC6FC5FE5A0}" type="datetimeFigureOut">
               <a:rPr lang="en-US" smtClean="0"/>
-              <a:t>11/14/23</a:t>
+              <a:t>4/28/25</a:t>
             </a:fld>
             <a:endParaRPr lang="en-US" dirty="0"/>
           </a:p>
@@ -1821,7 +1821,7 @@
           <a:p>
             <a:fld id="{87F3BBB2-E533-43A8-AA78-2DC6FC5FE5A0}" type="datetimeFigureOut">
               <a:rPr lang="en-US" smtClean="0"/>
-              <a:t>11/14/23</a:t>
+              <a:t>4/28/25</a:t>
             </a:fld>
             <a:endParaRPr lang="en-US" dirty="0"/>
           </a:p>
@@ -2098,7 +2098,7 @@
           <a:p>
             <a:fld id="{87F3BBB2-E533-43A8-AA78-2DC6FC5FE5A0}" type="datetimeFigureOut">
               <a:rPr lang="en-US" smtClean="0"/>
-              <a:t>11/14/23</a:t>
+              <a:t>4/28/25</a:t>
             </a:fld>
             <a:endParaRPr lang="en-US" dirty="0"/>
           </a:p>
@@ -2355,7 +2355,7 @@
           <a:p>
             <a:fld id="{87F3BBB2-E533-43A8-AA78-2DC6FC5FE5A0}" type="datetimeFigureOut">
               <a:rPr lang="en-US" smtClean="0"/>
-              <a:t>11/14/23</a:t>
+              <a:t>4/28/25</a:t>
             </a:fld>
             <a:endParaRPr lang="en-US" dirty="0"/>
           </a:p>
@@ -2568,7 +2568,7 @@
           <a:p>
             <a:fld id="{87F3BBB2-E533-43A8-AA78-2DC6FC5FE5A0}" type="datetimeFigureOut">
               <a:rPr lang="en-US" smtClean="0"/>
-              <a:t>11/14/23</a:t>
+              <a:t>4/28/25</a:t>
             </a:fld>
             <a:endParaRPr lang="en-US" dirty="0"/>
           </a:p>
@@ -2987,7 +2987,7 @@
         </p:nvSpPr>
         <p:spPr>
           <a:xfrm>
-            <a:off x="3114414" y="3316411"/>
+            <a:off x="2853607" y="3007654"/>
             <a:ext cx="8229600" cy="928444"/>
           </a:xfrm>
           <a:prstGeom prst="rect">
@@ -3075,8 +3075,8 @@
         </p:nvSpPr>
         <p:spPr>
           <a:xfrm>
-            <a:off x="1225118" y="583777"/>
-            <a:ext cx="10946168" cy="5366714"/>
+            <a:off x="964311" y="275019"/>
+            <a:ext cx="10946168" cy="6484177"/>
           </a:xfrm>
           <a:prstGeom prst="rect">
             <a:avLst/>
@@ -3151,7 +3151,7 @@
         </p:blipFill>
         <p:spPr>
           <a:xfrm>
-            <a:off x="1225118" y="583777"/>
+            <a:off x="964311" y="275020"/>
             <a:ext cx="381000" cy="381000"/>
           </a:xfrm>
           <a:prstGeom prst="rect">
@@ -3173,8 +3173,8 @@
         </p:nvSpPr>
         <p:spPr>
           <a:xfrm>
-            <a:off x="2644945" y="927776"/>
-            <a:ext cx="2468880" cy="3596096"/>
+            <a:off x="2384138" y="619019"/>
+            <a:ext cx="2468880" cy="3525472"/>
           </a:xfrm>
           <a:prstGeom prst="rect">
             <a:avLst/>
@@ -3237,7 +3237,7 @@
         </p:nvSpPr>
         <p:spPr>
           <a:xfrm>
-            <a:off x="2816030" y="2950650"/>
+            <a:off x="2555223" y="2641893"/>
             <a:ext cx="2103120" cy="1396108"/>
           </a:xfrm>
           <a:prstGeom prst="rect">
@@ -3294,7 +3294,7 @@
         </p:nvSpPr>
         <p:spPr>
           <a:xfrm>
-            <a:off x="2827825" y="1548600"/>
+            <a:off x="2567018" y="1239843"/>
             <a:ext cx="2103120" cy="1280160"/>
           </a:xfrm>
           <a:prstGeom prst="rect">
@@ -3365,7 +3365,7 @@
         </p:blipFill>
         <p:spPr>
           <a:xfrm>
-            <a:off x="2827825" y="1548600"/>
+            <a:off x="2567018" y="1239843"/>
             <a:ext cx="274320" cy="274320"/>
           </a:xfrm>
           <a:prstGeom prst="rect">
@@ -3401,7 +3401,7 @@
         </p:blipFill>
         <p:spPr>
           <a:xfrm>
-            <a:off x="2816030" y="2950650"/>
+            <a:off x="2555223" y="2641893"/>
             <a:ext cx="274320" cy="274320"/>
           </a:xfrm>
           <a:prstGeom prst="rect">
@@ -3425,7 +3425,7 @@
         </p:nvSpPr>
         <p:spPr bwMode="auto">
           <a:xfrm>
-            <a:off x="3338295" y="2374400"/>
+            <a:off x="3077488" y="2065643"/>
             <a:ext cx="1097280" cy="261610"/>
           </a:xfrm>
           <a:prstGeom prst="rect">
@@ -3599,7 +3599,7 @@
         </p:blipFill>
         <p:spPr bwMode="auto">
           <a:xfrm>
-            <a:off x="3658335" y="1914360"/>
+            <a:off x="3397528" y="1605603"/>
             <a:ext cx="457200" cy="457200"/>
           </a:xfrm>
           <a:prstGeom prst="rect">
@@ -3658,7 +3658,7 @@
         </p:blipFill>
         <p:spPr>
           <a:xfrm>
-            <a:off x="5674734" y="3316410"/>
+            <a:off x="5413927" y="3007653"/>
             <a:ext cx="381000" cy="381000"/>
           </a:xfrm>
           <a:prstGeom prst="rect">
@@ -3680,8 +3680,8 @@
         </p:nvSpPr>
         <p:spPr>
           <a:xfrm>
-            <a:off x="6564833" y="927776"/>
-            <a:ext cx="2468880" cy="3596096"/>
+            <a:off x="6304026" y="619019"/>
+            <a:ext cx="2468880" cy="3525472"/>
           </a:xfrm>
           <a:prstGeom prst="rect">
             <a:avLst/>
@@ -3744,7 +3744,7 @@
         </p:nvSpPr>
         <p:spPr>
           <a:xfrm>
-            <a:off x="6747713" y="1548600"/>
+            <a:off x="6486906" y="1239843"/>
             <a:ext cx="2103120" cy="1280160"/>
           </a:xfrm>
           <a:prstGeom prst="rect">
@@ -3815,7 +3815,7 @@
         </p:blipFill>
         <p:spPr>
           <a:xfrm>
-            <a:off x="6747713" y="1548600"/>
+            <a:off x="6486906" y="1239843"/>
             <a:ext cx="274320" cy="274320"/>
           </a:xfrm>
           <a:prstGeom prst="rect">
@@ -3839,7 +3839,7 @@
         </p:nvSpPr>
         <p:spPr bwMode="auto">
           <a:xfrm>
-            <a:off x="7251039" y="2373465"/>
+            <a:off x="6990232" y="2064708"/>
             <a:ext cx="1097280" cy="261610"/>
           </a:xfrm>
           <a:prstGeom prst="rect">
@@ -4013,7 +4013,7 @@
         </p:blipFill>
         <p:spPr bwMode="auto">
           <a:xfrm>
-            <a:off x="7571079" y="1914360"/>
+            <a:off x="7310272" y="1605603"/>
             <a:ext cx="457200" cy="457200"/>
           </a:xfrm>
           <a:prstGeom prst="rect">
@@ -4058,8 +4058,8 @@
         </p:nvSpPr>
         <p:spPr>
           <a:xfrm>
-            <a:off x="9308033" y="927776"/>
-            <a:ext cx="2468880" cy="3596096"/>
+            <a:off x="9047226" y="619019"/>
+            <a:ext cx="2468880" cy="3525472"/>
           </a:xfrm>
           <a:prstGeom prst="rect">
             <a:avLst/>
@@ -4122,7 +4122,7 @@
         </p:nvSpPr>
         <p:spPr>
           <a:xfrm>
-            <a:off x="9490913" y="1548600"/>
+            <a:off x="9230106" y="1239843"/>
             <a:ext cx="2103120" cy="1266260"/>
           </a:xfrm>
           <a:prstGeom prst="rect">
@@ -4193,7 +4193,7 @@
         </p:blipFill>
         <p:spPr>
           <a:xfrm>
-            <a:off x="9490913" y="1548600"/>
+            <a:off x="9230106" y="1239843"/>
             <a:ext cx="274320" cy="274320"/>
           </a:xfrm>
           <a:prstGeom prst="rect">
@@ -4217,7 +4217,7 @@
         </p:nvSpPr>
         <p:spPr bwMode="auto">
           <a:xfrm>
-            <a:off x="10009137" y="2374400"/>
+            <a:off x="9748330" y="2065643"/>
             <a:ext cx="1097280" cy="261610"/>
           </a:xfrm>
           <a:prstGeom prst="rect">
@@ -4391,7 +4391,7 @@
         </p:blipFill>
         <p:spPr bwMode="auto">
           <a:xfrm>
-            <a:off x="10329177" y="1914360"/>
+            <a:off x="10068370" y="1605603"/>
             <a:ext cx="457200" cy="457200"/>
           </a:xfrm>
           <a:prstGeom prst="rect">
@@ -4451,7 +4451,7 @@
         </p:blipFill>
         <p:spPr bwMode="auto">
           <a:xfrm>
-            <a:off x="8443548" y="4781348"/>
+            <a:off x="8098393" y="5670542"/>
             <a:ext cx="762000" cy="762000"/>
           </a:xfrm>
           <a:prstGeom prst="rect">
@@ -4498,7 +4498,7 @@
         </p:nvSpPr>
         <p:spPr bwMode="auto">
           <a:xfrm>
-            <a:off x="8172178" y="5547522"/>
+            <a:off x="7827023" y="6436716"/>
             <a:ext cx="1346444" cy="276999"/>
           </a:xfrm>
           <a:prstGeom prst="rect">
@@ -4672,7 +4672,7 @@
         </p:blipFill>
         <p:spPr bwMode="auto">
           <a:xfrm>
-            <a:off x="7135897" y="4781348"/>
+            <a:off x="6790742" y="5670542"/>
             <a:ext cx="762000" cy="762000"/>
           </a:xfrm>
           <a:prstGeom prst="rect">
@@ -4719,7 +4719,7 @@
         </p:nvSpPr>
         <p:spPr bwMode="auto">
           <a:xfrm>
-            <a:off x="6969537" y="5547522"/>
+            <a:off x="6624382" y="6436716"/>
             <a:ext cx="1133980" cy="276999"/>
           </a:xfrm>
           <a:prstGeom prst="rect">
@@ -4880,7 +4880,7 @@
         </p:nvSpPr>
         <p:spPr bwMode="auto">
           <a:xfrm>
-            <a:off x="5354804" y="2771261"/>
+            <a:off x="5093997" y="2462504"/>
             <a:ext cx="1053039" cy="430887"/>
           </a:xfrm>
           <a:prstGeom prst="rect">
@@ -5052,7 +5052,7 @@
         </p:blipFill>
         <p:spPr bwMode="auto">
           <a:xfrm>
-            <a:off x="5645003" y="2303499"/>
+            <a:off x="5384196" y="1994742"/>
             <a:ext cx="457200" cy="457200"/>
           </a:xfrm>
           <a:prstGeom prst="rect">
@@ -5095,7 +5095,7 @@
         </p:blipFill>
         <p:spPr bwMode="auto">
           <a:xfrm>
-            <a:off x="3658335" y="3448396"/>
+            <a:off x="3397528" y="3139639"/>
             <a:ext cx="457200" cy="457200"/>
           </a:xfrm>
           <a:prstGeom prst="rect">
@@ -5142,7 +5142,7 @@
         </p:nvSpPr>
         <p:spPr bwMode="auto">
           <a:xfrm>
-            <a:off x="3155415" y="3906633"/>
+            <a:off x="2894608" y="3597876"/>
             <a:ext cx="1463040" cy="261610"/>
           </a:xfrm>
           <a:prstGeom prst="rect">
@@ -5301,7 +5301,7 @@
         </p:nvSpPr>
         <p:spPr>
           <a:xfrm>
-            <a:off x="6752838" y="2950650"/>
+            <a:off x="6492031" y="2641893"/>
             <a:ext cx="2103120" cy="1396108"/>
           </a:xfrm>
           <a:prstGeom prst="rect">
@@ -5372,7 +5372,7 @@
         </p:blipFill>
         <p:spPr>
           <a:xfrm>
-            <a:off x="6752838" y="2950650"/>
+            <a:off x="6492031" y="2641893"/>
             <a:ext cx="274320" cy="274320"/>
           </a:xfrm>
           <a:prstGeom prst="rect">
@@ -5409,7 +5409,7 @@
         </p:blipFill>
         <p:spPr bwMode="auto">
           <a:xfrm>
-            <a:off x="7571079" y="3448396"/>
+            <a:off x="7310272" y="3139639"/>
             <a:ext cx="457200" cy="457200"/>
           </a:xfrm>
           <a:prstGeom prst="rect">
@@ -5456,7 +5456,7 @@
         </p:nvSpPr>
         <p:spPr bwMode="auto">
           <a:xfrm>
-            <a:off x="7068159" y="3906633"/>
+            <a:off x="6807352" y="3597876"/>
             <a:ext cx="1463040" cy="261610"/>
           </a:xfrm>
           <a:prstGeom prst="rect">
@@ -5615,7 +5615,7 @@
         </p:nvSpPr>
         <p:spPr>
           <a:xfrm>
-            <a:off x="9474840" y="2929264"/>
+            <a:off x="9214033" y="2620507"/>
             <a:ext cx="2103120" cy="1396108"/>
           </a:xfrm>
           <a:prstGeom prst="rect">
@@ -5686,7 +5686,7 @@
         </p:blipFill>
         <p:spPr>
           <a:xfrm>
-            <a:off x="9474840" y="2929264"/>
+            <a:off x="9214033" y="2620507"/>
             <a:ext cx="274320" cy="274320"/>
           </a:xfrm>
           <a:prstGeom prst="rect">
@@ -5723,7 +5723,7 @@
         </p:blipFill>
         <p:spPr bwMode="auto">
           <a:xfrm>
-            <a:off x="10329177" y="3427010"/>
+            <a:off x="10068370" y="3118253"/>
             <a:ext cx="457200" cy="457200"/>
           </a:xfrm>
           <a:prstGeom prst="rect">
@@ -5770,7 +5770,7 @@
         </p:nvSpPr>
         <p:spPr bwMode="auto">
           <a:xfrm>
-            <a:off x="9826257" y="3885247"/>
+            <a:off x="9565450" y="3576490"/>
             <a:ext cx="1463040" cy="261610"/>
           </a:xfrm>
           <a:prstGeom prst="rect">
@@ -5944,7 +5944,7 @@
         </p:blipFill>
         <p:spPr bwMode="auto">
           <a:xfrm>
-            <a:off x="1916785" y="4781348"/>
+            <a:off x="1571630" y="5670542"/>
             <a:ext cx="762000" cy="762000"/>
           </a:xfrm>
           <a:prstGeom prst="rect">
@@ -5991,7 +5991,7 @@
         </p:nvSpPr>
         <p:spPr bwMode="auto">
           <a:xfrm>
-            <a:off x="1779942" y="5547522"/>
+            <a:off x="1434787" y="6436716"/>
             <a:ext cx="1035687" cy="276999"/>
           </a:xfrm>
           <a:prstGeom prst="rect">
@@ -6165,7 +6165,7 @@
         </p:blipFill>
         <p:spPr bwMode="auto">
           <a:xfrm>
-            <a:off x="3222522" y="4781348"/>
+            <a:off x="2877367" y="5670542"/>
             <a:ext cx="762000" cy="762000"/>
           </a:xfrm>
           <a:prstGeom prst="rect">
@@ -6212,7 +6212,7 @@
         </p:nvSpPr>
         <p:spPr bwMode="auto">
           <a:xfrm>
-            <a:off x="2986525" y="5547522"/>
+            <a:off x="2641370" y="6436716"/>
             <a:ext cx="1233994" cy="276999"/>
           </a:xfrm>
           <a:prstGeom prst="rect">
@@ -6386,7 +6386,7 @@
         </p:blipFill>
         <p:spPr bwMode="auto">
           <a:xfrm>
-            <a:off x="4532083" y="4781348"/>
+            <a:off x="4186928" y="5670542"/>
             <a:ext cx="762000" cy="762000"/>
           </a:xfrm>
           <a:prstGeom prst="rect">
@@ -6433,7 +6433,7 @@
         </p:nvSpPr>
         <p:spPr bwMode="auto">
           <a:xfrm>
-            <a:off x="4327099" y="5547522"/>
+            <a:off x="3981944" y="6436716"/>
             <a:ext cx="1175109" cy="276999"/>
           </a:xfrm>
           <a:prstGeom prst="rect">
@@ -6594,7 +6594,7 @@
         </p:nvSpPr>
         <p:spPr bwMode="auto">
           <a:xfrm>
-            <a:off x="1071320" y="3054904"/>
+            <a:off x="810513" y="2746147"/>
             <a:ext cx="1270000" cy="430887"/>
           </a:xfrm>
           <a:prstGeom prst="rect">
@@ -6781,7 +6781,7 @@
         </p:blipFill>
         <p:spPr bwMode="auto">
           <a:xfrm>
-            <a:off x="1496110" y="2597025"/>
+            <a:off x="1235303" y="2288268"/>
             <a:ext cx="457200" cy="457200"/>
           </a:xfrm>
           <a:prstGeom prst="rect">
@@ -6839,7 +6839,7 @@
         </p:blipFill>
         <p:spPr bwMode="auto">
           <a:xfrm flipH="1">
-            <a:off x="627637" y="2590675"/>
+            <a:off x="366830" y="2281918"/>
             <a:ext cx="469900" cy="469900"/>
           </a:xfrm>
           <a:prstGeom prst="rect">
@@ -6886,7 +6886,7 @@
         </p:nvSpPr>
         <p:spPr bwMode="auto">
           <a:xfrm>
-            <a:off x="563504" y="3054904"/>
+            <a:off x="302697" y="2746147"/>
             <a:ext cx="592072" cy="261610"/>
           </a:xfrm>
           <a:prstGeom prst="rect">
@@ -7051,7 +7051,7 @@
         </p:nvCxnSpPr>
         <p:spPr>
           <a:xfrm>
-            <a:off x="1097537" y="2825625"/>
+            <a:off x="836730" y="2516868"/>
             <a:ext cx="398573" cy="0"/>
           </a:xfrm>
           <a:prstGeom prst="straightConnector1">
@@ -7098,8 +7098,8 @@
         </p:nvCxnSpPr>
         <p:spPr>
           <a:xfrm>
-            <a:off x="1953310" y="2825625"/>
-            <a:ext cx="249201" cy="3714"/>
+            <a:off x="1692503" y="2516868"/>
+            <a:ext cx="249201" cy="664605"/>
           </a:xfrm>
           <a:prstGeom prst="straightConnector1">
             <a:avLst/>
@@ -7156,7 +7156,7 @@
         </p:blipFill>
         <p:spPr bwMode="auto">
           <a:xfrm>
-            <a:off x="5839732" y="4781348"/>
+            <a:off x="5494577" y="5670542"/>
             <a:ext cx="762000" cy="762000"/>
           </a:xfrm>
           <a:prstGeom prst="rect">
@@ -7203,7 +7203,7 @@
         </p:nvSpPr>
         <p:spPr bwMode="auto">
           <a:xfrm>
-            <a:off x="5571175" y="5547522"/>
+            <a:off x="5226020" y="6436716"/>
             <a:ext cx="1333117" cy="276999"/>
           </a:xfrm>
           <a:prstGeom prst="rect">
@@ -7362,8 +7362,8 @@
         </p:nvSpPr>
         <p:spPr>
           <a:xfrm>
-            <a:off x="2202511" y="1243090"/>
-            <a:ext cx="9744847" cy="3172498"/>
+            <a:off x="1941704" y="934332"/>
+            <a:ext cx="9744847" cy="4494282"/>
           </a:xfrm>
           <a:prstGeom prst="rect">
             <a:avLst/>
@@ -7445,7 +7445,7 @@
         </p:blipFill>
         <p:spPr>
           <a:xfrm>
-            <a:off x="2202511" y="1243089"/>
+            <a:off x="1941704" y="934332"/>
             <a:ext cx="381000" cy="381000"/>
           </a:xfrm>
           <a:prstGeom prst="rect">
@@ -7483,7 +7483,7 @@
         </p:blipFill>
         <p:spPr bwMode="auto">
           <a:xfrm>
-            <a:off x="9753107" y="4783546"/>
+            <a:off x="9407952" y="5672740"/>
             <a:ext cx="762000" cy="762000"/>
           </a:xfrm>
           <a:prstGeom prst="rect">
@@ -7530,7 +7530,7 @@
         </p:nvSpPr>
         <p:spPr bwMode="auto">
           <a:xfrm>
-            <a:off x="9440763" y="5547522"/>
+            <a:off x="9095608" y="6436716"/>
             <a:ext cx="1443072" cy="276999"/>
           </a:xfrm>
           <a:prstGeom prst="rect">
@@ -7705,7 +7705,7 @@
         </p:blipFill>
         <p:spPr bwMode="auto">
           <a:xfrm>
-            <a:off x="11047362" y="4777853"/>
+            <a:off x="10702207" y="5667047"/>
             <a:ext cx="762000" cy="762000"/>
           </a:xfrm>
           <a:prstGeom prst="rect">
@@ -7752,7 +7752,7 @@
         </p:nvSpPr>
         <p:spPr bwMode="auto">
           <a:xfrm>
-            <a:off x="10702733" y="5547522"/>
+            <a:off x="10357578" y="6436716"/>
             <a:ext cx="1443072" cy="276999"/>
           </a:xfrm>
           <a:prstGeom prst="rect">
@@ -7893,6 +7893,2022 @@
                 <a:cs typeface="Arial" panose="020B0604020202020204" pitchFamily="34" charset="0"/>
               </a:rPr>
               <a:t>CloudWatch</a:t>
+            </a:r>
+          </a:p>
+        </p:txBody>
+      </p:sp>
+      <p:sp>
+        <p:nvSpPr>
+          <p:cNvPr id="21" name="Rectangle 20">
+            <a:extLst>
+              <a:ext uri="{FF2B5EF4-FFF2-40B4-BE49-F238E27FC236}">
+                <a16:creationId xmlns:a16="http://schemas.microsoft.com/office/drawing/2014/main" id="{66BF7DC4-024A-5BB5-1E6D-37F31F2E0F22}"/>
+              </a:ext>
+            </a:extLst>
+          </p:cNvPr>
+          <p:cNvSpPr/>
+          <p:nvPr/>
+        </p:nvSpPr>
+        <p:spPr>
+          <a:xfrm>
+            <a:off x="2384138" y="4276476"/>
+            <a:ext cx="9131968" cy="1046009"/>
+          </a:xfrm>
+          <a:prstGeom prst="rect">
+            <a:avLst/>
+          </a:prstGeom>
+          <a:solidFill>
+            <a:schemeClr val="accent4">
+              <a:lumMod val="75000"/>
+              <a:alpha val="9804"/>
+            </a:schemeClr>
+          </a:solidFill>
+          <a:ln w="12700" cap="flat" cmpd="sng" algn="ctr">
+            <a:noFill/>
+            <a:prstDash val="dash"/>
+            <a:miter lim="800000"/>
+          </a:ln>
+          <a:effectLst/>
+        </p:spPr>
+        <p:txBody>
+          <a:bodyPr rot="0" spcFirstLastPara="0" vertOverflow="overflow" horzOverflow="overflow" vert="horz" wrap="square" lIns="338328" tIns="45720" rIns="91440" bIns="45720" numCol="1" spcCol="0" rtlCol="0" fromWordArt="0" anchor="t" anchorCtr="0" forceAA="0" compatLnSpc="1">
+            <a:prstTxWarp prst="textNoShape">
+              <a:avLst/>
+            </a:prstTxWarp>
+            <a:noAutofit/>
+          </a:bodyPr>
+          <a:lstStyle/>
+          <a:p>
+            <a:pPr defTabSz="914400">
+              <a:defRPr/>
+            </a:pPr>
+            <a:r>
+              <a:rPr lang="en-US" sz="1200" kern="0" dirty="0">
+                <a:solidFill>
+                  <a:schemeClr val="accent4">
+                    <a:lumMod val="50000"/>
+                  </a:schemeClr>
+                </a:solidFill>
+                <a:latin typeface="Arial" panose="020B0604020202020204" pitchFamily="34" charset="0"/>
+                <a:cs typeface="Arial" panose="020B0604020202020204" pitchFamily="34" charset="0"/>
+              </a:rPr>
+              <a:t>Kubernetes Workload</a:t>
+            </a:r>
+          </a:p>
+        </p:txBody>
+      </p:sp>
+      <p:grpSp>
+        <p:nvGrpSpPr>
+          <p:cNvPr id="36" name="Group 35">
+            <a:extLst>
+              <a:ext uri="{FF2B5EF4-FFF2-40B4-BE49-F238E27FC236}">
+                <a16:creationId xmlns:a16="http://schemas.microsoft.com/office/drawing/2014/main" id="{0BDE12F8-96FD-2266-3921-24722103564C}"/>
+              </a:ext>
+            </a:extLst>
+          </p:cNvPr>
+          <p:cNvGrpSpPr/>
+          <p:nvPr/>
+        </p:nvGrpSpPr>
+        <p:grpSpPr>
+          <a:xfrm>
+            <a:off x="5341728" y="4339541"/>
+            <a:ext cx="557576" cy="534823"/>
+            <a:chOff x="6759588" y="4535956"/>
+            <a:chExt cx="557576" cy="534823"/>
+          </a:xfrm>
+        </p:grpSpPr>
+        <p:sp>
+          <p:nvSpPr>
+            <p:cNvPr id="30" name="Rounded Rectangle 29">
+              <a:extLst>
+                <a:ext uri="{FF2B5EF4-FFF2-40B4-BE49-F238E27FC236}">
+                  <a16:creationId xmlns:a16="http://schemas.microsoft.com/office/drawing/2014/main" id="{96CF9E89-79EE-5F45-DFE3-CBAD39BEBE8C}"/>
+                </a:ext>
+              </a:extLst>
+            </p:cNvPr>
+            <p:cNvSpPr/>
+            <p:nvPr/>
+          </p:nvSpPr>
+          <p:spPr>
+            <a:xfrm>
+              <a:off x="6759588" y="4535956"/>
+              <a:ext cx="557576" cy="534823"/>
+            </a:xfrm>
+            <a:prstGeom prst="roundRect">
+              <a:avLst/>
+            </a:prstGeom>
+            <a:solidFill>
+              <a:srgbClr val="F9F4EA"/>
+            </a:solidFill>
+            <a:ln>
+              <a:noFill/>
+            </a:ln>
+          </p:spPr>
+          <p:style>
+            <a:lnRef idx="2">
+              <a:schemeClr val="accent1">
+                <a:shade val="15000"/>
+              </a:schemeClr>
+            </a:lnRef>
+            <a:fillRef idx="1">
+              <a:schemeClr val="accent1"/>
+            </a:fillRef>
+            <a:effectRef idx="0">
+              <a:schemeClr val="accent1"/>
+            </a:effectRef>
+            <a:fontRef idx="minor">
+              <a:schemeClr val="lt1"/>
+            </a:fontRef>
+          </p:style>
+          <p:txBody>
+            <a:bodyPr rtlCol="0" anchor="ctr"/>
+            <a:lstStyle/>
+            <a:p>
+              <a:pPr algn="ctr"/>
+              <a:endParaRPr lang="en-US"/>
+            </a:p>
+          </p:txBody>
+        </p:sp>
+        <p:pic>
+          <p:nvPicPr>
+            <p:cNvPr id="29" name="Picture 28">
+              <a:extLst>
+                <a:ext uri="{FF2B5EF4-FFF2-40B4-BE49-F238E27FC236}">
+                  <a16:creationId xmlns:a16="http://schemas.microsoft.com/office/drawing/2014/main" id="{97CD381E-5D87-85DD-B5E0-B4790C929772}"/>
+                </a:ext>
+              </a:extLst>
+            </p:cNvPr>
+            <p:cNvPicPr>
+              <a:picLocks noChangeAspect="1"/>
+            </p:cNvPicPr>
+            <p:nvPr/>
+          </p:nvPicPr>
+          <p:blipFill>
+            <a:blip r:embed="rId29">
+              <a:extLst>
+                <a:ext uri="{28A0092B-C50C-407E-A947-70E740481C1C}">
+                  <a14:useLocalDpi xmlns:a14="http://schemas.microsoft.com/office/drawing/2010/main" val="0"/>
+                </a:ext>
+              </a:extLst>
+            </a:blip>
+            <a:stretch>
+              <a:fillRect/>
+            </a:stretch>
+          </p:blipFill>
+          <p:spPr>
+            <a:xfrm>
+              <a:off x="6794115" y="4564534"/>
+              <a:ext cx="477346" cy="469888"/>
+            </a:xfrm>
+            <a:prstGeom prst="rect">
+              <a:avLst/>
+            </a:prstGeom>
+          </p:spPr>
+        </p:pic>
+      </p:grpSp>
+      <p:grpSp>
+        <p:nvGrpSpPr>
+          <p:cNvPr id="37" name="Group 36">
+            <a:extLst>
+              <a:ext uri="{FF2B5EF4-FFF2-40B4-BE49-F238E27FC236}">
+                <a16:creationId xmlns:a16="http://schemas.microsoft.com/office/drawing/2014/main" id="{95C27457-CEFF-FC7B-953E-A2D6AC0345A2}"/>
+              </a:ext>
+            </a:extLst>
+          </p:cNvPr>
+          <p:cNvGrpSpPr/>
+          <p:nvPr/>
+        </p:nvGrpSpPr>
+        <p:grpSpPr>
+          <a:xfrm>
+            <a:off x="5435214" y="4422400"/>
+            <a:ext cx="557576" cy="534823"/>
+            <a:chOff x="6759588" y="4535956"/>
+            <a:chExt cx="557576" cy="534823"/>
+          </a:xfrm>
+        </p:grpSpPr>
+        <p:sp>
+          <p:nvSpPr>
+            <p:cNvPr id="38" name="Rounded Rectangle 37">
+              <a:extLst>
+                <a:ext uri="{FF2B5EF4-FFF2-40B4-BE49-F238E27FC236}">
+                  <a16:creationId xmlns:a16="http://schemas.microsoft.com/office/drawing/2014/main" id="{211D8F7A-E054-CF7B-5411-54ACAE2D37E8}"/>
+                </a:ext>
+              </a:extLst>
+            </p:cNvPr>
+            <p:cNvSpPr/>
+            <p:nvPr/>
+          </p:nvSpPr>
+          <p:spPr>
+            <a:xfrm>
+              <a:off x="6759588" y="4535956"/>
+              <a:ext cx="557576" cy="534823"/>
+            </a:xfrm>
+            <a:prstGeom prst="roundRect">
+              <a:avLst/>
+            </a:prstGeom>
+            <a:solidFill>
+              <a:srgbClr val="F9F4EA"/>
+            </a:solidFill>
+            <a:ln>
+              <a:noFill/>
+            </a:ln>
+          </p:spPr>
+          <p:style>
+            <a:lnRef idx="2">
+              <a:schemeClr val="accent1">
+                <a:shade val="15000"/>
+              </a:schemeClr>
+            </a:lnRef>
+            <a:fillRef idx="1">
+              <a:schemeClr val="accent1"/>
+            </a:fillRef>
+            <a:effectRef idx="0">
+              <a:schemeClr val="accent1"/>
+            </a:effectRef>
+            <a:fontRef idx="minor">
+              <a:schemeClr val="lt1"/>
+            </a:fontRef>
+          </p:style>
+          <p:txBody>
+            <a:bodyPr rtlCol="0" anchor="ctr"/>
+            <a:lstStyle/>
+            <a:p>
+              <a:pPr algn="ctr"/>
+              <a:endParaRPr lang="en-US"/>
+            </a:p>
+          </p:txBody>
+        </p:sp>
+        <p:pic>
+          <p:nvPicPr>
+            <p:cNvPr id="39" name="Picture 38">
+              <a:extLst>
+                <a:ext uri="{FF2B5EF4-FFF2-40B4-BE49-F238E27FC236}">
+                  <a16:creationId xmlns:a16="http://schemas.microsoft.com/office/drawing/2014/main" id="{63AE3F40-8B58-5CD2-F861-E2E0069FFEFB}"/>
+                </a:ext>
+              </a:extLst>
+            </p:cNvPr>
+            <p:cNvPicPr>
+              <a:picLocks noChangeAspect="1"/>
+            </p:cNvPicPr>
+            <p:nvPr/>
+          </p:nvPicPr>
+          <p:blipFill>
+            <a:blip r:embed="rId29">
+              <a:extLst>
+                <a:ext uri="{28A0092B-C50C-407E-A947-70E740481C1C}">
+                  <a14:useLocalDpi xmlns:a14="http://schemas.microsoft.com/office/drawing/2010/main" val="0"/>
+                </a:ext>
+              </a:extLst>
+            </a:blip>
+            <a:stretch>
+              <a:fillRect/>
+            </a:stretch>
+          </p:blipFill>
+          <p:spPr>
+            <a:xfrm>
+              <a:off x="6794115" y="4564534"/>
+              <a:ext cx="477346" cy="469888"/>
+            </a:xfrm>
+            <a:prstGeom prst="rect">
+              <a:avLst/>
+            </a:prstGeom>
+          </p:spPr>
+        </p:pic>
+      </p:grpSp>
+      <p:grpSp>
+        <p:nvGrpSpPr>
+          <p:cNvPr id="40" name="Group 39">
+            <a:extLst>
+              <a:ext uri="{FF2B5EF4-FFF2-40B4-BE49-F238E27FC236}">
+                <a16:creationId xmlns:a16="http://schemas.microsoft.com/office/drawing/2014/main" id="{39218C36-DF26-7603-4CE5-19FCF6B3CF74}"/>
+              </a:ext>
+            </a:extLst>
+          </p:cNvPr>
+          <p:cNvGrpSpPr/>
+          <p:nvPr/>
+        </p:nvGrpSpPr>
+        <p:grpSpPr>
+          <a:xfrm>
+            <a:off x="5528700" y="4505259"/>
+            <a:ext cx="557576" cy="534823"/>
+            <a:chOff x="6759588" y="4535956"/>
+            <a:chExt cx="557576" cy="534823"/>
+          </a:xfrm>
+        </p:grpSpPr>
+        <p:sp>
+          <p:nvSpPr>
+            <p:cNvPr id="41" name="Rounded Rectangle 40">
+              <a:extLst>
+                <a:ext uri="{FF2B5EF4-FFF2-40B4-BE49-F238E27FC236}">
+                  <a16:creationId xmlns:a16="http://schemas.microsoft.com/office/drawing/2014/main" id="{B3E64164-90C0-7DAA-DB72-E5A6D20A27F9}"/>
+                </a:ext>
+              </a:extLst>
+            </p:cNvPr>
+            <p:cNvSpPr/>
+            <p:nvPr/>
+          </p:nvSpPr>
+          <p:spPr>
+            <a:xfrm>
+              <a:off x="6759588" y="4535956"/>
+              <a:ext cx="557576" cy="534823"/>
+            </a:xfrm>
+            <a:prstGeom prst="roundRect">
+              <a:avLst/>
+            </a:prstGeom>
+            <a:solidFill>
+              <a:srgbClr val="F9F4EA"/>
+            </a:solidFill>
+            <a:ln>
+              <a:noFill/>
+            </a:ln>
+          </p:spPr>
+          <p:style>
+            <a:lnRef idx="2">
+              <a:schemeClr val="accent1">
+                <a:shade val="15000"/>
+              </a:schemeClr>
+            </a:lnRef>
+            <a:fillRef idx="1">
+              <a:schemeClr val="accent1"/>
+            </a:fillRef>
+            <a:effectRef idx="0">
+              <a:schemeClr val="accent1"/>
+            </a:effectRef>
+            <a:fontRef idx="minor">
+              <a:schemeClr val="lt1"/>
+            </a:fontRef>
+          </p:style>
+          <p:txBody>
+            <a:bodyPr rtlCol="0" anchor="ctr"/>
+            <a:lstStyle/>
+            <a:p>
+              <a:pPr algn="ctr"/>
+              <a:endParaRPr lang="en-US"/>
+            </a:p>
+          </p:txBody>
+        </p:sp>
+        <p:pic>
+          <p:nvPicPr>
+            <p:cNvPr id="42" name="Picture 41">
+              <a:extLst>
+                <a:ext uri="{FF2B5EF4-FFF2-40B4-BE49-F238E27FC236}">
+                  <a16:creationId xmlns:a16="http://schemas.microsoft.com/office/drawing/2014/main" id="{A8CC237C-51D3-7F96-0D45-A0E37E4FE3F3}"/>
+                </a:ext>
+              </a:extLst>
+            </p:cNvPr>
+            <p:cNvPicPr>
+              <a:picLocks noChangeAspect="1"/>
+            </p:cNvPicPr>
+            <p:nvPr/>
+          </p:nvPicPr>
+          <p:blipFill>
+            <a:blip r:embed="rId29">
+              <a:extLst>
+                <a:ext uri="{28A0092B-C50C-407E-A947-70E740481C1C}">
+                  <a14:useLocalDpi xmlns:a14="http://schemas.microsoft.com/office/drawing/2010/main" val="0"/>
+                </a:ext>
+              </a:extLst>
+            </a:blip>
+            <a:stretch>
+              <a:fillRect/>
+            </a:stretch>
+          </p:blipFill>
+          <p:spPr>
+            <a:xfrm>
+              <a:off x="6794115" y="4564534"/>
+              <a:ext cx="477346" cy="469888"/>
+            </a:xfrm>
+            <a:prstGeom prst="rect">
+              <a:avLst/>
+            </a:prstGeom>
+          </p:spPr>
+        </p:pic>
+      </p:grpSp>
+      <p:sp>
+        <p:nvSpPr>
+          <p:cNvPr id="43" name="TextBox 17">
+            <a:extLst>
+              <a:ext uri="{FF2B5EF4-FFF2-40B4-BE49-F238E27FC236}">
+                <a16:creationId xmlns:a16="http://schemas.microsoft.com/office/drawing/2014/main" id="{A6A97C25-43ED-DA9A-3779-D4FDF796CE3A}"/>
+              </a:ext>
+            </a:extLst>
+          </p:cNvPr>
+          <p:cNvSpPr txBox="1">
+            <a:spLocks noChangeArrowheads="1"/>
+          </p:cNvSpPr>
+          <p:nvPr/>
+        </p:nvSpPr>
+        <p:spPr bwMode="auto">
+          <a:xfrm>
+            <a:off x="4974355" y="5062962"/>
+            <a:ext cx="1463040" cy="261610"/>
+          </a:xfrm>
+          <a:prstGeom prst="rect">
+            <a:avLst/>
+          </a:prstGeom>
+          <a:noFill/>
+          <a:ln>
+            <a:noFill/>
+          </a:ln>
+          <a:extLst>
+            <a:ext uri="{909E8E84-426E-40DD-AFC4-6F175D3DCCD1}">
+              <a14:hiddenFill xmlns:a14="http://schemas.microsoft.com/office/drawing/2010/main">
+                <a:solidFill>
+                  <a:srgbClr val="FFFFFF"/>
+                </a:solidFill>
+              </a14:hiddenFill>
+            </a:ext>
+            <a:ext uri="{91240B29-F687-4F45-9708-019B960494DF}">
+              <a14:hiddenLine xmlns:a14="http://schemas.microsoft.com/office/drawing/2010/main" w="9525">
+                <a:solidFill>
+                  <a:srgbClr val="000000"/>
+                </a:solidFill>
+                <a:miter lim="800000"/>
+                <a:headEnd/>
+                <a:tailEnd/>
+              </a14:hiddenLine>
+            </a:ext>
+          </a:extLst>
+        </p:spPr>
+        <p:txBody>
+          <a:bodyPr wrap="square">
+            <a:spAutoFit/>
+          </a:bodyPr>
+          <a:lstStyle>
+            <a:lvl1pPr>
+              <a:defRPr>
+                <a:solidFill>
+                  <a:schemeClr val="tx1"/>
+                </a:solidFill>
+                <a:latin typeface="Calibri" panose="020F0502020204030204" pitchFamily="34" charset="0"/>
+              </a:defRPr>
+            </a:lvl1pPr>
+            <a:lvl2pPr marL="742950" indent="-285750">
+              <a:defRPr>
+                <a:solidFill>
+                  <a:schemeClr val="tx1"/>
+                </a:solidFill>
+                <a:latin typeface="Calibri" panose="020F0502020204030204" pitchFamily="34" charset="0"/>
+              </a:defRPr>
+            </a:lvl2pPr>
+            <a:lvl3pPr marL="1143000" indent="-228600">
+              <a:defRPr>
+                <a:solidFill>
+                  <a:schemeClr val="tx1"/>
+                </a:solidFill>
+                <a:latin typeface="Calibri" panose="020F0502020204030204" pitchFamily="34" charset="0"/>
+              </a:defRPr>
+            </a:lvl3pPr>
+            <a:lvl4pPr marL="1600200" indent="-228600">
+              <a:defRPr>
+                <a:solidFill>
+                  <a:schemeClr val="tx1"/>
+                </a:solidFill>
+                <a:latin typeface="Calibri" panose="020F0502020204030204" pitchFamily="34" charset="0"/>
+              </a:defRPr>
+            </a:lvl4pPr>
+            <a:lvl5pPr marL="2057400" indent="-228600">
+              <a:defRPr>
+                <a:solidFill>
+                  <a:schemeClr val="tx1"/>
+                </a:solidFill>
+                <a:latin typeface="Calibri" panose="020F0502020204030204" pitchFamily="34" charset="0"/>
+              </a:defRPr>
+            </a:lvl5pPr>
+            <a:lvl6pPr marL="2514600" indent="-228600" eaLnBrk="0" fontAlgn="base" hangingPunct="0">
+              <a:spcBef>
+                <a:spcPct val="0"/>
+              </a:spcBef>
+              <a:spcAft>
+                <a:spcPct val="0"/>
+              </a:spcAft>
+              <a:defRPr>
+                <a:solidFill>
+                  <a:schemeClr val="tx1"/>
+                </a:solidFill>
+                <a:latin typeface="Calibri" panose="020F0502020204030204" pitchFamily="34" charset="0"/>
+              </a:defRPr>
+            </a:lvl6pPr>
+            <a:lvl7pPr marL="2971800" indent="-228600" eaLnBrk="0" fontAlgn="base" hangingPunct="0">
+              <a:spcBef>
+                <a:spcPct val="0"/>
+              </a:spcBef>
+              <a:spcAft>
+                <a:spcPct val="0"/>
+              </a:spcAft>
+              <a:defRPr>
+                <a:solidFill>
+                  <a:schemeClr val="tx1"/>
+                </a:solidFill>
+                <a:latin typeface="Calibri" panose="020F0502020204030204" pitchFamily="34" charset="0"/>
+              </a:defRPr>
+            </a:lvl7pPr>
+            <a:lvl8pPr marL="3429000" indent="-228600" eaLnBrk="0" fontAlgn="base" hangingPunct="0">
+              <a:spcBef>
+                <a:spcPct val="0"/>
+              </a:spcBef>
+              <a:spcAft>
+                <a:spcPct val="0"/>
+              </a:spcAft>
+              <a:defRPr>
+                <a:solidFill>
+                  <a:schemeClr val="tx1"/>
+                </a:solidFill>
+                <a:latin typeface="Calibri" panose="020F0502020204030204" pitchFamily="34" charset="0"/>
+              </a:defRPr>
+            </a:lvl8pPr>
+            <a:lvl9pPr marL="3886200" indent="-228600" eaLnBrk="0" fontAlgn="base" hangingPunct="0">
+              <a:spcBef>
+                <a:spcPct val="0"/>
+              </a:spcBef>
+              <a:spcAft>
+                <a:spcPct val="0"/>
+              </a:spcAft>
+              <a:defRPr>
+                <a:solidFill>
+                  <a:schemeClr val="tx1"/>
+                </a:solidFill>
+                <a:latin typeface="Calibri" panose="020F0502020204030204" pitchFamily="34" charset="0"/>
+              </a:defRPr>
+            </a:lvl9pPr>
+          </a:lstStyle>
+          <a:p>
+            <a:pPr algn="ctr" eaLnBrk="1" hangingPunct="1"/>
+            <a:r>
+              <a:rPr lang="en-US" altLang="en-US" sz="1100" dirty="0" err="1">
+                <a:latin typeface="Arial" panose="020B0604020202020204" pitchFamily="34" charset="0"/>
+                <a:ea typeface="Amazon Ember" panose="020B0603020204020204" pitchFamily="34" charset="0"/>
+                <a:cs typeface="Arial" panose="020B0604020202020204" pitchFamily="34" charset="0"/>
+              </a:rPr>
+              <a:t>Mendix</a:t>
+            </a:r>
+            <a:r>
+              <a:rPr lang="en-US" altLang="en-US" sz="1100" dirty="0">
+                <a:latin typeface="Arial" panose="020B0604020202020204" pitchFamily="34" charset="0"/>
+                <a:ea typeface="Amazon Ember" panose="020B0603020204020204" pitchFamily="34" charset="0"/>
+                <a:cs typeface="Arial" panose="020B0604020202020204" pitchFamily="34" charset="0"/>
+              </a:rPr>
+              <a:t> Apps</a:t>
+            </a:r>
+          </a:p>
+        </p:txBody>
+      </p:sp>
+      <p:grpSp>
+        <p:nvGrpSpPr>
+          <p:cNvPr id="44" name="Group 43">
+            <a:extLst>
+              <a:ext uri="{FF2B5EF4-FFF2-40B4-BE49-F238E27FC236}">
+                <a16:creationId xmlns:a16="http://schemas.microsoft.com/office/drawing/2014/main" id="{D93C01CB-50E9-F115-E960-17F697DAC073}"/>
+              </a:ext>
+            </a:extLst>
+          </p:cNvPr>
+          <p:cNvGrpSpPr/>
+          <p:nvPr/>
+        </p:nvGrpSpPr>
+        <p:grpSpPr>
+          <a:xfrm>
+            <a:off x="6790324" y="4507914"/>
+            <a:ext cx="557576" cy="534823"/>
+            <a:chOff x="6759588" y="4535956"/>
+            <a:chExt cx="557576" cy="534823"/>
+          </a:xfrm>
+        </p:grpSpPr>
+        <p:sp>
+          <p:nvSpPr>
+            <p:cNvPr id="45" name="Rounded Rectangle 44">
+              <a:extLst>
+                <a:ext uri="{FF2B5EF4-FFF2-40B4-BE49-F238E27FC236}">
+                  <a16:creationId xmlns:a16="http://schemas.microsoft.com/office/drawing/2014/main" id="{5604E41F-BA16-5A3F-BD46-4D80A5C3A5ED}"/>
+                </a:ext>
+              </a:extLst>
+            </p:cNvPr>
+            <p:cNvSpPr/>
+            <p:nvPr/>
+          </p:nvSpPr>
+          <p:spPr>
+            <a:xfrm>
+              <a:off x="6759588" y="4535956"/>
+              <a:ext cx="557576" cy="534823"/>
+            </a:xfrm>
+            <a:prstGeom prst="roundRect">
+              <a:avLst/>
+            </a:prstGeom>
+            <a:solidFill>
+              <a:srgbClr val="F9F4EA"/>
+            </a:solidFill>
+            <a:ln>
+              <a:noFill/>
+            </a:ln>
+          </p:spPr>
+          <p:style>
+            <a:lnRef idx="2">
+              <a:schemeClr val="accent1">
+                <a:shade val="15000"/>
+              </a:schemeClr>
+            </a:lnRef>
+            <a:fillRef idx="1">
+              <a:schemeClr val="accent1"/>
+            </a:fillRef>
+            <a:effectRef idx="0">
+              <a:schemeClr val="accent1"/>
+            </a:effectRef>
+            <a:fontRef idx="minor">
+              <a:schemeClr val="lt1"/>
+            </a:fontRef>
+          </p:style>
+          <p:txBody>
+            <a:bodyPr rtlCol="0" anchor="ctr"/>
+            <a:lstStyle/>
+            <a:p>
+              <a:pPr algn="ctr"/>
+              <a:endParaRPr lang="en-US"/>
+            </a:p>
+          </p:txBody>
+        </p:sp>
+        <p:pic>
+          <p:nvPicPr>
+            <p:cNvPr id="46" name="Picture 45">
+              <a:extLst>
+                <a:ext uri="{FF2B5EF4-FFF2-40B4-BE49-F238E27FC236}">
+                  <a16:creationId xmlns:a16="http://schemas.microsoft.com/office/drawing/2014/main" id="{FAF97AC4-BBAC-E385-E41D-485A0BC0DFBA}"/>
+                </a:ext>
+              </a:extLst>
+            </p:cNvPr>
+            <p:cNvPicPr>
+              <a:picLocks noChangeAspect="1"/>
+            </p:cNvPicPr>
+            <p:nvPr/>
+          </p:nvPicPr>
+          <p:blipFill>
+            <a:blip r:embed="rId29">
+              <a:extLst>
+                <a:ext uri="{28A0092B-C50C-407E-A947-70E740481C1C}">
+                  <a14:useLocalDpi xmlns:a14="http://schemas.microsoft.com/office/drawing/2010/main" val="0"/>
+                </a:ext>
+              </a:extLst>
+            </a:blip>
+            <a:stretch>
+              <a:fillRect/>
+            </a:stretch>
+          </p:blipFill>
+          <p:spPr>
+            <a:xfrm>
+              <a:off x="6794115" y="4564534"/>
+              <a:ext cx="477346" cy="469888"/>
+            </a:xfrm>
+            <a:prstGeom prst="rect">
+              <a:avLst/>
+            </a:prstGeom>
+          </p:spPr>
+        </p:pic>
+      </p:grpSp>
+      <p:sp>
+        <p:nvSpPr>
+          <p:cNvPr id="47" name="TextBox 17">
+            <a:extLst>
+              <a:ext uri="{FF2B5EF4-FFF2-40B4-BE49-F238E27FC236}">
+                <a16:creationId xmlns:a16="http://schemas.microsoft.com/office/drawing/2014/main" id="{A7DACC5E-D892-8BD1-20AE-767297B2EB3C}"/>
+              </a:ext>
+            </a:extLst>
+          </p:cNvPr>
+          <p:cNvSpPr txBox="1">
+            <a:spLocks noChangeArrowheads="1"/>
+          </p:cNvSpPr>
+          <p:nvPr/>
+        </p:nvSpPr>
+        <p:spPr bwMode="auto">
+          <a:xfrm>
+            <a:off x="6425550" y="5064173"/>
+            <a:ext cx="1226369" cy="261610"/>
+          </a:xfrm>
+          <a:prstGeom prst="rect">
+            <a:avLst/>
+          </a:prstGeom>
+          <a:noFill/>
+          <a:ln>
+            <a:noFill/>
+          </a:ln>
+          <a:extLst>
+            <a:ext uri="{909E8E84-426E-40DD-AFC4-6F175D3DCCD1}">
+              <a14:hiddenFill xmlns:a14="http://schemas.microsoft.com/office/drawing/2010/main">
+                <a:solidFill>
+                  <a:srgbClr val="FFFFFF"/>
+                </a:solidFill>
+              </a14:hiddenFill>
+            </a:ext>
+            <a:ext uri="{91240B29-F687-4F45-9708-019B960494DF}">
+              <a14:hiddenLine xmlns:a14="http://schemas.microsoft.com/office/drawing/2010/main" w="9525">
+                <a:solidFill>
+                  <a:srgbClr val="000000"/>
+                </a:solidFill>
+                <a:miter lim="800000"/>
+                <a:headEnd/>
+                <a:tailEnd/>
+              </a14:hiddenLine>
+            </a:ext>
+          </a:extLst>
+        </p:spPr>
+        <p:txBody>
+          <a:bodyPr wrap="square">
+            <a:spAutoFit/>
+          </a:bodyPr>
+          <a:lstStyle>
+            <a:lvl1pPr>
+              <a:defRPr>
+                <a:solidFill>
+                  <a:schemeClr val="tx1"/>
+                </a:solidFill>
+                <a:latin typeface="Calibri" panose="020F0502020204030204" pitchFamily="34" charset="0"/>
+              </a:defRPr>
+            </a:lvl1pPr>
+            <a:lvl2pPr marL="742950" indent="-285750">
+              <a:defRPr>
+                <a:solidFill>
+                  <a:schemeClr val="tx1"/>
+                </a:solidFill>
+                <a:latin typeface="Calibri" panose="020F0502020204030204" pitchFamily="34" charset="0"/>
+              </a:defRPr>
+            </a:lvl2pPr>
+            <a:lvl3pPr marL="1143000" indent="-228600">
+              <a:defRPr>
+                <a:solidFill>
+                  <a:schemeClr val="tx1"/>
+                </a:solidFill>
+                <a:latin typeface="Calibri" panose="020F0502020204030204" pitchFamily="34" charset="0"/>
+              </a:defRPr>
+            </a:lvl3pPr>
+            <a:lvl4pPr marL="1600200" indent="-228600">
+              <a:defRPr>
+                <a:solidFill>
+                  <a:schemeClr val="tx1"/>
+                </a:solidFill>
+                <a:latin typeface="Calibri" panose="020F0502020204030204" pitchFamily="34" charset="0"/>
+              </a:defRPr>
+            </a:lvl4pPr>
+            <a:lvl5pPr marL="2057400" indent="-228600">
+              <a:defRPr>
+                <a:solidFill>
+                  <a:schemeClr val="tx1"/>
+                </a:solidFill>
+                <a:latin typeface="Calibri" panose="020F0502020204030204" pitchFamily="34" charset="0"/>
+              </a:defRPr>
+            </a:lvl5pPr>
+            <a:lvl6pPr marL="2514600" indent="-228600" eaLnBrk="0" fontAlgn="base" hangingPunct="0">
+              <a:spcBef>
+                <a:spcPct val="0"/>
+              </a:spcBef>
+              <a:spcAft>
+                <a:spcPct val="0"/>
+              </a:spcAft>
+              <a:defRPr>
+                <a:solidFill>
+                  <a:schemeClr val="tx1"/>
+                </a:solidFill>
+                <a:latin typeface="Calibri" panose="020F0502020204030204" pitchFamily="34" charset="0"/>
+              </a:defRPr>
+            </a:lvl6pPr>
+            <a:lvl7pPr marL="2971800" indent="-228600" eaLnBrk="0" fontAlgn="base" hangingPunct="0">
+              <a:spcBef>
+                <a:spcPct val="0"/>
+              </a:spcBef>
+              <a:spcAft>
+                <a:spcPct val="0"/>
+              </a:spcAft>
+              <a:defRPr>
+                <a:solidFill>
+                  <a:schemeClr val="tx1"/>
+                </a:solidFill>
+                <a:latin typeface="Calibri" panose="020F0502020204030204" pitchFamily="34" charset="0"/>
+              </a:defRPr>
+            </a:lvl7pPr>
+            <a:lvl8pPr marL="3429000" indent="-228600" eaLnBrk="0" fontAlgn="base" hangingPunct="0">
+              <a:spcBef>
+                <a:spcPct val="0"/>
+              </a:spcBef>
+              <a:spcAft>
+                <a:spcPct val="0"/>
+              </a:spcAft>
+              <a:defRPr>
+                <a:solidFill>
+                  <a:schemeClr val="tx1"/>
+                </a:solidFill>
+                <a:latin typeface="Calibri" panose="020F0502020204030204" pitchFamily="34" charset="0"/>
+              </a:defRPr>
+            </a:lvl8pPr>
+            <a:lvl9pPr marL="3886200" indent="-228600" eaLnBrk="0" fontAlgn="base" hangingPunct="0">
+              <a:spcBef>
+                <a:spcPct val="0"/>
+              </a:spcBef>
+              <a:spcAft>
+                <a:spcPct val="0"/>
+              </a:spcAft>
+              <a:defRPr>
+                <a:solidFill>
+                  <a:schemeClr val="tx1"/>
+                </a:solidFill>
+                <a:latin typeface="Calibri" panose="020F0502020204030204" pitchFamily="34" charset="0"/>
+              </a:defRPr>
+            </a:lvl9pPr>
+          </a:lstStyle>
+          <a:p>
+            <a:pPr algn="ctr" eaLnBrk="1" hangingPunct="1"/>
+            <a:r>
+              <a:rPr lang="en-US" altLang="en-US" sz="1100" dirty="0" err="1">
+                <a:latin typeface="Arial" panose="020B0604020202020204" pitchFamily="34" charset="0"/>
+                <a:ea typeface="Amazon Ember" panose="020B0603020204020204" pitchFamily="34" charset="0"/>
+                <a:cs typeface="Arial" panose="020B0604020202020204" pitchFamily="34" charset="0"/>
+              </a:rPr>
+              <a:t>Mendix</a:t>
+            </a:r>
+            <a:r>
+              <a:rPr lang="en-US" altLang="en-US" sz="1100" dirty="0">
+                <a:latin typeface="Arial" panose="020B0604020202020204" pitchFamily="34" charset="0"/>
+                <a:ea typeface="Amazon Ember" panose="020B0603020204020204" pitchFamily="34" charset="0"/>
+                <a:cs typeface="Arial" panose="020B0604020202020204" pitchFamily="34" charset="0"/>
+              </a:rPr>
+              <a:t> Operator</a:t>
+            </a:r>
+          </a:p>
+        </p:txBody>
+      </p:sp>
+      <p:grpSp>
+        <p:nvGrpSpPr>
+          <p:cNvPr id="48" name="Group 47">
+            <a:extLst>
+              <a:ext uri="{FF2B5EF4-FFF2-40B4-BE49-F238E27FC236}">
+                <a16:creationId xmlns:a16="http://schemas.microsoft.com/office/drawing/2014/main" id="{E732B49D-0F0B-121C-7663-0D96EEA2EFBE}"/>
+              </a:ext>
+            </a:extLst>
+          </p:cNvPr>
+          <p:cNvGrpSpPr/>
+          <p:nvPr/>
+        </p:nvGrpSpPr>
+        <p:grpSpPr>
+          <a:xfrm>
+            <a:off x="8098393" y="4495561"/>
+            <a:ext cx="557576" cy="534823"/>
+            <a:chOff x="6759588" y="4535956"/>
+            <a:chExt cx="557576" cy="534823"/>
+          </a:xfrm>
+        </p:grpSpPr>
+        <p:sp>
+          <p:nvSpPr>
+            <p:cNvPr id="49" name="Rounded Rectangle 48">
+              <a:extLst>
+                <a:ext uri="{FF2B5EF4-FFF2-40B4-BE49-F238E27FC236}">
+                  <a16:creationId xmlns:a16="http://schemas.microsoft.com/office/drawing/2014/main" id="{0E2D24DC-A929-85F2-ABED-9A7FAE60FFC0}"/>
+                </a:ext>
+              </a:extLst>
+            </p:cNvPr>
+            <p:cNvSpPr/>
+            <p:nvPr/>
+          </p:nvSpPr>
+          <p:spPr>
+            <a:xfrm>
+              <a:off x="6759588" y="4535956"/>
+              <a:ext cx="557576" cy="534823"/>
+            </a:xfrm>
+            <a:prstGeom prst="roundRect">
+              <a:avLst/>
+            </a:prstGeom>
+            <a:solidFill>
+              <a:srgbClr val="F9F4EA"/>
+            </a:solidFill>
+            <a:ln>
+              <a:noFill/>
+            </a:ln>
+          </p:spPr>
+          <p:style>
+            <a:lnRef idx="2">
+              <a:schemeClr val="accent1">
+                <a:shade val="15000"/>
+              </a:schemeClr>
+            </a:lnRef>
+            <a:fillRef idx="1">
+              <a:schemeClr val="accent1"/>
+            </a:fillRef>
+            <a:effectRef idx="0">
+              <a:schemeClr val="accent1"/>
+            </a:effectRef>
+            <a:fontRef idx="minor">
+              <a:schemeClr val="lt1"/>
+            </a:fontRef>
+          </p:style>
+          <p:txBody>
+            <a:bodyPr rtlCol="0" anchor="ctr"/>
+            <a:lstStyle/>
+            <a:p>
+              <a:pPr algn="ctr"/>
+              <a:endParaRPr lang="en-US"/>
+            </a:p>
+          </p:txBody>
+        </p:sp>
+        <p:pic>
+          <p:nvPicPr>
+            <p:cNvPr id="50" name="Picture 49">
+              <a:extLst>
+                <a:ext uri="{FF2B5EF4-FFF2-40B4-BE49-F238E27FC236}">
+                  <a16:creationId xmlns:a16="http://schemas.microsoft.com/office/drawing/2014/main" id="{66E0C6B1-CE2F-D4F2-91B1-A555070FBC40}"/>
+                </a:ext>
+              </a:extLst>
+            </p:cNvPr>
+            <p:cNvPicPr>
+              <a:picLocks noChangeAspect="1"/>
+            </p:cNvPicPr>
+            <p:nvPr/>
+          </p:nvPicPr>
+          <p:blipFill>
+            <a:blip r:embed="rId29">
+              <a:extLst>
+                <a:ext uri="{28A0092B-C50C-407E-A947-70E740481C1C}">
+                  <a14:useLocalDpi xmlns:a14="http://schemas.microsoft.com/office/drawing/2010/main" val="0"/>
+                </a:ext>
+              </a:extLst>
+            </a:blip>
+            <a:stretch>
+              <a:fillRect/>
+            </a:stretch>
+          </p:blipFill>
+          <p:spPr>
+            <a:xfrm>
+              <a:off x="6794115" y="4564534"/>
+              <a:ext cx="477346" cy="469888"/>
+            </a:xfrm>
+            <a:prstGeom prst="rect">
+              <a:avLst/>
+            </a:prstGeom>
+          </p:spPr>
+        </p:pic>
+      </p:grpSp>
+      <p:sp>
+        <p:nvSpPr>
+          <p:cNvPr id="51" name="TextBox 17">
+            <a:extLst>
+              <a:ext uri="{FF2B5EF4-FFF2-40B4-BE49-F238E27FC236}">
+                <a16:creationId xmlns:a16="http://schemas.microsoft.com/office/drawing/2014/main" id="{E0156F1A-F3B2-3D2C-AE37-1C9C5E66C8C6}"/>
+              </a:ext>
+            </a:extLst>
+          </p:cNvPr>
+          <p:cNvSpPr txBox="1">
+            <a:spLocks noChangeArrowheads="1"/>
+          </p:cNvSpPr>
+          <p:nvPr/>
+        </p:nvSpPr>
+        <p:spPr bwMode="auto">
+          <a:xfrm>
+            <a:off x="7640073" y="5074505"/>
+            <a:ext cx="1463040" cy="261610"/>
+          </a:xfrm>
+          <a:prstGeom prst="rect">
+            <a:avLst/>
+          </a:prstGeom>
+          <a:noFill/>
+          <a:ln>
+            <a:noFill/>
+          </a:ln>
+          <a:extLst>
+            <a:ext uri="{909E8E84-426E-40DD-AFC4-6F175D3DCCD1}">
+              <a14:hiddenFill xmlns:a14="http://schemas.microsoft.com/office/drawing/2010/main">
+                <a:solidFill>
+                  <a:srgbClr val="FFFFFF"/>
+                </a:solidFill>
+              </a14:hiddenFill>
+            </a:ext>
+            <a:ext uri="{91240B29-F687-4F45-9708-019B960494DF}">
+              <a14:hiddenLine xmlns:a14="http://schemas.microsoft.com/office/drawing/2010/main" w="9525">
+                <a:solidFill>
+                  <a:srgbClr val="000000"/>
+                </a:solidFill>
+                <a:miter lim="800000"/>
+                <a:headEnd/>
+                <a:tailEnd/>
+              </a14:hiddenLine>
+            </a:ext>
+          </a:extLst>
+        </p:spPr>
+        <p:txBody>
+          <a:bodyPr wrap="square">
+            <a:spAutoFit/>
+          </a:bodyPr>
+          <a:lstStyle>
+            <a:lvl1pPr>
+              <a:defRPr>
+                <a:solidFill>
+                  <a:schemeClr val="tx1"/>
+                </a:solidFill>
+                <a:latin typeface="Calibri" panose="020F0502020204030204" pitchFamily="34" charset="0"/>
+              </a:defRPr>
+            </a:lvl1pPr>
+            <a:lvl2pPr marL="742950" indent="-285750">
+              <a:defRPr>
+                <a:solidFill>
+                  <a:schemeClr val="tx1"/>
+                </a:solidFill>
+                <a:latin typeface="Calibri" panose="020F0502020204030204" pitchFamily="34" charset="0"/>
+              </a:defRPr>
+            </a:lvl2pPr>
+            <a:lvl3pPr marL="1143000" indent="-228600">
+              <a:defRPr>
+                <a:solidFill>
+                  <a:schemeClr val="tx1"/>
+                </a:solidFill>
+                <a:latin typeface="Calibri" panose="020F0502020204030204" pitchFamily="34" charset="0"/>
+              </a:defRPr>
+            </a:lvl3pPr>
+            <a:lvl4pPr marL="1600200" indent="-228600">
+              <a:defRPr>
+                <a:solidFill>
+                  <a:schemeClr val="tx1"/>
+                </a:solidFill>
+                <a:latin typeface="Calibri" panose="020F0502020204030204" pitchFamily="34" charset="0"/>
+              </a:defRPr>
+            </a:lvl4pPr>
+            <a:lvl5pPr marL="2057400" indent="-228600">
+              <a:defRPr>
+                <a:solidFill>
+                  <a:schemeClr val="tx1"/>
+                </a:solidFill>
+                <a:latin typeface="Calibri" panose="020F0502020204030204" pitchFamily="34" charset="0"/>
+              </a:defRPr>
+            </a:lvl5pPr>
+            <a:lvl6pPr marL="2514600" indent="-228600" eaLnBrk="0" fontAlgn="base" hangingPunct="0">
+              <a:spcBef>
+                <a:spcPct val="0"/>
+              </a:spcBef>
+              <a:spcAft>
+                <a:spcPct val="0"/>
+              </a:spcAft>
+              <a:defRPr>
+                <a:solidFill>
+                  <a:schemeClr val="tx1"/>
+                </a:solidFill>
+                <a:latin typeface="Calibri" panose="020F0502020204030204" pitchFamily="34" charset="0"/>
+              </a:defRPr>
+            </a:lvl6pPr>
+            <a:lvl7pPr marL="2971800" indent="-228600" eaLnBrk="0" fontAlgn="base" hangingPunct="0">
+              <a:spcBef>
+                <a:spcPct val="0"/>
+              </a:spcBef>
+              <a:spcAft>
+                <a:spcPct val="0"/>
+              </a:spcAft>
+              <a:defRPr>
+                <a:solidFill>
+                  <a:schemeClr val="tx1"/>
+                </a:solidFill>
+                <a:latin typeface="Calibri" panose="020F0502020204030204" pitchFamily="34" charset="0"/>
+              </a:defRPr>
+            </a:lvl7pPr>
+            <a:lvl8pPr marL="3429000" indent="-228600" eaLnBrk="0" fontAlgn="base" hangingPunct="0">
+              <a:spcBef>
+                <a:spcPct val="0"/>
+              </a:spcBef>
+              <a:spcAft>
+                <a:spcPct val="0"/>
+              </a:spcAft>
+              <a:defRPr>
+                <a:solidFill>
+                  <a:schemeClr val="tx1"/>
+                </a:solidFill>
+                <a:latin typeface="Calibri" panose="020F0502020204030204" pitchFamily="34" charset="0"/>
+              </a:defRPr>
+            </a:lvl8pPr>
+            <a:lvl9pPr marL="3886200" indent="-228600" eaLnBrk="0" fontAlgn="base" hangingPunct="0">
+              <a:spcBef>
+                <a:spcPct val="0"/>
+              </a:spcBef>
+              <a:spcAft>
+                <a:spcPct val="0"/>
+              </a:spcAft>
+              <a:defRPr>
+                <a:solidFill>
+                  <a:schemeClr val="tx1"/>
+                </a:solidFill>
+                <a:latin typeface="Calibri" panose="020F0502020204030204" pitchFamily="34" charset="0"/>
+              </a:defRPr>
+            </a:lvl9pPr>
+          </a:lstStyle>
+          <a:p>
+            <a:pPr algn="ctr" eaLnBrk="1" hangingPunct="1"/>
+            <a:r>
+              <a:rPr lang="en-US" altLang="en-US" sz="1100" dirty="0" err="1">
+                <a:latin typeface="Arial" panose="020B0604020202020204" pitchFamily="34" charset="0"/>
+                <a:ea typeface="Amazon Ember" panose="020B0603020204020204" pitchFamily="34" charset="0"/>
+                <a:cs typeface="Arial" panose="020B0604020202020204" pitchFamily="34" charset="0"/>
+              </a:rPr>
+              <a:t>Mendix</a:t>
+            </a:r>
+            <a:r>
+              <a:rPr lang="en-US" altLang="en-US" sz="1100" dirty="0">
+                <a:latin typeface="Arial" panose="020B0604020202020204" pitchFamily="34" charset="0"/>
+                <a:ea typeface="Amazon Ember" panose="020B0603020204020204" pitchFamily="34" charset="0"/>
+                <a:cs typeface="Arial" panose="020B0604020202020204" pitchFamily="34" charset="0"/>
+              </a:rPr>
+              <a:t> Agent</a:t>
+            </a:r>
+          </a:p>
+        </p:txBody>
+      </p:sp>
+      <p:sp>
+        <p:nvSpPr>
+          <p:cNvPr id="6" name="Rectangle 5">
+            <a:extLst>
+              <a:ext uri="{FF2B5EF4-FFF2-40B4-BE49-F238E27FC236}">
+                <a16:creationId xmlns:a16="http://schemas.microsoft.com/office/drawing/2014/main" id="{B88D01F9-097D-B29A-CCCF-DB53C78B04B1}"/>
+              </a:ext>
+            </a:extLst>
+          </p:cNvPr>
+          <p:cNvSpPr/>
+          <p:nvPr/>
+        </p:nvSpPr>
+        <p:spPr>
+          <a:xfrm>
+            <a:off x="12437529" y="275019"/>
+            <a:ext cx="1963991" cy="6438695"/>
+          </a:xfrm>
+          <a:prstGeom prst="rect">
+            <a:avLst/>
+          </a:prstGeom>
+          <a:noFill/>
+          <a:ln w="12700">
+            <a:solidFill>
+              <a:schemeClr val="tx1"/>
+            </a:solidFill>
+          </a:ln>
+        </p:spPr>
+        <p:style>
+          <a:lnRef idx="2">
+            <a:schemeClr val="accent1">
+              <a:shade val="50000"/>
+            </a:schemeClr>
+          </a:lnRef>
+          <a:fillRef idx="1">
+            <a:schemeClr val="accent1"/>
+          </a:fillRef>
+          <a:effectRef idx="0">
+            <a:schemeClr val="accent1"/>
+          </a:effectRef>
+          <a:fontRef idx="minor">
+            <a:schemeClr val="lt1"/>
+          </a:fontRef>
+        </p:style>
+        <p:txBody>
+          <a:bodyPr lIns="274320" tIns="91440"/>
+          <a:lstStyle/>
+          <a:p>
+            <a:pPr>
+              <a:defRPr/>
+            </a:pPr>
+            <a:r>
+              <a:rPr lang="en-US" sz="1200" dirty="0" err="1">
+                <a:solidFill>
+                  <a:sysClr val="windowText" lastClr="000000"/>
+                </a:solidFill>
+                <a:latin typeface="Arial" panose="020B0604020202020204" pitchFamily="34" charset="0"/>
+                <a:cs typeface="Arial" panose="020B0604020202020204" pitchFamily="34" charset="0"/>
+              </a:rPr>
+              <a:t>Mendix</a:t>
+            </a:r>
+            <a:r>
+              <a:rPr lang="en-US" sz="1200" dirty="0">
+                <a:solidFill>
+                  <a:sysClr val="windowText" lastClr="000000"/>
+                </a:solidFill>
+                <a:latin typeface="Arial" panose="020B0604020202020204" pitchFamily="34" charset="0"/>
+                <a:cs typeface="Arial" panose="020B0604020202020204" pitchFamily="34" charset="0"/>
+              </a:rPr>
+              <a:t> Infrastructure</a:t>
+            </a:r>
+          </a:p>
+        </p:txBody>
+      </p:sp>
+      <p:sp>
+        <p:nvSpPr>
+          <p:cNvPr id="18" name="Rounded Rectangle 17">
+            <a:extLst>
+              <a:ext uri="{FF2B5EF4-FFF2-40B4-BE49-F238E27FC236}">
+                <a16:creationId xmlns:a16="http://schemas.microsoft.com/office/drawing/2014/main" id="{8F35486D-2D8C-421A-96B2-48E233C898C9}"/>
+              </a:ext>
+            </a:extLst>
+          </p:cNvPr>
+          <p:cNvSpPr/>
+          <p:nvPr/>
+        </p:nvSpPr>
+        <p:spPr>
+          <a:xfrm>
+            <a:off x="12876811" y="4423091"/>
+            <a:ext cx="1054100" cy="680747"/>
+          </a:xfrm>
+          <a:prstGeom prst="roundRect">
+            <a:avLst/>
+          </a:prstGeom>
+          <a:solidFill>
+            <a:srgbClr val="146EF5"/>
+          </a:solidFill>
+          <a:ln>
+            <a:noFill/>
+          </a:ln>
+        </p:spPr>
+        <p:style>
+          <a:lnRef idx="2">
+            <a:schemeClr val="accent1">
+              <a:shade val="15000"/>
+            </a:schemeClr>
+          </a:lnRef>
+          <a:fillRef idx="1">
+            <a:schemeClr val="accent1"/>
+          </a:fillRef>
+          <a:effectRef idx="0">
+            <a:schemeClr val="accent1"/>
+          </a:effectRef>
+          <a:fontRef idx="minor">
+            <a:schemeClr val="lt1"/>
+          </a:fontRef>
+        </p:style>
+        <p:txBody>
+          <a:bodyPr rtlCol="0" anchor="ctr"/>
+          <a:lstStyle/>
+          <a:p>
+            <a:pPr algn="ctr"/>
+            <a:endParaRPr lang="en-US"/>
+          </a:p>
+        </p:txBody>
+      </p:sp>
+      <p:sp>
+        <p:nvSpPr>
+          <p:cNvPr id="24" name="TextBox 17">
+            <a:extLst>
+              <a:ext uri="{FF2B5EF4-FFF2-40B4-BE49-F238E27FC236}">
+                <a16:creationId xmlns:a16="http://schemas.microsoft.com/office/drawing/2014/main" id="{4EB18F1D-7E64-7FFB-084F-18D331B0D080}"/>
+              </a:ext>
+            </a:extLst>
+          </p:cNvPr>
+          <p:cNvSpPr txBox="1">
+            <a:spLocks noChangeArrowheads="1"/>
+          </p:cNvSpPr>
+          <p:nvPr/>
+        </p:nvSpPr>
+        <p:spPr bwMode="auto">
+          <a:xfrm>
+            <a:off x="12672341" y="5209692"/>
+            <a:ext cx="1463040" cy="261610"/>
+          </a:xfrm>
+          <a:prstGeom prst="rect">
+            <a:avLst/>
+          </a:prstGeom>
+          <a:noFill/>
+          <a:ln>
+            <a:noFill/>
+          </a:ln>
+          <a:extLst>
+            <a:ext uri="{909E8E84-426E-40DD-AFC4-6F175D3DCCD1}">
+              <a14:hiddenFill xmlns:a14="http://schemas.microsoft.com/office/drawing/2010/main">
+                <a:solidFill>
+                  <a:srgbClr val="FFFFFF"/>
+                </a:solidFill>
+              </a14:hiddenFill>
+            </a:ext>
+            <a:ext uri="{91240B29-F687-4F45-9708-019B960494DF}">
+              <a14:hiddenLine xmlns:a14="http://schemas.microsoft.com/office/drawing/2010/main" w="9525">
+                <a:solidFill>
+                  <a:srgbClr val="000000"/>
+                </a:solidFill>
+                <a:miter lim="800000"/>
+                <a:headEnd/>
+                <a:tailEnd/>
+              </a14:hiddenLine>
+            </a:ext>
+          </a:extLst>
+        </p:spPr>
+        <p:txBody>
+          <a:bodyPr wrap="square">
+            <a:spAutoFit/>
+          </a:bodyPr>
+          <a:lstStyle>
+            <a:lvl1pPr>
+              <a:defRPr>
+                <a:solidFill>
+                  <a:schemeClr val="tx1"/>
+                </a:solidFill>
+                <a:latin typeface="Calibri" panose="020F0502020204030204" pitchFamily="34" charset="0"/>
+              </a:defRPr>
+            </a:lvl1pPr>
+            <a:lvl2pPr marL="742950" indent="-285750">
+              <a:defRPr>
+                <a:solidFill>
+                  <a:schemeClr val="tx1"/>
+                </a:solidFill>
+                <a:latin typeface="Calibri" panose="020F0502020204030204" pitchFamily="34" charset="0"/>
+              </a:defRPr>
+            </a:lvl2pPr>
+            <a:lvl3pPr marL="1143000" indent="-228600">
+              <a:defRPr>
+                <a:solidFill>
+                  <a:schemeClr val="tx1"/>
+                </a:solidFill>
+                <a:latin typeface="Calibri" panose="020F0502020204030204" pitchFamily="34" charset="0"/>
+              </a:defRPr>
+            </a:lvl3pPr>
+            <a:lvl4pPr marL="1600200" indent="-228600">
+              <a:defRPr>
+                <a:solidFill>
+                  <a:schemeClr val="tx1"/>
+                </a:solidFill>
+                <a:latin typeface="Calibri" panose="020F0502020204030204" pitchFamily="34" charset="0"/>
+              </a:defRPr>
+            </a:lvl4pPr>
+            <a:lvl5pPr marL="2057400" indent="-228600">
+              <a:defRPr>
+                <a:solidFill>
+                  <a:schemeClr val="tx1"/>
+                </a:solidFill>
+                <a:latin typeface="Calibri" panose="020F0502020204030204" pitchFamily="34" charset="0"/>
+              </a:defRPr>
+            </a:lvl5pPr>
+            <a:lvl6pPr marL="2514600" indent="-228600" eaLnBrk="0" fontAlgn="base" hangingPunct="0">
+              <a:spcBef>
+                <a:spcPct val="0"/>
+              </a:spcBef>
+              <a:spcAft>
+                <a:spcPct val="0"/>
+              </a:spcAft>
+              <a:defRPr>
+                <a:solidFill>
+                  <a:schemeClr val="tx1"/>
+                </a:solidFill>
+                <a:latin typeface="Calibri" panose="020F0502020204030204" pitchFamily="34" charset="0"/>
+              </a:defRPr>
+            </a:lvl6pPr>
+            <a:lvl7pPr marL="2971800" indent="-228600" eaLnBrk="0" fontAlgn="base" hangingPunct="0">
+              <a:spcBef>
+                <a:spcPct val="0"/>
+              </a:spcBef>
+              <a:spcAft>
+                <a:spcPct val="0"/>
+              </a:spcAft>
+              <a:defRPr>
+                <a:solidFill>
+                  <a:schemeClr val="tx1"/>
+                </a:solidFill>
+                <a:latin typeface="Calibri" panose="020F0502020204030204" pitchFamily="34" charset="0"/>
+              </a:defRPr>
+            </a:lvl7pPr>
+            <a:lvl8pPr marL="3429000" indent="-228600" eaLnBrk="0" fontAlgn="base" hangingPunct="0">
+              <a:spcBef>
+                <a:spcPct val="0"/>
+              </a:spcBef>
+              <a:spcAft>
+                <a:spcPct val="0"/>
+              </a:spcAft>
+              <a:defRPr>
+                <a:solidFill>
+                  <a:schemeClr val="tx1"/>
+                </a:solidFill>
+                <a:latin typeface="Calibri" panose="020F0502020204030204" pitchFamily="34" charset="0"/>
+              </a:defRPr>
+            </a:lvl8pPr>
+            <a:lvl9pPr marL="3886200" indent="-228600" eaLnBrk="0" fontAlgn="base" hangingPunct="0">
+              <a:spcBef>
+                <a:spcPct val="0"/>
+              </a:spcBef>
+              <a:spcAft>
+                <a:spcPct val="0"/>
+              </a:spcAft>
+              <a:defRPr>
+                <a:solidFill>
+                  <a:schemeClr val="tx1"/>
+                </a:solidFill>
+                <a:latin typeface="Calibri" panose="020F0502020204030204" pitchFamily="34" charset="0"/>
+              </a:defRPr>
+            </a:lvl9pPr>
+          </a:lstStyle>
+          <a:p>
+            <a:pPr algn="ctr" eaLnBrk="1" hangingPunct="1"/>
+            <a:r>
+              <a:rPr lang="en-US" altLang="en-US" sz="1100" dirty="0">
+                <a:latin typeface="Arial" panose="020B0604020202020204" pitchFamily="34" charset="0"/>
+                <a:ea typeface="Amazon Ember" panose="020B0603020204020204" pitchFamily="34" charset="0"/>
+                <a:cs typeface="Arial" panose="020B0604020202020204" pitchFamily="34" charset="0"/>
+              </a:rPr>
+              <a:t>Interactor</a:t>
+            </a:r>
+          </a:p>
+        </p:txBody>
+      </p:sp>
+      <p:sp>
+        <p:nvSpPr>
+          <p:cNvPr id="25" name="Rounded Rectangle 24">
+            <a:extLst>
+              <a:ext uri="{FF2B5EF4-FFF2-40B4-BE49-F238E27FC236}">
+                <a16:creationId xmlns:a16="http://schemas.microsoft.com/office/drawing/2014/main" id="{0BA49A2D-5D63-9138-5B8D-34A7501ACA9A}"/>
+              </a:ext>
+            </a:extLst>
+          </p:cNvPr>
+          <p:cNvSpPr/>
+          <p:nvPr/>
+        </p:nvSpPr>
+        <p:spPr>
+          <a:xfrm>
+            <a:off x="12879213" y="1386438"/>
+            <a:ext cx="1054100" cy="680747"/>
+          </a:xfrm>
+          <a:prstGeom prst="roundRect">
+            <a:avLst/>
+          </a:prstGeom>
+          <a:solidFill>
+            <a:srgbClr val="146EF5"/>
+          </a:solidFill>
+          <a:ln>
+            <a:noFill/>
+          </a:ln>
+        </p:spPr>
+        <p:style>
+          <a:lnRef idx="2">
+            <a:schemeClr val="accent1">
+              <a:shade val="15000"/>
+            </a:schemeClr>
+          </a:lnRef>
+          <a:fillRef idx="1">
+            <a:schemeClr val="accent1"/>
+          </a:fillRef>
+          <a:effectRef idx="0">
+            <a:schemeClr val="accent1"/>
+          </a:effectRef>
+          <a:fontRef idx="minor">
+            <a:schemeClr val="lt1"/>
+          </a:fontRef>
+        </p:style>
+        <p:txBody>
+          <a:bodyPr rtlCol="0" anchor="ctr"/>
+          <a:lstStyle/>
+          <a:p>
+            <a:pPr algn="ctr"/>
+            <a:endParaRPr lang="en-US"/>
+          </a:p>
+        </p:txBody>
+      </p:sp>
+      <p:sp>
+        <p:nvSpPr>
+          <p:cNvPr id="26" name="TextBox 17">
+            <a:extLst>
+              <a:ext uri="{FF2B5EF4-FFF2-40B4-BE49-F238E27FC236}">
+                <a16:creationId xmlns:a16="http://schemas.microsoft.com/office/drawing/2014/main" id="{7204EE57-2FFE-DD0B-458A-0ADCCE4A9CDE}"/>
+              </a:ext>
+            </a:extLst>
+          </p:cNvPr>
+          <p:cNvSpPr txBox="1">
+            <a:spLocks noChangeArrowheads="1"/>
+          </p:cNvSpPr>
+          <p:nvPr/>
+        </p:nvSpPr>
+        <p:spPr bwMode="auto">
+          <a:xfrm>
+            <a:off x="12674743" y="2173039"/>
+            <a:ext cx="1463040" cy="261610"/>
+          </a:xfrm>
+          <a:prstGeom prst="rect">
+            <a:avLst/>
+          </a:prstGeom>
+          <a:noFill/>
+          <a:ln>
+            <a:noFill/>
+          </a:ln>
+          <a:extLst>
+            <a:ext uri="{909E8E84-426E-40DD-AFC4-6F175D3DCCD1}">
+              <a14:hiddenFill xmlns:a14="http://schemas.microsoft.com/office/drawing/2010/main">
+                <a:solidFill>
+                  <a:srgbClr val="FFFFFF"/>
+                </a:solidFill>
+              </a14:hiddenFill>
+            </a:ext>
+            <a:ext uri="{91240B29-F687-4F45-9708-019B960494DF}">
+              <a14:hiddenLine xmlns:a14="http://schemas.microsoft.com/office/drawing/2010/main" w="9525">
+                <a:solidFill>
+                  <a:srgbClr val="000000"/>
+                </a:solidFill>
+                <a:miter lim="800000"/>
+                <a:headEnd/>
+                <a:tailEnd/>
+              </a14:hiddenLine>
+            </a:ext>
+          </a:extLst>
+        </p:spPr>
+        <p:txBody>
+          <a:bodyPr wrap="square">
+            <a:spAutoFit/>
+          </a:bodyPr>
+          <a:lstStyle>
+            <a:lvl1pPr>
+              <a:defRPr>
+                <a:solidFill>
+                  <a:schemeClr val="tx1"/>
+                </a:solidFill>
+                <a:latin typeface="Calibri" panose="020F0502020204030204" pitchFamily="34" charset="0"/>
+              </a:defRPr>
+            </a:lvl1pPr>
+            <a:lvl2pPr marL="742950" indent="-285750">
+              <a:defRPr>
+                <a:solidFill>
+                  <a:schemeClr val="tx1"/>
+                </a:solidFill>
+                <a:latin typeface="Calibri" panose="020F0502020204030204" pitchFamily="34" charset="0"/>
+              </a:defRPr>
+            </a:lvl2pPr>
+            <a:lvl3pPr marL="1143000" indent="-228600">
+              <a:defRPr>
+                <a:solidFill>
+                  <a:schemeClr val="tx1"/>
+                </a:solidFill>
+                <a:latin typeface="Calibri" panose="020F0502020204030204" pitchFamily="34" charset="0"/>
+              </a:defRPr>
+            </a:lvl3pPr>
+            <a:lvl4pPr marL="1600200" indent="-228600">
+              <a:defRPr>
+                <a:solidFill>
+                  <a:schemeClr val="tx1"/>
+                </a:solidFill>
+                <a:latin typeface="Calibri" panose="020F0502020204030204" pitchFamily="34" charset="0"/>
+              </a:defRPr>
+            </a:lvl4pPr>
+            <a:lvl5pPr marL="2057400" indent="-228600">
+              <a:defRPr>
+                <a:solidFill>
+                  <a:schemeClr val="tx1"/>
+                </a:solidFill>
+                <a:latin typeface="Calibri" panose="020F0502020204030204" pitchFamily="34" charset="0"/>
+              </a:defRPr>
+            </a:lvl5pPr>
+            <a:lvl6pPr marL="2514600" indent="-228600" eaLnBrk="0" fontAlgn="base" hangingPunct="0">
+              <a:spcBef>
+                <a:spcPct val="0"/>
+              </a:spcBef>
+              <a:spcAft>
+                <a:spcPct val="0"/>
+              </a:spcAft>
+              <a:defRPr>
+                <a:solidFill>
+                  <a:schemeClr val="tx1"/>
+                </a:solidFill>
+                <a:latin typeface="Calibri" panose="020F0502020204030204" pitchFamily="34" charset="0"/>
+              </a:defRPr>
+            </a:lvl6pPr>
+            <a:lvl7pPr marL="2971800" indent="-228600" eaLnBrk="0" fontAlgn="base" hangingPunct="0">
+              <a:spcBef>
+                <a:spcPct val="0"/>
+              </a:spcBef>
+              <a:spcAft>
+                <a:spcPct val="0"/>
+              </a:spcAft>
+              <a:defRPr>
+                <a:solidFill>
+                  <a:schemeClr val="tx1"/>
+                </a:solidFill>
+                <a:latin typeface="Calibri" panose="020F0502020204030204" pitchFamily="34" charset="0"/>
+              </a:defRPr>
+            </a:lvl7pPr>
+            <a:lvl8pPr marL="3429000" indent="-228600" eaLnBrk="0" fontAlgn="base" hangingPunct="0">
+              <a:spcBef>
+                <a:spcPct val="0"/>
+              </a:spcBef>
+              <a:spcAft>
+                <a:spcPct val="0"/>
+              </a:spcAft>
+              <a:defRPr>
+                <a:solidFill>
+                  <a:schemeClr val="tx1"/>
+                </a:solidFill>
+                <a:latin typeface="Calibri" panose="020F0502020204030204" pitchFamily="34" charset="0"/>
+              </a:defRPr>
+            </a:lvl8pPr>
+            <a:lvl9pPr marL="3886200" indent="-228600" eaLnBrk="0" fontAlgn="base" hangingPunct="0">
+              <a:spcBef>
+                <a:spcPct val="0"/>
+              </a:spcBef>
+              <a:spcAft>
+                <a:spcPct val="0"/>
+              </a:spcAft>
+              <a:defRPr>
+                <a:solidFill>
+                  <a:schemeClr val="tx1"/>
+                </a:solidFill>
+                <a:latin typeface="Calibri" panose="020F0502020204030204" pitchFamily="34" charset="0"/>
+              </a:defRPr>
+            </a:lvl9pPr>
+          </a:lstStyle>
+          <a:p>
+            <a:pPr algn="ctr" eaLnBrk="1" hangingPunct="1"/>
+            <a:r>
+              <a:rPr lang="en-US" altLang="en-US" sz="1100" dirty="0">
+                <a:latin typeface="Arial" panose="020B0604020202020204" pitchFamily="34" charset="0"/>
+                <a:ea typeface="Amazon Ember" panose="020B0603020204020204" pitchFamily="34" charset="0"/>
+                <a:cs typeface="Arial" panose="020B0604020202020204" pitchFamily="34" charset="0"/>
+              </a:rPr>
+              <a:t>Private Cloud Portal</a:t>
+            </a:r>
+          </a:p>
+        </p:txBody>
+      </p:sp>
+      <p:cxnSp>
+        <p:nvCxnSpPr>
+          <p:cNvPr id="27" name="Straight Arrow Connector 26">
+            <a:extLst>
+              <a:ext uri="{FF2B5EF4-FFF2-40B4-BE49-F238E27FC236}">
+                <a16:creationId xmlns:a16="http://schemas.microsoft.com/office/drawing/2014/main" id="{E63ED384-A3EC-38FD-E53A-BEAFC99CB86D}"/>
+              </a:ext>
+            </a:extLst>
+          </p:cNvPr>
+          <p:cNvCxnSpPr>
+            <a:cxnSpLocks/>
+            <a:stCxn id="49" idx="3"/>
+            <a:endCxn id="18" idx="1"/>
+          </p:cNvCxnSpPr>
+          <p:nvPr/>
+        </p:nvCxnSpPr>
+        <p:spPr>
+          <a:xfrm>
+            <a:off x="8655969" y="4762973"/>
+            <a:ext cx="4220842" cy="492"/>
+          </a:xfrm>
+          <a:prstGeom prst="straightConnector1">
+            <a:avLst/>
+          </a:prstGeom>
+          <a:ln w="12700">
+            <a:solidFill>
+              <a:srgbClr val="545B64"/>
+            </a:solidFill>
+            <a:headEnd type="triangle" w="med" len="sm"/>
+            <a:tailEnd type="triangle" w="med" len="med"/>
+          </a:ln>
+        </p:spPr>
+        <p:style>
+          <a:lnRef idx="1">
+            <a:schemeClr val="accent1"/>
+          </a:lnRef>
+          <a:fillRef idx="0">
+            <a:schemeClr val="accent1"/>
+          </a:fillRef>
+          <a:effectRef idx="0">
+            <a:schemeClr val="accent1"/>
+          </a:effectRef>
+          <a:fontRef idx="minor">
+            <a:schemeClr val="tx1"/>
+          </a:fontRef>
+        </p:style>
+      </p:cxnSp>
+      <p:cxnSp>
+        <p:nvCxnSpPr>
+          <p:cNvPr id="32" name="Straight Arrow Connector 31">
+            <a:extLst>
+              <a:ext uri="{FF2B5EF4-FFF2-40B4-BE49-F238E27FC236}">
+                <a16:creationId xmlns:a16="http://schemas.microsoft.com/office/drawing/2014/main" id="{7639A1B7-549B-2317-F651-5EB0C460482E}"/>
+              </a:ext>
+            </a:extLst>
+          </p:cNvPr>
+          <p:cNvCxnSpPr>
+            <a:cxnSpLocks/>
+            <a:stCxn id="25" idx="2"/>
+            <a:endCxn id="18" idx="0"/>
+          </p:cNvCxnSpPr>
+          <p:nvPr/>
+        </p:nvCxnSpPr>
+        <p:spPr>
+          <a:xfrm flipH="1">
+            <a:off x="13403861" y="2067185"/>
+            <a:ext cx="2402" cy="2355906"/>
+          </a:xfrm>
+          <a:prstGeom prst="straightConnector1">
+            <a:avLst/>
+          </a:prstGeom>
+          <a:ln w="12700">
+            <a:solidFill>
+              <a:srgbClr val="545B64"/>
+            </a:solidFill>
+            <a:headEnd type="triangle" w="med" len="sm"/>
+            <a:tailEnd type="triangle" w="med" len="med"/>
+          </a:ln>
+        </p:spPr>
+        <p:style>
+          <a:lnRef idx="1">
+            <a:schemeClr val="accent1"/>
+          </a:lnRef>
+          <a:fillRef idx="0">
+            <a:schemeClr val="accent1"/>
+          </a:fillRef>
+          <a:effectRef idx="0">
+            <a:schemeClr val="accent1"/>
+          </a:effectRef>
+          <a:fontRef idx="minor">
+            <a:schemeClr val="tx1"/>
+          </a:fontRef>
+        </p:style>
+      </p:cxnSp>
+      <p:pic>
+        <p:nvPicPr>
+          <p:cNvPr id="65" name="Graphic 23">
+            <a:extLst>
+              <a:ext uri="{FF2B5EF4-FFF2-40B4-BE49-F238E27FC236}">
+                <a16:creationId xmlns:a16="http://schemas.microsoft.com/office/drawing/2014/main" id="{95899FE8-2479-28B1-2913-6E769D645E71}"/>
+              </a:ext>
+            </a:extLst>
+          </p:cNvPr>
+          <p:cNvPicPr>
+            <a:picLocks noChangeAspect="1" noChangeArrowheads="1"/>
+          </p:cNvPicPr>
+          <p:nvPr/>
+        </p:nvPicPr>
+        <p:blipFill>
+          <a:blip r:embed="rId20">
+            <a:extLst>
+              <a:ext uri="{96DAC541-7B7A-43D3-8B79-37D633B846F1}">
+                <asvg:svgBlip xmlns:asvg="http://schemas.microsoft.com/office/drawing/2016/SVG/main" r:embed="rId21"/>
+              </a:ext>
+            </a:extLst>
+          </a:blip>
+          <a:srcRect/>
+          <a:stretch/>
+        </p:blipFill>
+        <p:spPr bwMode="auto">
+          <a:xfrm flipH="1">
+            <a:off x="15051899" y="1496804"/>
+            <a:ext cx="469900" cy="469900"/>
+          </a:xfrm>
+          <a:prstGeom prst="rect">
+            <a:avLst/>
+          </a:prstGeom>
+          <a:noFill/>
+          <a:ln>
+            <a:noFill/>
+          </a:ln>
+          <a:extLst>
+            <a:ext uri="{909E8E84-426E-40DD-AFC4-6F175D3DCCD1}">
+              <a14:hiddenFill xmlns:a14="http://schemas.microsoft.com/office/drawing/2010/main">
+                <a:solidFill>
+                  <a:srgbClr val="FFFFFF"/>
+                </a:solidFill>
+              </a14:hiddenFill>
+            </a:ext>
+            <a:ext uri="{91240B29-F687-4F45-9708-019B960494DF}">
+              <a14:hiddenLine xmlns:a14="http://schemas.microsoft.com/office/drawing/2010/main" w="9525">
+                <a:solidFill>
+                  <a:srgbClr val="000000"/>
+                </a:solidFill>
+                <a:miter lim="800000"/>
+                <a:headEnd/>
+                <a:tailEnd/>
+              </a14:hiddenLine>
+            </a:ext>
+          </a:extLst>
+        </p:spPr>
+      </p:pic>
+      <p:sp>
+        <p:nvSpPr>
+          <p:cNvPr id="68" name="TextBox 40">
+            <a:extLst>
+              <a:ext uri="{FF2B5EF4-FFF2-40B4-BE49-F238E27FC236}">
+                <a16:creationId xmlns:a16="http://schemas.microsoft.com/office/drawing/2014/main" id="{296DA78F-911F-DC31-E77C-4A547F096CCD}"/>
+              </a:ext>
+            </a:extLst>
+          </p:cNvPr>
+          <p:cNvSpPr txBox="1">
+            <a:spLocks noChangeArrowheads="1"/>
+          </p:cNvSpPr>
+          <p:nvPr/>
+        </p:nvSpPr>
+        <p:spPr bwMode="auto">
+          <a:xfrm>
+            <a:off x="14708383" y="1999124"/>
+            <a:ext cx="1049296" cy="261610"/>
+          </a:xfrm>
+          <a:prstGeom prst="rect">
+            <a:avLst/>
+          </a:prstGeom>
+          <a:noFill/>
+          <a:ln>
+            <a:noFill/>
+          </a:ln>
+          <a:extLst>
+            <a:ext uri="{909E8E84-426E-40DD-AFC4-6F175D3DCCD1}">
+              <a14:hiddenFill xmlns:a14="http://schemas.microsoft.com/office/drawing/2010/main">
+                <a:solidFill>
+                  <a:srgbClr val="FFFFFF"/>
+                </a:solidFill>
+              </a14:hiddenFill>
+            </a:ext>
+            <a:ext uri="{91240B29-F687-4F45-9708-019B960494DF}">
+              <a14:hiddenLine xmlns:a14="http://schemas.microsoft.com/office/drawing/2010/main" w="9525">
+                <a:solidFill>
+                  <a:srgbClr val="000000"/>
+                </a:solidFill>
+                <a:miter lim="800000"/>
+                <a:headEnd/>
+                <a:tailEnd/>
+              </a14:hiddenLine>
+            </a:ext>
+          </a:extLst>
+        </p:spPr>
+        <p:txBody>
+          <a:bodyPr wrap="square">
+            <a:spAutoFit/>
+          </a:bodyPr>
+          <a:lstStyle>
+            <a:lvl1pPr>
+              <a:defRPr>
+                <a:solidFill>
+                  <a:schemeClr val="tx1"/>
+                </a:solidFill>
+                <a:latin typeface="Calibri" panose="020F0502020204030204" pitchFamily="34" charset="0"/>
+              </a:defRPr>
+            </a:lvl1pPr>
+            <a:lvl2pPr marL="742950" indent="-285750">
+              <a:defRPr>
+                <a:solidFill>
+                  <a:schemeClr val="tx1"/>
+                </a:solidFill>
+                <a:latin typeface="Calibri" panose="020F0502020204030204" pitchFamily="34" charset="0"/>
+              </a:defRPr>
+            </a:lvl2pPr>
+            <a:lvl3pPr marL="1143000" indent="-228600">
+              <a:defRPr>
+                <a:solidFill>
+                  <a:schemeClr val="tx1"/>
+                </a:solidFill>
+                <a:latin typeface="Calibri" panose="020F0502020204030204" pitchFamily="34" charset="0"/>
+              </a:defRPr>
+            </a:lvl3pPr>
+            <a:lvl4pPr marL="1600200" indent="-228600">
+              <a:defRPr>
+                <a:solidFill>
+                  <a:schemeClr val="tx1"/>
+                </a:solidFill>
+                <a:latin typeface="Calibri" panose="020F0502020204030204" pitchFamily="34" charset="0"/>
+              </a:defRPr>
+            </a:lvl4pPr>
+            <a:lvl5pPr marL="2057400" indent="-228600">
+              <a:defRPr>
+                <a:solidFill>
+                  <a:schemeClr val="tx1"/>
+                </a:solidFill>
+                <a:latin typeface="Calibri" panose="020F0502020204030204" pitchFamily="34" charset="0"/>
+              </a:defRPr>
+            </a:lvl5pPr>
+            <a:lvl6pPr marL="2514600" indent="-228600" eaLnBrk="0" fontAlgn="base" hangingPunct="0">
+              <a:spcBef>
+                <a:spcPct val="0"/>
+              </a:spcBef>
+              <a:spcAft>
+                <a:spcPct val="0"/>
+              </a:spcAft>
+              <a:defRPr>
+                <a:solidFill>
+                  <a:schemeClr val="tx1"/>
+                </a:solidFill>
+                <a:latin typeface="Calibri" panose="020F0502020204030204" pitchFamily="34" charset="0"/>
+              </a:defRPr>
+            </a:lvl6pPr>
+            <a:lvl7pPr marL="2971800" indent="-228600" eaLnBrk="0" fontAlgn="base" hangingPunct="0">
+              <a:spcBef>
+                <a:spcPct val="0"/>
+              </a:spcBef>
+              <a:spcAft>
+                <a:spcPct val="0"/>
+              </a:spcAft>
+              <a:defRPr>
+                <a:solidFill>
+                  <a:schemeClr val="tx1"/>
+                </a:solidFill>
+                <a:latin typeface="Calibri" panose="020F0502020204030204" pitchFamily="34" charset="0"/>
+              </a:defRPr>
+            </a:lvl7pPr>
+            <a:lvl8pPr marL="3429000" indent="-228600" eaLnBrk="0" fontAlgn="base" hangingPunct="0">
+              <a:spcBef>
+                <a:spcPct val="0"/>
+              </a:spcBef>
+              <a:spcAft>
+                <a:spcPct val="0"/>
+              </a:spcAft>
+              <a:defRPr>
+                <a:solidFill>
+                  <a:schemeClr val="tx1"/>
+                </a:solidFill>
+                <a:latin typeface="Calibri" panose="020F0502020204030204" pitchFamily="34" charset="0"/>
+              </a:defRPr>
+            </a:lvl8pPr>
+            <a:lvl9pPr marL="3886200" indent="-228600" eaLnBrk="0" fontAlgn="base" hangingPunct="0">
+              <a:spcBef>
+                <a:spcPct val="0"/>
+              </a:spcBef>
+              <a:spcAft>
+                <a:spcPct val="0"/>
+              </a:spcAft>
+              <a:defRPr>
+                <a:solidFill>
+                  <a:schemeClr val="tx1"/>
+                </a:solidFill>
+                <a:latin typeface="Calibri" panose="020F0502020204030204" pitchFamily="34" charset="0"/>
+              </a:defRPr>
+            </a:lvl9pPr>
+          </a:lstStyle>
+          <a:p>
+            <a:pPr algn="ctr" eaLnBrk="1" hangingPunct="1"/>
+            <a:r>
+              <a:rPr lang="en-US" altLang="en-US" sz="1100" dirty="0">
+                <a:solidFill>
+                  <a:srgbClr val="000000"/>
+                </a:solidFill>
+                <a:latin typeface="Arial" panose="020B0604020202020204" pitchFamily="34" charset="0"/>
+                <a:cs typeface="Arial" panose="020B0604020202020204" pitchFamily="34" charset="0"/>
+              </a:rPr>
+              <a:t>Developers</a:t>
+            </a:r>
+          </a:p>
+        </p:txBody>
+      </p:sp>
+      <p:cxnSp>
+        <p:nvCxnSpPr>
+          <p:cNvPr id="69" name="Straight Arrow Connector 68">
+            <a:extLst>
+              <a:ext uri="{FF2B5EF4-FFF2-40B4-BE49-F238E27FC236}">
+                <a16:creationId xmlns:a16="http://schemas.microsoft.com/office/drawing/2014/main" id="{CFBFEA4C-0104-B427-F960-87E27990B2FE}"/>
+              </a:ext>
+            </a:extLst>
+          </p:cNvPr>
+          <p:cNvCxnSpPr>
+            <a:cxnSpLocks/>
+            <a:stCxn id="25" idx="3"/>
+            <a:endCxn id="65" idx="3"/>
+          </p:cNvCxnSpPr>
+          <p:nvPr/>
+        </p:nvCxnSpPr>
+        <p:spPr>
+          <a:xfrm>
+            <a:off x="13933313" y="1726812"/>
+            <a:ext cx="1118586" cy="4942"/>
+          </a:xfrm>
+          <a:prstGeom prst="straightConnector1">
+            <a:avLst/>
+          </a:prstGeom>
+          <a:ln w="12700">
+            <a:solidFill>
+              <a:srgbClr val="545B64"/>
+            </a:solidFill>
+            <a:headEnd type="triangle" w="med" len="sm"/>
+            <a:tailEnd type="triangle" w="med" len="med"/>
+          </a:ln>
+        </p:spPr>
+        <p:style>
+          <a:lnRef idx="1">
+            <a:schemeClr val="accent1"/>
+          </a:lnRef>
+          <a:fillRef idx="0">
+            <a:schemeClr val="accent1"/>
+          </a:fillRef>
+          <a:effectRef idx="0">
+            <a:schemeClr val="accent1"/>
+          </a:effectRef>
+          <a:fontRef idx="minor">
+            <a:schemeClr val="tx1"/>
+          </a:fontRef>
+        </p:style>
+      </p:cxnSp>
+      <p:sp>
+        <p:nvSpPr>
+          <p:cNvPr id="76" name="TextBox 75">
+            <a:extLst>
+              <a:ext uri="{FF2B5EF4-FFF2-40B4-BE49-F238E27FC236}">
+                <a16:creationId xmlns:a16="http://schemas.microsoft.com/office/drawing/2014/main" id="{DE074D24-DD13-BCA7-D04C-C931AF3CA872}"/>
+              </a:ext>
+            </a:extLst>
+          </p:cNvPr>
+          <p:cNvSpPr txBox="1"/>
+          <p:nvPr/>
+        </p:nvSpPr>
+        <p:spPr>
+          <a:xfrm>
+            <a:off x="10078613" y="4539483"/>
+            <a:ext cx="1506246" cy="461665"/>
+          </a:xfrm>
+          <a:prstGeom prst="rect">
+            <a:avLst/>
+          </a:prstGeom>
+          <a:noFill/>
+        </p:spPr>
+        <p:txBody>
+          <a:bodyPr wrap="none" rtlCol="0">
+            <a:spAutoFit/>
+          </a:bodyPr>
+          <a:lstStyle/>
+          <a:p>
+            <a:pPr algn="ctr"/>
+            <a:r>
+              <a:rPr lang="en-US" sz="1200" dirty="0"/>
+              <a:t>Secured Bidirectional</a:t>
+            </a:r>
+          </a:p>
+          <a:p>
+            <a:pPr algn="ctr"/>
+            <a:r>
+              <a:rPr lang="en-US" sz="1200" dirty="0"/>
+              <a:t>Connection</a:t>
             </a:r>
           </a:p>
         </p:txBody>
@@ -8169,4 +10185,10 @@
     </a:ext>
   </a:extLst>
 </a:theme>
+</file>
+
+<file path=docMetadata/LabelInfo.xml><?xml version="1.0" encoding="utf-8"?>
+<clbl:labelList xmlns:clbl="http://schemas.microsoft.com/office/2020/mipLabelMetadata">
+  <clbl:label id="{9d258917-277f-42cd-a3cd-14c4e9ee58bc}" enabled="1" method="Standard" siteId="{38ae3bcd-9579-4fd4-adda-b42e1495d55a}" contentBits="0" removed="0"/>
+</clbl:labelList>
 </file>
</xml_diff>

<commit_message>
Align diagram with guidelines.
</commit_message>
<xml_diff>
--- a/doc/deployment_guide/images/terraform-mendix-private-cloud-diagram.pptx
+++ b/doc/deployment_guide/images/terraform-mendix-private-cloud-diagram.pptx
@@ -4,6 +4,9 @@
   <p:sldMasterIdLst>
     <p:sldMasterId id="2147483756" r:id="rId1"/>
   </p:sldMasterIdLst>
+  <p:notesMasterIdLst>
+    <p:notesMasterId r:id="rId3"/>
+  </p:notesMasterIdLst>
   <p:sldIdLst>
     <p:sldId id="256" r:id="rId2"/>
   </p:sldIdLst>
@@ -110,6 +113,439 @@
     </p:ext>
   </p:extLst>
 </p:presentation>
+</file>
+
+<file path=ppt/notesMasters/notesMaster1.xml><?xml version="1.0" encoding="utf-8"?>
+<p:notesMaster xmlns:a="http://schemas.openxmlformats.org/drawingml/2006/main" xmlns:r="http://schemas.openxmlformats.org/officeDocument/2006/relationships" xmlns:p="http://schemas.openxmlformats.org/presentationml/2006/main">
+  <p:cSld>
+    <p:bg>
+      <p:bgRef idx="1001">
+        <a:schemeClr val="bg1"/>
+      </p:bgRef>
+    </p:bg>
+    <p:spTree>
+      <p:nvGrpSpPr>
+        <p:cNvPr id="1" name=""/>
+        <p:cNvGrpSpPr/>
+        <p:nvPr/>
+      </p:nvGrpSpPr>
+      <p:grpSpPr>
+        <a:xfrm>
+          <a:off x="0" y="0"/>
+          <a:ext cx="0" cy="0"/>
+          <a:chOff x="0" y="0"/>
+          <a:chExt cx="0" cy="0"/>
+        </a:xfrm>
+      </p:grpSpPr>
+      <p:sp>
+        <p:nvSpPr>
+          <p:cNvPr id="2" name="Header Placeholder 1"/>
+          <p:cNvSpPr>
+            <a:spLocks noGrp="1"/>
+          </p:cNvSpPr>
+          <p:nvPr>
+            <p:ph type="hdr" sz="quarter"/>
+          </p:nvPr>
+        </p:nvSpPr>
+        <p:spPr>
+          <a:xfrm>
+            <a:off x="0" y="0"/>
+            <a:ext cx="2971800" cy="458788"/>
+          </a:xfrm>
+          <a:prstGeom prst="rect">
+            <a:avLst/>
+          </a:prstGeom>
+        </p:spPr>
+        <p:txBody>
+          <a:bodyPr vert="horz" lIns="91440" tIns="45720" rIns="91440" bIns="45720" rtlCol="0"/>
+          <a:lstStyle>
+            <a:lvl1pPr algn="l">
+              <a:defRPr sz="1200"/>
+            </a:lvl1pPr>
+          </a:lstStyle>
+          <a:p>
+            <a:endParaRPr lang="en-US"/>
+          </a:p>
+        </p:txBody>
+      </p:sp>
+      <p:sp>
+        <p:nvSpPr>
+          <p:cNvPr id="3" name="Date Placeholder 2"/>
+          <p:cNvSpPr>
+            <a:spLocks noGrp="1"/>
+          </p:cNvSpPr>
+          <p:nvPr>
+            <p:ph type="dt" idx="1"/>
+          </p:nvPr>
+        </p:nvSpPr>
+        <p:spPr>
+          <a:xfrm>
+            <a:off x="3884613" y="0"/>
+            <a:ext cx="2971800" cy="458788"/>
+          </a:xfrm>
+          <a:prstGeom prst="rect">
+            <a:avLst/>
+          </a:prstGeom>
+        </p:spPr>
+        <p:txBody>
+          <a:bodyPr vert="horz" lIns="91440" tIns="45720" rIns="91440" bIns="45720" rtlCol="0"/>
+          <a:lstStyle>
+            <a:lvl1pPr algn="r">
+              <a:defRPr sz="1200"/>
+            </a:lvl1pPr>
+          </a:lstStyle>
+          <a:p>
+            <a:fld id="{DBF2D1EC-7E09-7C44-BCDA-73E56E743540}" type="datetimeFigureOut">
+              <a:rPr lang="en-US" smtClean="0"/>
+              <a:t>4/28/25</a:t>
+            </a:fld>
+            <a:endParaRPr lang="en-US"/>
+          </a:p>
+        </p:txBody>
+      </p:sp>
+      <p:sp>
+        <p:nvSpPr>
+          <p:cNvPr id="4" name="Slide Image Placeholder 3"/>
+          <p:cNvSpPr>
+            <a:spLocks noGrp="1" noRot="1" noChangeAspect="1"/>
+          </p:cNvSpPr>
+          <p:nvPr>
+            <p:ph type="sldImg" idx="2"/>
+          </p:nvPr>
+        </p:nvSpPr>
+        <p:spPr>
+          <a:xfrm>
+            <a:off x="-73025" y="1143000"/>
+            <a:ext cx="7004050" cy="3086100"/>
+          </a:xfrm>
+          <a:prstGeom prst="rect">
+            <a:avLst/>
+          </a:prstGeom>
+          <a:noFill/>
+          <a:ln w="12700">
+            <a:solidFill>
+              <a:prstClr val="black"/>
+            </a:solidFill>
+          </a:ln>
+        </p:spPr>
+        <p:txBody>
+          <a:bodyPr vert="horz" lIns="91440" tIns="45720" rIns="91440" bIns="45720" rtlCol="0" anchor="ctr"/>
+          <a:lstStyle/>
+          <a:p>
+            <a:endParaRPr lang="en-US"/>
+          </a:p>
+        </p:txBody>
+      </p:sp>
+      <p:sp>
+        <p:nvSpPr>
+          <p:cNvPr id="5" name="Notes Placeholder 4"/>
+          <p:cNvSpPr>
+            <a:spLocks noGrp="1"/>
+          </p:cNvSpPr>
+          <p:nvPr>
+            <p:ph type="body" sz="quarter" idx="3"/>
+          </p:nvPr>
+        </p:nvSpPr>
+        <p:spPr>
+          <a:xfrm>
+            <a:off x="685800" y="4400550"/>
+            <a:ext cx="5486400" cy="3600450"/>
+          </a:xfrm>
+          <a:prstGeom prst="rect">
+            <a:avLst/>
+          </a:prstGeom>
+        </p:spPr>
+        <p:txBody>
+          <a:bodyPr vert="horz" lIns="91440" tIns="45720" rIns="91440" bIns="45720" rtlCol="0"/>
+          <a:lstStyle/>
+          <a:p>
+            <a:pPr lvl="0"/>
+            <a:r>
+              <a:rPr lang="en-US"/>
+              <a:t>Click to edit Master text styles</a:t>
+            </a:r>
+          </a:p>
+          <a:p>
+            <a:pPr lvl="1"/>
+            <a:r>
+              <a:rPr lang="en-US"/>
+              <a:t>Second level</a:t>
+            </a:r>
+          </a:p>
+          <a:p>
+            <a:pPr lvl="2"/>
+            <a:r>
+              <a:rPr lang="en-US"/>
+              <a:t>Third level</a:t>
+            </a:r>
+          </a:p>
+          <a:p>
+            <a:pPr lvl="3"/>
+            <a:r>
+              <a:rPr lang="en-US"/>
+              <a:t>Fourth level</a:t>
+            </a:r>
+          </a:p>
+          <a:p>
+            <a:pPr lvl="4"/>
+            <a:r>
+              <a:rPr lang="en-US"/>
+              <a:t>Fifth level</a:t>
+            </a:r>
+          </a:p>
+        </p:txBody>
+      </p:sp>
+      <p:sp>
+        <p:nvSpPr>
+          <p:cNvPr id="6" name="Footer Placeholder 5"/>
+          <p:cNvSpPr>
+            <a:spLocks noGrp="1"/>
+          </p:cNvSpPr>
+          <p:nvPr>
+            <p:ph type="ftr" sz="quarter" idx="4"/>
+          </p:nvPr>
+        </p:nvSpPr>
+        <p:spPr>
+          <a:xfrm>
+            <a:off x="0" y="8685213"/>
+            <a:ext cx="2971800" cy="458787"/>
+          </a:xfrm>
+          <a:prstGeom prst="rect">
+            <a:avLst/>
+          </a:prstGeom>
+        </p:spPr>
+        <p:txBody>
+          <a:bodyPr vert="horz" lIns="91440" tIns="45720" rIns="91440" bIns="45720" rtlCol="0" anchor="b"/>
+          <a:lstStyle>
+            <a:lvl1pPr algn="l">
+              <a:defRPr sz="1200"/>
+            </a:lvl1pPr>
+          </a:lstStyle>
+          <a:p>
+            <a:endParaRPr lang="en-US"/>
+          </a:p>
+        </p:txBody>
+      </p:sp>
+      <p:sp>
+        <p:nvSpPr>
+          <p:cNvPr id="7" name="Slide Number Placeholder 6"/>
+          <p:cNvSpPr>
+            <a:spLocks noGrp="1"/>
+          </p:cNvSpPr>
+          <p:nvPr>
+            <p:ph type="sldNum" sz="quarter" idx="5"/>
+          </p:nvPr>
+        </p:nvSpPr>
+        <p:spPr>
+          <a:xfrm>
+            <a:off x="3884613" y="8685213"/>
+            <a:ext cx="2971800" cy="458787"/>
+          </a:xfrm>
+          <a:prstGeom prst="rect">
+            <a:avLst/>
+          </a:prstGeom>
+        </p:spPr>
+        <p:txBody>
+          <a:bodyPr vert="horz" lIns="91440" tIns="45720" rIns="91440" bIns="45720" rtlCol="0" anchor="b"/>
+          <a:lstStyle>
+            <a:lvl1pPr algn="r">
+              <a:defRPr sz="1200"/>
+            </a:lvl1pPr>
+          </a:lstStyle>
+          <a:p>
+            <a:fld id="{E718FE6F-60BE-404F-AAE9-518994B8C749}" type="slidenum">
+              <a:rPr lang="en-US" smtClean="0"/>
+              <a:t>‹#›</a:t>
+            </a:fld>
+            <a:endParaRPr lang="en-US"/>
+          </a:p>
+        </p:txBody>
+      </p:sp>
+    </p:spTree>
+    <p:extLst>
+      <p:ext uri="{BB962C8B-B14F-4D97-AF65-F5344CB8AC3E}">
+        <p14:creationId xmlns:p14="http://schemas.microsoft.com/office/powerpoint/2010/main" val="2835873619"/>
+      </p:ext>
+    </p:extLst>
+  </p:cSld>
+  <p:clrMap bg1="lt1" tx1="dk1" bg2="lt2" tx2="dk2" accent1="accent1" accent2="accent2" accent3="accent3" accent4="accent4" accent5="accent5" accent6="accent6" hlink="hlink" folHlink="folHlink"/>
+  <p:notesStyle>
+    <a:lvl1pPr marL="0" algn="l" defTabSz="914400" rtl="0" eaLnBrk="1" latinLnBrk="0" hangingPunct="1">
+      <a:defRPr sz="1200" kern="1200">
+        <a:solidFill>
+          <a:schemeClr val="tx1"/>
+        </a:solidFill>
+        <a:latin typeface="+mn-lt"/>
+        <a:ea typeface="+mn-ea"/>
+        <a:cs typeface="+mn-cs"/>
+      </a:defRPr>
+    </a:lvl1pPr>
+    <a:lvl2pPr marL="457200" algn="l" defTabSz="914400" rtl="0" eaLnBrk="1" latinLnBrk="0" hangingPunct="1">
+      <a:defRPr sz="1200" kern="1200">
+        <a:solidFill>
+          <a:schemeClr val="tx1"/>
+        </a:solidFill>
+        <a:latin typeface="+mn-lt"/>
+        <a:ea typeface="+mn-ea"/>
+        <a:cs typeface="+mn-cs"/>
+      </a:defRPr>
+    </a:lvl2pPr>
+    <a:lvl3pPr marL="914400" algn="l" defTabSz="914400" rtl="0" eaLnBrk="1" latinLnBrk="0" hangingPunct="1">
+      <a:defRPr sz="1200" kern="1200">
+        <a:solidFill>
+          <a:schemeClr val="tx1"/>
+        </a:solidFill>
+        <a:latin typeface="+mn-lt"/>
+        <a:ea typeface="+mn-ea"/>
+        <a:cs typeface="+mn-cs"/>
+      </a:defRPr>
+    </a:lvl3pPr>
+    <a:lvl4pPr marL="1371600" algn="l" defTabSz="914400" rtl="0" eaLnBrk="1" latinLnBrk="0" hangingPunct="1">
+      <a:defRPr sz="1200" kern="1200">
+        <a:solidFill>
+          <a:schemeClr val="tx1"/>
+        </a:solidFill>
+        <a:latin typeface="+mn-lt"/>
+        <a:ea typeface="+mn-ea"/>
+        <a:cs typeface="+mn-cs"/>
+      </a:defRPr>
+    </a:lvl4pPr>
+    <a:lvl5pPr marL="1828800" algn="l" defTabSz="914400" rtl="0" eaLnBrk="1" latinLnBrk="0" hangingPunct="1">
+      <a:defRPr sz="1200" kern="1200">
+        <a:solidFill>
+          <a:schemeClr val="tx1"/>
+        </a:solidFill>
+        <a:latin typeface="+mn-lt"/>
+        <a:ea typeface="+mn-ea"/>
+        <a:cs typeface="+mn-cs"/>
+      </a:defRPr>
+    </a:lvl5pPr>
+    <a:lvl6pPr marL="2286000" algn="l" defTabSz="914400" rtl="0" eaLnBrk="1" latinLnBrk="0" hangingPunct="1">
+      <a:defRPr sz="1200" kern="1200">
+        <a:solidFill>
+          <a:schemeClr val="tx1"/>
+        </a:solidFill>
+        <a:latin typeface="+mn-lt"/>
+        <a:ea typeface="+mn-ea"/>
+        <a:cs typeface="+mn-cs"/>
+      </a:defRPr>
+    </a:lvl6pPr>
+    <a:lvl7pPr marL="2743200" algn="l" defTabSz="914400" rtl="0" eaLnBrk="1" latinLnBrk="0" hangingPunct="1">
+      <a:defRPr sz="1200" kern="1200">
+        <a:solidFill>
+          <a:schemeClr val="tx1"/>
+        </a:solidFill>
+        <a:latin typeface="+mn-lt"/>
+        <a:ea typeface="+mn-ea"/>
+        <a:cs typeface="+mn-cs"/>
+      </a:defRPr>
+    </a:lvl7pPr>
+    <a:lvl8pPr marL="3200400" algn="l" defTabSz="914400" rtl="0" eaLnBrk="1" latinLnBrk="0" hangingPunct="1">
+      <a:defRPr sz="1200" kern="1200">
+        <a:solidFill>
+          <a:schemeClr val="tx1"/>
+        </a:solidFill>
+        <a:latin typeface="+mn-lt"/>
+        <a:ea typeface="+mn-ea"/>
+        <a:cs typeface="+mn-cs"/>
+      </a:defRPr>
+    </a:lvl8pPr>
+    <a:lvl9pPr marL="3657600" algn="l" defTabSz="914400" rtl="0" eaLnBrk="1" latinLnBrk="0" hangingPunct="1">
+      <a:defRPr sz="1200" kern="1200">
+        <a:solidFill>
+          <a:schemeClr val="tx1"/>
+        </a:solidFill>
+        <a:latin typeface="+mn-lt"/>
+        <a:ea typeface="+mn-ea"/>
+        <a:cs typeface="+mn-cs"/>
+      </a:defRPr>
+    </a:lvl9pPr>
+  </p:notesStyle>
+</p:notesMaster>
+</file>
+
+<file path=ppt/notesSlides/notesSlide1.xml><?xml version="1.0" encoding="utf-8"?>
+<p:notes xmlns:a="http://schemas.openxmlformats.org/drawingml/2006/main" xmlns:r="http://schemas.openxmlformats.org/officeDocument/2006/relationships" xmlns:p="http://schemas.openxmlformats.org/presentationml/2006/main">
+  <p:cSld>
+    <p:spTree>
+      <p:nvGrpSpPr>
+        <p:cNvPr id="1" name=""/>
+        <p:cNvGrpSpPr/>
+        <p:nvPr/>
+      </p:nvGrpSpPr>
+      <p:grpSpPr>
+        <a:xfrm>
+          <a:off x="0" y="0"/>
+          <a:ext cx="0" cy="0"/>
+          <a:chOff x="0" y="0"/>
+          <a:chExt cx="0" cy="0"/>
+        </a:xfrm>
+      </p:grpSpPr>
+      <p:sp>
+        <p:nvSpPr>
+          <p:cNvPr id="2" name="Slide Image Placeholder 1"/>
+          <p:cNvSpPr>
+            <a:spLocks noGrp="1" noRot="1" noChangeAspect="1"/>
+          </p:cNvSpPr>
+          <p:nvPr>
+            <p:ph type="sldImg"/>
+          </p:nvPr>
+        </p:nvSpPr>
+        <p:spPr/>
+      </p:sp>
+      <p:sp>
+        <p:nvSpPr>
+          <p:cNvPr id="3" name="Notes Placeholder 2"/>
+          <p:cNvSpPr>
+            <a:spLocks noGrp="1"/>
+          </p:cNvSpPr>
+          <p:nvPr>
+            <p:ph type="body" idx="1"/>
+          </p:nvPr>
+        </p:nvSpPr>
+        <p:spPr/>
+        <p:txBody>
+          <a:bodyPr/>
+          <a:lstStyle/>
+          <a:p>
+            <a:endParaRPr lang="en-US" dirty="0"/>
+          </a:p>
+        </p:txBody>
+      </p:sp>
+      <p:sp>
+        <p:nvSpPr>
+          <p:cNvPr id="4" name="Slide Number Placeholder 3"/>
+          <p:cNvSpPr>
+            <a:spLocks noGrp="1"/>
+          </p:cNvSpPr>
+          <p:nvPr>
+            <p:ph type="sldNum" sz="quarter" idx="5"/>
+          </p:nvPr>
+        </p:nvSpPr>
+        <p:spPr/>
+        <p:txBody>
+          <a:bodyPr/>
+          <a:lstStyle/>
+          <a:p>
+            <a:fld id="{E718FE6F-60BE-404F-AAE9-518994B8C749}" type="slidenum">
+              <a:rPr lang="en-US" smtClean="0"/>
+              <a:t>1</a:t>
+            </a:fld>
+            <a:endParaRPr lang="en-US"/>
+          </a:p>
+        </p:txBody>
+      </p:sp>
+    </p:spTree>
+    <p:extLst>
+      <p:ext uri="{BB962C8B-B14F-4D97-AF65-F5344CB8AC3E}">
+        <p14:creationId xmlns:p14="http://schemas.microsoft.com/office/powerpoint/2010/main" val="2187868598"/>
+      </p:ext>
+    </p:extLst>
+  </p:cSld>
+  <p:clrMapOvr>
+    <a:masterClrMapping/>
+  </p:clrMapOvr>
+</p:notes>
 </file>
 
 <file path=ppt/slideLayouts/slideLayout1.xml><?xml version="1.0" encoding="utf-8"?>
@@ -3139,10 +3575,10 @@
           <p:nvPr/>
         </p:nvPicPr>
         <p:blipFill>
-          <a:blip r:embed="rId2">
+          <a:blip r:embed="rId3">
             <a:extLst>
               <a:ext uri="{96DAC541-7B7A-43D3-8B79-37D633B846F1}">
-                <asvg:svgBlip xmlns:asvg="http://schemas.microsoft.com/office/drawing/2016/SVG/main" r:embed="rId3"/>
+                <asvg:svgBlip xmlns:asvg="http://schemas.microsoft.com/office/drawing/2016/SVG/main" r:embed="rId4"/>
               </a:ext>
             </a:extLst>
           </a:blip>
@@ -3352,10 +3788,10 @@
           <p:nvPr/>
         </p:nvPicPr>
         <p:blipFill>
-          <a:blip r:embed="rId4">
+          <a:blip r:embed="rId5">
             <a:extLst>
               <a:ext uri="{96DAC541-7B7A-43D3-8B79-37D633B846F1}">
-                <asvg:svgBlip xmlns:asvg="http://schemas.microsoft.com/office/drawing/2016/SVG/main" r:embed="rId5"/>
+                <asvg:svgBlip xmlns:asvg="http://schemas.microsoft.com/office/drawing/2016/SVG/main" r:embed="rId6"/>
               </a:ext>
             </a:extLst>
           </a:blip>
@@ -3388,10 +3824,10 @@
           <p:nvPr/>
         </p:nvPicPr>
         <p:blipFill>
-          <a:blip r:embed="rId6">
+          <a:blip r:embed="rId7">
             <a:extLst>
               <a:ext uri="{96DAC541-7B7A-43D3-8B79-37D633B846F1}">
-                <asvg:svgBlip xmlns:asvg="http://schemas.microsoft.com/office/drawing/2016/SVG/main" r:embed="rId7"/>
+                <asvg:svgBlip xmlns:asvg="http://schemas.microsoft.com/office/drawing/2016/SVG/main" r:embed="rId8"/>
               </a:ext>
             </a:extLst>
           </a:blip>
@@ -3585,7 +4021,7 @@
           <p:nvPr/>
         </p:nvPicPr>
         <p:blipFill>
-          <a:blip r:embed="rId8" cstate="print">
+          <a:blip r:embed="rId9" cstate="print">
             <a:extLst>
               <a:ext uri="{28A0092B-C50C-407E-A947-70E740481C1C}">
                 <a14:useLocalDpi xmlns:a14="http://schemas.microsoft.com/office/drawing/2010/main" val="0"/>
@@ -3645,10 +4081,10 @@
           <p:nvPr/>
         </p:nvPicPr>
         <p:blipFill>
-          <a:blip r:embed="rId9">
+          <a:blip r:embed="rId10">
             <a:extLst>
               <a:ext uri="{96DAC541-7B7A-43D3-8B79-37D633B846F1}">
-                <asvg:svgBlip xmlns:asvg="http://schemas.microsoft.com/office/drawing/2016/SVG/main" r:embed="rId10"/>
+                <asvg:svgBlip xmlns:asvg="http://schemas.microsoft.com/office/drawing/2016/SVG/main" r:embed="rId11"/>
               </a:ext>
             </a:extLst>
           </a:blip>
@@ -3802,10 +4238,10 @@
           <p:nvPr/>
         </p:nvPicPr>
         <p:blipFill>
-          <a:blip r:embed="rId4">
+          <a:blip r:embed="rId5">
             <a:extLst>
               <a:ext uri="{96DAC541-7B7A-43D3-8B79-37D633B846F1}">
-                <asvg:svgBlip xmlns:asvg="http://schemas.microsoft.com/office/drawing/2016/SVG/main" r:embed="rId5"/>
+                <asvg:svgBlip xmlns:asvg="http://schemas.microsoft.com/office/drawing/2016/SVG/main" r:embed="rId6"/>
               </a:ext>
             </a:extLst>
           </a:blip>
@@ -3999,7 +4435,7 @@
           <p:nvPr/>
         </p:nvPicPr>
         <p:blipFill>
-          <a:blip r:embed="rId8" cstate="print">
+          <a:blip r:embed="rId9" cstate="print">
             <a:extLst>
               <a:ext uri="{28A0092B-C50C-407E-A947-70E740481C1C}">
                 <a14:useLocalDpi xmlns:a14="http://schemas.microsoft.com/office/drawing/2010/main" val="0"/>
@@ -4180,10 +4616,10 @@
           <p:nvPr/>
         </p:nvPicPr>
         <p:blipFill>
-          <a:blip r:embed="rId4">
+          <a:blip r:embed="rId5">
             <a:extLst>
               <a:ext uri="{96DAC541-7B7A-43D3-8B79-37D633B846F1}">
-                <asvg:svgBlip xmlns:asvg="http://schemas.microsoft.com/office/drawing/2016/SVG/main" r:embed="rId5"/>
+                <asvg:svgBlip xmlns:asvg="http://schemas.microsoft.com/office/drawing/2016/SVG/main" r:embed="rId6"/>
               </a:ext>
             </a:extLst>
           </a:blip>
@@ -4377,7 +4813,7 @@
           <p:nvPr/>
         </p:nvPicPr>
         <p:blipFill>
-          <a:blip r:embed="rId8" cstate="print">
+          <a:blip r:embed="rId9" cstate="print">
             <a:extLst>
               <a:ext uri="{28A0092B-C50C-407E-A947-70E740481C1C}">
                 <a14:useLocalDpi xmlns:a14="http://schemas.microsoft.com/office/drawing/2010/main" val="0"/>
@@ -4437,7 +4873,7 @@
           <p:nvPr/>
         </p:nvPicPr>
         <p:blipFill>
-          <a:blip r:embed="rId11">
+          <a:blip r:embed="rId12">
             <a:extLst>
               <a:ext uri="{28A0092B-C50C-407E-A947-70E740481C1C}">
                 <a14:useLocalDpi xmlns:a14="http://schemas.microsoft.com/office/drawing/2010/main" val="0"/>
@@ -4658,7 +5094,7 @@
           <p:nvPr/>
         </p:nvPicPr>
         <p:blipFill>
-          <a:blip r:embed="rId12">
+          <a:blip r:embed="rId13">
             <a:extLst>
               <a:ext uri="{28A0092B-C50C-407E-A947-70E740481C1C}">
                 <a14:useLocalDpi xmlns:a14="http://schemas.microsoft.com/office/drawing/2010/main" val="0"/>
@@ -5038,7 +5474,7 @@
           <p:nvPr/>
         </p:nvPicPr>
         <p:blipFill>
-          <a:blip r:embed="rId13">
+          <a:blip r:embed="rId14">
             <a:extLst>
               <a:ext uri="{28A0092B-C50C-407E-A947-70E740481C1C}">
                 <a14:useLocalDpi xmlns:a14="http://schemas.microsoft.com/office/drawing/2010/main" val="0"/>
@@ -5081,7 +5517,7 @@
           <p:nvPr/>
         </p:nvPicPr>
         <p:blipFill>
-          <a:blip r:embed="rId14" cstate="print">
+          <a:blip r:embed="rId15" cstate="print">
             <a:extLst>
               <a:ext uri="{28A0092B-C50C-407E-A947-70E740481C1C}">
                 <a14:useLocalDpi xmlns:a14="http://schemas.microsoft.com/office/drawing/2010/main" val="0"/>
@@ -5359,10 +5795,10 @@
           <p:nvPr/>
         </p:nvPicPr>
         <p:blipFill>
-          <a:blip r:embed="rId6">
+          <a:blip r:embed="rId7">
             <a:extLst>
               <a:ext uri="{96DAC541-7B7A-43D3-8B79-37D633B846F1}">
-                <asvg:svgBlip xmlns:asvg="http://schemas.microsoft.com/office/drawing/2016/SVG/main" r:embed="rId7"/>
+                <asvg:svgBlip xmlns:asvg="http://schemas.microsoft.com/office/drawing/2016/SVG/main" r:embed="rId8"/>
               </a:ext>
             </a:extLst>
           </a:blip>
@@ -5395,7 +5831,7 @@
           <p:nvPr/>
         </p:nvPicPr>
         <p:blipFill>
-          <a:blip r:embed="rId14" cstate="print">
+          <a:blip r:embed="rId15" cstate="print">
             <a:extLst>
               <a:ext uri="{28A0092B-C50C-407E-A947-70E740481C1C}">
                 <a14:useLocalDpi xmlns:a14="http://schemas.microsoft.com/office/drawing/2010/main" val="0"/>
@@ -5673,10 +6109,10 @@
           <p:nvPr/>
         </p:nvPicPr>
         <p:blipFill>
-          <a:blip r:embed="rId6">
+          <a:blip r:embed="rId7">
             <a:extLst>
               <a:ext uri="{96DAC541-7B7A-43D3-8B79-37D633B846F1}">
-                <asvg:svgBlip xmlns:asvg="http://schemas.microsoft.com/office/drawing/2016/SVG/main" r:embed="rId7"/>
+                <asvg:svgBlip xmlns:asvg="http://schemas.microsoft.com/office/drawing/2016/SVG/main" r:embed="rId8"/>
               </a:ext>
             </a:extLst>
           </a:blip>
@@ -5709,7 +6145,7 @@
           <p:nvPr/>
         </p:nvPicPr>
         <p:blipFill>
-          <a:blip r:embed="rId14" cstate="print">
+          <a:blip r:embed="rId15" cstate="print">
             <a:extLst>
               <a:ext uri="{28A0092B-C50C-407E-A947-70E740481C1C}">
                 <a14:useLocalDpi xmlns:a14="http://schemas.microsoft.com/office/drawing/2010/main" val="0"/>
@@ -5930,7 +6366,7 @@
           <p:nvPr/>
         </p:nvPicPr>
         <p:blipFill>
-          <a:blip r:embed="rId15">
+          <a:blip r:embed="rId16">
             <a:extLst>
               <a:ext uri="{28A0092B-C50C-407E-A947-70E740481C1C}">
                 <a14:useLocalDpi xmlns:a14="http://schemas.microsoft.com/office/drawing/2010/main" val="0"/>
@@ -6151,7 +6587,7 @@
           <p:nvPr/>
         </p:nvPicPr>
         <p:blipFill>
-          <a:blip r:embed="rId16">
+          <a:blip r:embed="rId17">
             <a:extLst>
               <a:ext uri="{28A0092B-C50C-407E-A947-70E740481C1C}">
                 <a14:useLocalDpi xmlns:a14="http://schemas.microsoft.com/office/drawing/2010/main" val="0"/>
@@ -6372,7 +6808,7 @@
           <p:nvPr/>
         </p:nvPicPr>
         <p:blipFill>
-          <a:blip r:embed="rId17">
+          <a:blip r:embed="rId18">
             <a:extLst>
               <a:ext uri="{28A0092B-C50C-407E-A947-70E740481C1C}">
                 <a14:useLocalDpi xmlns:a14="http://schemas.microsoft.com/office/drawing/2010/main" val="0"/>
@@ -6594,7 +7030,7 @@
         </p:nvSpPr>
         <p:spPr bwMode="auto">
           <a:xfrm>
-            <a:off x="810513" y="2746147"/>
+            <a:off x="753585" y="3407213"/>
             <a:ext cx="1270000" cy="430887"/>
           </a:xfrm>
           <a:prstGeom prst="rect">
@@ -6769,10 +7205,10 @@
           <p:nvPr/>
         </p:nvPicPr>
         <p:blipFill>
-          <a:blip r:embed="rId18">
+          <a:blip r:embed="rId19">
             <a:extLst>
               <a:ext uri="{96DAC541-7B7A-43D3-8B79-37D633B846F1}">
-                <asvg:svgBlip xmlns:asvg="http://schemas.microsoft.com/office/drawing/2016/SVG/main" r:embed="rId19"/>
+                <asvg:svgBlip xmlns:asvg="http://schemas.microsoft.com/office/drawing/2016/SVG/main" r:embed="rId20"/>
               </a:ext>
             </a:extLst>
           </a:blip>
@@ -6781,7 +7217,7 @@
         </p:blipFill>
         <p:spPr bwMode="auto">
           <a:xfrm>
-            <a:off x="1235303" y="2288268"/>
+            <a:off x="1178375" y="2949334"/>
             <a:ext cx="457200" cy="457200"/>
           </a:xfrm>
           <a:prstGeom prst="rect">
@@ -6827,10 +7263,10 @@
           <p:nvPr/>
         </p:nvPicPr>
         <p:blipFill>
-          <a:blip r:embed="rId20">
+          <a:blip r:embed="rId21">
             <a:extLst>
               <a:ext uri="{96DAC541-7B7A-43D3-8B79-37D633B846F1}">
-                <asvg:svgBlip xmlns:asvg="http://schemas.microsoft.com/office/drawing/2016/SVG/main" r:embed="rId21"/>
+                <asvg:svgBlip xmlns:asvg="http://schemas.microsoft.com/office/drawing/2016/SVG/main" r:embed="rId22"/>
               </a:ext>
             </a:extLst>
           </a:blip>
@@ -6839,7 +7275,7 @@
         </p:blipFill>
         <p:spPr bwMode="auto">
           <a:xfrm flipH="1">
-            <a:off x="366830" y="2281918"/>
+            <a:off x="309902" y="2942984"/>
             <a:ext cx="469900" cy="469900"/>
           </a:xfrm>
           <a:prstGeom prst="rect">
@@ -6886,7 +7322,7 @@
         </p:nvSpPr>
         <p:spPr bwMode="auto">
           <a:xfrm>
-            <a:off x="302697" y="2746147"/>
+            <a:off x="245769" y="3407213"/>
             <a:ext cx="592072" cy="261610"/>
           </a:xfrm>
           <a:prstGeom prst="rect">
@@ -7051,7 +7487,7 @@
         </p:nvCxnSpPr>
         <p:spPr>
           <a:xfrm>
-            <a:off x="836730" y="2516868"/>
+            <a:off x="779802" y="3177934"/>
             <a:ext cx="398573" cy="0"/>
           </a:xfrm>
           <a:prstGeom prst="straightConnector1">
@@ -7098,8 +7534,8 @@
         </p:nvCxnSpPr>
         <p:spPr>
           <a:xfrm>
-            <a:off x="1692503" y="2516868"/>
-            <a:ext cx="249201" cy="664605"/>
+            <a:off x="1635575" y="3177934"/>
+            <a:ext cx="306129" cy="3539"/>
           </a:xfrm>
           <a:prstGeom prst="straightConnector1">
             <a:avLst/>
@@ -7142,7 +7578,7 @@
           <p:nvPr/>
         </p:nvPicPr>
         <p:blipFill>
-          <a:blip r:embed="rId22">
+          <a:blip r:embed="rId23">
             <a:extLst>
               <a:ext uri="{28A0092B-C50C-407E-A947-70E740481C1C}">
                 <a14:useLocalDpi xmlns:a14="http://schemas.microsoft.com/office/drawing/2010/main" val="0"/>
@@ -7433,10 +7869,10 @@
           <p:nvPr/>
         </p:nvPicPr>
         <p:blipFill>
-          <a:blip r:embed="rId23">
+          <a:blip r:embed="rId24">
             <a:extLst>
               <a:ext uri="{96DAC541-7B7A-43D3-8B79-37D633B846F1}">
-                <asvg:svgBlip xmlns:asvg="http://schemas.microsoft.com/office/drawing/2016/SVG/main" r:embed="rId24"/>
+                <asvg:svgBlip xmlns:asvg="http://schemas.microsoft.com/office/drawing/2016/SVG/main" r:embed="rId25"/>
               </a:ext>
             </a:extLst>
           </a:blip>
@@ -7468,13 +7904,13 @@
           <p:nvPr/>
         </p:nvPicPr>
         <p:blipFill>
-          <a:blip r:embed="rId25">
+          <a:blip r:embed="rId26">
             <a:extLst>
               <a:ext uri="{28A0092B-C50C-407E-A947-70E740481C1C}">
                 <a14:useLocalDpi xmlns:a14="http://schemas.microsoft.com/office/drawing/2010/main" val="0"/>
               </a:ext>
               <a:ext uri="{96DAC541-7B7A-43D3-8B79-37D633B846F1}">
-                <asvg:svgBlip xmlns:asvg="http://schemas.microsoft.com/office/drawing/2016/SVG/main" r:embed="rId26"/>
+                <asvg:svgBlip xmlns:asvg="http://schemas.microsoft.com/office/drawing/2016/SVG/main" r:embed="rId27"/>
               </a:ext>
             </a:extLst>
           </a:blip>
@@ -7690,13 +8126,13 @@
           <p:nvPr/>
         </p:nvPicPr>
         <p:blipFill>
-          <a:blip r:embed="rId27">
+          <a:blip r:embed="rId28">
             <a:extLst>
               <a:ext uri="{28A0092B-C50C-407E-A947-70E740481C1C}">
                 <a14:useLocalDpi xmlns:a14="http://schemas.microsoft.com/office/drawing/2010/main" val="0"/>
               </a:ext>
               <a:ext uri="{96DAC541-7B7A-43D3-8B79-37D633B846F1}">
-                <asvg:svgBlip xmlns:asvg="http://schemas.microsoft.com/office/drawing/2016/SVG/main" r:embed="rId28"/>
+                <asvg:svgBlip xmlns:asvg="http://schemas.microsoft.com/office/drawing/2016/SVG/main" r:embed="rId29"/>
               </a:ext>
             </a:extLst>
           </a:blip>
@@ -7918,10 +8354,9 @@
             <a:avLst/>
           </a:prstGeom>
           <a:solidFill>
-            <a:schemeClr val="accent4">
-              <a:lumMod val="75000"/>
+            <a:srgbClr val="EE7100">
               <a:alpha val="9804"/>
-            </a:schemeClr>
+            </a:srgbClr>
           </a:solidFill>
           <a:ln w="12700" cap="flat" cmpd="sng" algn="ctr">
             <a:noFill/>
@@ -7945,14 +8380,12 @@
             <a:r>
               <a:rPr lang="en-US" sz="1200" kern="0" dirty="0">
                 <a:solidFill>
-                  <a:schemeClr val="accent4">
-                    <a:lumMod val="50000"/>
-                  </a:schemeClr>
+                  <a:srgbClr val="EE7100"/>
                 </a:solidFill>
                 <a:latin typeface="Arial" panose="020B0604020202020204" pitchFamily="34" charset="0"/>
                 <a:cs typeface="Arial" panose="020B0604020202020204" pitchFamily="34" charset="0"/>
               </a:rPr>
-              <a:t>Kubernetes Workload</a:t>
+              <a:t>EKS Workload</a:t>
             </a:r>
           </a:p>
         </p:txBody>
@@ -8044,7 +8477,7 @@
             <p:nvPr/>
           </p:nvPicPr>
           <p:blipFill>
-            <a:blip r:embed="rId29">
+            <a:blip r:embed="rId30">
               <a:extLst>
                 <a:ext uri="{28A0092B-C50C-407E-A947-70E740481C1C}">
                   <a14:useLocalDpi xmlns:a14="http://schemas.microsoft.com/office/drawing/2010/main" val="0"/>
@@ -8153,7 +8586,7 @@
             <p:nvPr/>
           </p:nvPicPr>
           <p:blipFill>
-            <a:blip r:embed="rId29">
+            <a:blip r:embed="rId30">
               <a:extLst>
                 <a:ext uri="{28A0092B-C50C-407E-A947-70E740481C1C}">
                   <a14:useLocalDpi xmlns:a14="http://schemas.microsoft.com/office/drawing/2010/main" val="0"/>
@@ -8262,7 +8695,7 @@
             <p:nvPr/>
           </p:nvPicPr>
           <p:blipFill>
-            <a:blip r:embed="rId29">
+            <a:blip r:embed="rId30">
               <a:extLst>
                 <a:ext uri="{28A0092B-C50C-407E-A947-70E740481C1C}">
                   <a14:useLocalDpi xmlns:a14="http://schemas.microsoft.com/office/drawing/2010/main" val="0"/>
@@ -8540,7 +8973,7 @@
             <p:nvPr/>
           </p:nvPicPr>
           <p:blipFill>
-            <a:blip r:embed="rId29">
+            <a:blip r:embed="rId30">
               <a:extLst>
                 <a:ext uri="{28A0092B-C50C-407E-A947-70E740481C1C}">
                   <a14:useLocalDpi xmlns:a14="http://schemas.microsoft.com/office/drawing/2010/main" val="0"/>
@@ -8818,7 +9251,7 @@
             <p:nvPr/>
           </p:nvPicPr>
           <p:blipFill>
-            <a:blip r:embed="rId29">
+            <a:blip r:embed="rId30">
               <a:extLst>
                 <a:ext uri="{28A0092B-C50C-407E-A947-70E740481C1C}">
                   <a14:useLocalDpi xmlns:a14="http://schemas.microsoft.com/office/drawing/2010/main" val="0"/>
@@ -9024,7 +9457,7 @@
         <p:spPr>
           <a:xfrm>
             <a:off x="12437529" y="275019"/>
-            <a:ext cx="1963991" cy="6438695"/>
+            <a:ext cx="1978928" cy="6484174"/>
           </a:xfrm>
           <a:prstGeom prst="rect">
             <a:avLst/>
@@ -9032,7 +9465,7 @@
           <a:noFill/>
           <a:ln w="12700">
             <a:solidFill>
-              <a:schemeClr val="tx1"/>
+              <a:srgbClr val="146EF5"/>
             </a:solidFill>
           </a:ln>
         </p:spPr>
@@ -9053,7 +9486,7 @@
           </a:fontRef>
         </p:style>
         <p:txBody>
-          <a:bodyPr lIns="274320" tIns="91440"/>
+          <a:bodyPr lIns="457200" tIns="91440"/>
           <a:lstStyle/>
           <a:p>
             <a:pPr>
@@ -9062,7 +9495,7 @@
             <a:r>
               <a:rPr lang="en-US" sz="1200" dirty="0" err="1">
                 <a:solidFill>
-                  <a:sysClr val="windowText" lastClr="000000"/>
+                  <a:schemeClr val="tx1"/>
                 </a:solidFill>
                 <a:latin typeface="Arial" panose="020B0604020202020204" pitchFamily="34" charset="0"/>
                 <a:cs typeface="Arial" panose="020B0604020202020204" pitchFamily="34" charset="0"/>
@@ -9072,65 +9505,13 @@
             <a:r>
               <a:rPr lang="en-US" sz="1200" dirty="0">
                 <a:solidFill>
-                  <a:sysClr val="windowText" lastClr="000000"/>
+                  <a:schemeClr val="tx1"/>
                 </a:solidFill>
                 <a:latin typeface="Arial" panose="020B0604020202020204" pitchFamily="34" charset="0"/>
                 <a:cs typeface="Arial" panose="020B0604020202020204" pitchFamily="34" charset="0"/>
               </a:rPr>
               <a:t> Infrastructure</a:t>
             </a:r>
-          </a:p>
-        </p:txBody>
-      </p:sp>
-      <p:sp>
-        <p:nvSpPr>
-          <p:cNvPr id="18" name="Rounded Rectangle 17">
-            <a:extLst>
-              <a:ext uri="{FF2B5EF4-FFF2-40B4-BE49-F238E27FC236}">
-                <a16:creationId xmlns:a16="http://schemas.microsoft.com/office/drawing/2014/main" id="{8F35486D-2D8C-421A-96B2-48E233C898C9}"/>
-              </a:ext>
-            </a:extLst>
-          </p:cNvPr>
-          <p:cNvSpPr/>
-          <p:nvPr/>
-        </p:nvSpPr>
-        <p:spPr>
-          <a:xfrm>
-            <a:off x="12876811" y="4423091"/>
-            <a:ext cx="1054100" cy="680747"/>
-          </a:xfrm>
-          <a:prstGeom prst="roundRect">
-            <a:avLst/>
-          </a:prstGeom>
-          <a:solidFill>
-            <a:srgbClr val="146EF5"/>
-          </a:solidFill>
-          <a:ln>
-            <a:noFill/>
-          </a:ln>
-        </p:spPr>
-        <p:style>
-          <a:lnRef idx="2">
-            <a:schemeClr val="accent1">
-              <a:shade val="15000"/>
-            </a:schemeClr>
-          </a:lnRef>
-          <a:fillRef idx="1">
-            <a:schemeClr val="accent1"/>
-          </a:fillRef>
-          <a:effectRef idx="0">
-            <a:schemeClr val="accent1"/>
-          </a:effectRef>
-          <a:fontRef idx="minor">
-            <a:schemeClr val="lt1"/>
-          </a:fontRef>
-        </p:style>
-        <p:txBody>
-          <a:bodyPr rtlCol="0" anchor="ctr"/>
-          <a:lstStyle/>
-          <a:p>
-            <a:pPr algn="ctr"/>
-            <a:endParaRPr lang="en-US"/>
           </a:p>
         </p:txBody>
       </p:sp>
@@ -9150,8 +9531,8 @@
         </p:nvSpPr>
         <p:spPr bwMode="auto">
           <a:xfrm>
-            <a:off x="12672341" y="5209692"/>
-            <a:ext cx="1463040" cy="261610"/>
+            <a:off x="12976906" y="4632168"/>
+            <a:ext cx="900174" cy="261610"/>
           </a:xfrm>
           <a:prstGeom prst="rect">
             <a:avLst/>
@@ -9292,58 +9673,6 @@
               </a:rPr>
               <a:t>Interactor</a:t>
             </a:r>
-          </a:p>
-        </p:txBody>
-      </p:sp>
-      <p:sp>
-        <p:nvSpPr>
-          <p:cNvPr id="25" name="Rounded Rectangle 24">
-            <a:extLst>
-              <a:ext uri="{FF2B5EF4-FFF2-40B4-BE49-F238E27FC236}">
-                <a16:creationId xmlns:a16="http://schemas.microsoft.com/office/drawing/2014/main" id="{0BA49A2D-5D63-9138-5B8D-34A7501ACA9A}"/>
-              </a:ext>
-            </a:extLst>
-          </p:cNvPr>
-          <p:cNvSpPr/>
-          <p:nvPr/>
-        </p:nvSpPr>
-        <p:spPr>
-          <a:xfrm>
-            <a:off x="12879213" y="1386438"/>
-            <a:ext cx="1054100" cy="680747"/>
-          </a:xfrm>
-          <a:prstGeom prst="roundRect">
-            <a:avLst/>
-          </a:prstGeom>
-          <a:solidFill>
-            <a:srgbClr val="146EF5"/>
-          </a:solidFill>
-          <a:ln>
-            <a:noFill/>
-          </a:ln>
-        </p:spPr>
-        <p:style>
-          <a:lnRef idx="2">
-            <a:schemeClr val="accent1">
-              <a:shade val="15000"/>
-            </a:schemeClr>
-          </a:lnRef>
-          <a:fillRef idx="1">
-            <a:schemeClr val="accent1"/>
-          </a:fillRef>
-          <a:effectRef idx="0">
-            <a:schemeClr val="accent1"/>
-          </a:effectRef>
-          <a:fontRef idx="minor">
-            <a:schemeClr val="lt1"/>
-          </a:fontRef>
-        </p:style>
-        <p:txBody>
-          <a:bodyPr rtlCol="0" anchor="ctr"/>
-          <a:lstStyle/>
-          <a:p>
-            <a:pPr algn="ctr"/>
-            <a:endParaRPr lang="en-US"/>
           </a:p>
         </p:txBody>
       </p:sp>
@@ -9363,8 +9692,8 @@
         </p:nvSpPr>
         <p:spPr bwMode="auto">
           <a:xfrm>
-            <a:off x="12674743" y="2173039"/>
-            <a:ext cx="1463040" cy="261610"/>
+            <a:off x="12887872" y="1510579"/>
+            <a:ext cx="1079905" cy="430887"/>
           </a:xfrm>
           <a:prstGeom prst="rect">
             <a:avLst/>
@@ -9503,7 +9832,18 @@
                 <a:ea typeface="Amazon Ember" panose="020B0603020204020204" pitchFamily="34" charset="0"/>
                 <a:cs typeface="Arial" panose="020B0604020202020204" pitchFamily="34" charset="0"/>
               </a:rPr>
-              <a:t>Private Cloud Portal</a:t>
+              <a:t>Private Cloud </a:t>
+            </a:r>
+          </a:p>
+          <a:p>
+            <a:pPr algn="ctr" eaLnBrk="1" hangingPunct="1"/>
+            <a:r>
+              <a:rPr lang="en-US" altLang="en-US" sz="1100" dirty="0">
+                <a:latin typeface="Arial" panose="020B0604020202020204" pitchFamily="34" charset="0"/>
+                <a:ea typeface="Amazon Ember" panose="020B0603020204020204" pitchFamily="34" charset="0"/>
+                <a:cs typeface="Arial" panose="020B0604020202020204" pitchFamily="34" charset="0"/>
+              </a:rPr>
+              <a:t>Portal</a:t>
             </a:r>
           </a:p>
         </p:txBody>
@@ -9520,14 +9860,14 @@
           <p:cNvCxnSpPr>
             <a:cxnSpLocks/>
             <a:stCxn id="49" idx="3"/>
-            <a:endCxn id="18" idx="1"/>
+            <a:endCxn id="24" idx="1"/>
           </p:cNvCxnSpPr>
           <p:nvPr/>
         </p:nvCxnSpPr>
         <p:spPr>
           <a:xfrm>
             <a:off x="8655969" y="4762973"/>
-            <a:ext cx="4220842" cy="492"/>
+            <a:ext cx="4320937" cy="0"/>
           </a:xfrm>
           <a:prstGeom prst="straightConnector1">
             <a:avLst/>
@@ -9536,8 +9876,8 @@
             <a:solidFill>
               <a:srgbClr val="545B64"/>
             </a:solidFill>
-            <a:headEnd type="triangle" w="med" len="sm"/>
-            <a:tailEnd type="triangle" w="med" len="med"/>
+            <a:headEnd type="arrow" w="med" len="sm"/>
+            <a:tailEnd type="arrow" w="med" len="sm"/>
           </a:ln>
         </p:spPr>
         <p:style>
@@ -9566,15 +9906,14 @@
           </p:cNvPr>
           <p:cNvCxnSpPr>
             <a:cxnSpLocks/>
-            <a:stCxn id="25" idx="2"/>
-            <a:endCxn id="18" idx="0"/>
+            <a:endCxn id="24" idx="0"/>
           </p:cNvCxnSpPr>
           <p:nvPr/>
         </p:nvCxnSpPr>
         <p:spPr>
           <a:xfrm flipH="1">
-            <a:off x="13403861" y="2067185"/>
-            <a:ext cx="2402" cy="2355906"/>
+            <a:off x="13426993" y="2072556"/>
+            <a:ext cx="2402" cy="2559612"/>
           </a:xfrm>
           <a:prstGeom prst="straightConnector1">
             <a:avLst/>
@@ -9583,8 +9922,8 @@
             <a:solidFill>
               <a:srgbClr val="545B64"/>
             </a:solidFill>
-            <a:headEnd type="triangle" w="med" len="sm"/>
-            <a:tailEnd type="triangle" w="med" len="med"/>
+            <a:headEnd type="arrow" w="med" len="sm"/>
+            <a:tailEnd type="arrow" w="med" len="sm"/>
           </a:ln>
         </p:spPr>
         <p:style>
@@ -9617,10 +9956,10 @@
           <p:nvPr/>
         </p:nvPicPr>
         <p:blipFill>
-          <a:blip r:embed="rId20">
+          <a:blip r:embed="rId21">
             <a:extLst>
               <a:ext uri="{96DAC541-7B7A-43D3-8B79-37D633B846F1}">
-                <asvg:svgBlip xmlns:asvg="http://schemas.microsoft.com/office/drawing/2016/SVG/main" r:embed="rId21"/>
+                <asvg:svgBlip xmlns:asvg="http://schemas.microsoft.com/office/drawing/2016/SVG/main" r:embed="rId22"/>
               </a:ext>
             </a:extLst>
           </a:blip>
@@ -9834,15 +10173,15 @@
           </p:cNvPr>
           <p:cNvCxnSpPr>
             <a:cxnSpLocks/>
-            <a:stCxn id="25" idx="3"/>
+            <a:stCxn id="26" idx="3"/>
             <a:endCxn id="65" idx="3"/>
           </p:cNvCxnSpPr>
           <p:nvPr/>
         </p:nvCxnSpPr>
         <p:spPr>
           <a:xfrm>
-            <a:off x="13933313" y="1726812"/>
-            <a:ext cx="1118586" cy="4942"/>
+            <a:off x="13967777" y="1726023"/>
+            <a:ext cx="1084122" cy="5731"/>
           </a:xfrm>
           <a:prstGeom prst="straightConnector1">
             <a:avLst/>
@@ -9851,8 +10190,8 @@
             <a:solidFill>
               <a:srgbClr val="545B64"/>
             </a:solidFill>
-            <a:headEnd type="triangle" w="med" len="sm"/>
-            <a:tailEnd type="triangle" w="med" len="med"/>
+            <a:headEnd type="arrow" w="med" len="sm"/>
+            <a:tailEnd type="none" w="med" len="med"/>
           </a:ln>
         </p:spPr>
         <p:style>
@@ -9913,6 +10252,99 @@
           </a:p>
         </p:txBody>
       </p:sp>
+      <p:pic>
+        <p:nvPicPr>
+          <p:cNvPr id="81" name="Graphic 80" descr="Graphic icon.">
+            <a:extLst>
+              <a:ext uri="{FF2B5EF4-FFF2-40B4-BE49-F238E27FC236}">
+                <a16:creationId xmlns:a16="http://schemas.microsoft.com/office/drawing/2014/main" id="{1937755B-EA48-ED38-963D-9A061D2B9115}"/>
+              </a:ext>
+            </a:extLst>
+          </p:cNvPr>
+          <p:cNvPicPr>
+            <a:picLocks noChangeAspect="1"/>
+          </p:cNvPicPr>
+          <p:nvPr/>
+        </p:nvPicPr>
+        <p:blipFill>
+          <a:blip r:embed="rId31">
+            <a:extLst>
+              <a:ext uri="{96DAC541-7B7A-43D3-8B79-37D633B846F1}">
+                <asvg:svgBlip xmlns:asvg="http://schemas.microsoft.com/office/drawing/2016/SVG/main" r:embed="rId32"/>
+              </a:ext>
+            </a:extLst>
+          </a:blip>
+          <a:srcRect/>
+          <a:stretch/>
+        </p:blipFill>
+        <p:spPr>
+          <a:xfrm>
+            <a:off x="12445483" y="275020"/>
+            <a:ext cx="343999" cy="343999"/>
+          </a:xfrm>
+          <a:prstGeom prst="rect">
+            <a:avLst/>
+          </a:prstGeom>
+        </p:spPr>
+      </p:pic>
+      <p:pic>
+        <p:nvPicPr>
+          <p:cNvPr id="85" name="Graphic 23" descr="Amazon Elastic Kubernetes Service (Amazon EKS) Service icon.">
+            <a:extLst>
+              <a:ext uri="{FF2B5EF4-FFF2-40B4-BE49-F238E27FC236}">
+                <a16:creationId xmlns:a16="http://schemas.microsoft.com/office/drawing/2014/main" id="{0B752CE2-D6CF-D38A-30C9-C7E911E5DFAD}"/>
+              </a:ext>
+            </a:extLst>
+          </p:cNvPr>
+          <p:cNvPicPr>
+            <a:picLocks noChangeAspect="1" noChangeArrowheads="1"/>
+          </p:cNvPicPr>
+          <p:nvPr/>
+        </p:nvPicPr>
+        <p:blipFill>
+          <a:blip r:embed="rId33">
+            <a:extLst>
+              <a:ext uri="{96DAC541-7B7A-43D3-8B79-37D633B846F1}">
+                <asvg:svgBlip xmlns:asvg="http://schemas.microsoft.com/office/drawing/2016/SVG/main" r:embed="rId34"/>
+              </a:ext>
+            </a:extLst>
+          </a:blip>
+          <a:srcRect/>
+          <a:stretch/>
+        </p:blipFill>
+        <p:spPr bwMode="auto">
+          <a:xfrm>
+            <a:off x="2384138" y="4273178"/>
+            <a:ext cx="271920" cy="271920"/>
+          </a:xfrm>
+          <a:prstGeom prst="rect">
+            <a:avLst/>
+          </a:prstGeom>
+          <a:noFill/>
+          <a:ln>
+            <a:noFill/>
+          </a:ln>
+          <a:extLst>
+            <a:ext uri="{909E8E84-426E-40DD-AFC4-6F175D3DCCD1}">
+              <a14:hiddenFill xmlns:a14="http://schemas.microsoft.com/office/drawing/2010/main">
+                <a:solidFill>
+                  <a:srgbClr val="FFFFFF"/>
+                </a:solidFill>
+              </a14:hiddenFill>
+            </a:ext>
+            <a:ext uri="{91240B29-F687-4F45-9708-019B960494DF}">
+              <a14:hiddenLine xmlns:a14="http://schemas.microsoft.com/office/drawing/2010/main" w="9525">
+                <a:solidFill>
+                  <a:srgbClr val="000000"/>
+                </a:solidFill>
+                <a:miter lim="800000"/>
+                <a:headEnd/>
+                <a:tailEnd/>
+              </a14:hiddenLine>
+            </a:ext>
+          </a:extLst>
+        </p:spPr>
+      </p:pic>
     </p:spTree>
     <p:extLst>
       <p:ext uri="{BB962C8B-B14F-4D97-AF65-F5344CB8AC3E}">
@@ -10187,6 +10619,321 @@
 </a:theme>
 </file>
 
+<file path=ppt/theme/theme2.xml><?xml version="1.0" encoding="utf-8"?>
+<a:theme xmlns:a="http://schemas.openxmlformats.org/drawingml/2006/main" name="Office Theme">
+  <a:themeElements>
+    <a:clrScheme name="Office">
+      <a:dk1>
+        <a:sysClr val="windowText" lastClr="000000"/>
+      </a:dk1>
+      <a:lt1>
+        <a:sysClr val="window" lastClr="FFFFFF"/>
+      </a:lt1>
+      <a:dk2>
+        <a:srgbClr val="0E2841"/>
+      </a:dk2>
+      <a:lt2>
+        <a:srgbClr val="E8E8E8"/>
+      </a:lt2>
+      <a:accent1>
+        <a:srgbClr val="156082"/>
+      </a:accent1>
+      <a:accent2>
+        <a:srgbClr val="E97132"/>
+      </a:accent2>
+      <a:accent3>
+        <a:srgbClr val="196B24"/>
+      </a:accent3>
+      <a:accent4>
+        <a:srgbClr val="0F9ED5"/>
+      </a:accent4>
+      <a:accent5>
+        <a:srgbClr val="A02B93"/>
+      </a:accent5>
+      <a:accent6>
+        <a:srgbClr val="4EA72E"/>
+      </a:accent6>
+      <a:hlink>
+        <a:srgbClr val="467886"/>
+      </a:hlink>
+      <a:folHlink>
+        <a:srgbClr val="96607D"/>
+      </a:folHlink>
+    </a:clrScheme>
+    <a:fontScheme name="Office">
+      <a:majorFont>
+        <a:latin typeface="Aptos Display" panose="02110004020202020204"/>
+        <a:ea typeface=""/>
+        <a:cs typeface=""/>
+        <a:font script="Jpan" typeface="游ゴシック Light"/>
+        <a:font script="Hang" typeface="맑은 고딕"/>
+        <a:font script="Hans" typeface="等线 Light"/>
+        <a:font script="Hant" typeface="新細明體"/>
+        <a:font script="Arab" typeface="Times New Roman"/>
+        <a:font script="Hebr" typeface="Times New Roman"/>
+        <a:font script="Thai" typeface="Angsana New"/>
+        <a:font script="Ethi" typeface="Nyala"/>
+        <a:font script="Beng" typeface="Vrinda"/>
+        <a:font script="Gujr" typeface="Shruti"/>
+        <a:font script="Khmr" typeface="MoolBoran"/>
+        <a:font script="Knda" typeface="Tunga"/>
+        <a:font script="Guru" typeface="Raavi"/>
+        <a:font script="Cans" typeface="Euphemia"/>
+        <a:font script="Cher" typeface="Plantagenet Cherokee"/>
+        <a:font script="Yiii" typeface="Microsoft Yi Baiti"/>
+        <a:font script="Tibt" typeface="Microsoft Himalaya"/>
+        <a:font script="Thaa" typeface="MV Boli"/>
+        <a:font script="Deva" typeface="Mangal"/>
+        <a:font script="Telu" typeface="Gautami"/>
+        <a:font script="Taml" typeface="Latha"/>
+        <a:font script="Syrc" typeface="Estrangelo Edessa"/>
+        <a:font script="Orya" typeface="Kalinga"/>
+        <a:font script="Mlym" typeface="Kartika"/>
+        <a:font script="Laoo" typeface="DokChampa"/>
+        <a:font script="Sinh" typeface="Iskoola Pota"/>
+        <a:font script="Mong" typeface="Mongolian Baiti"/>
+        <a:font script="Viet" typeface="Times New Roman"/>
+        <a:font script="Uigh" typeface="Microsoft Uighur"/>
+        <a:font script="Geor" typeface="Sylfaen"/>
+        <a:font script="Armn" typeface="Arial"/>
+        <a:font script="Bugi" typeface="Leelawadee UI"/>
+        <a:font script="Bopo" typeface="Microsoft JhengHei"/>
+        <a:font script="Java" typeface="Javanese Text"/>
+        <a:font script="Lisu" typeface="Segoe UI"/>
+        <a:font script="Mymr" typeface="Myanmar Text"/>
+        <a:font script="Nkoo" typeface="Ebrima"/>
+        <a:font script="Olck" typeface="Nirmala UI"/>
+        <a:font script="Osma" typeface="Ebrima"/>
+        <a:font script="Phag" typeface="Phagspa"/>
+        <a:font script="Syrn" typeface="Estrangelo Edessa"/>
+        <a:font script="Syrj" typeface="Estrangelo Edessa"/>
+        <a:font script="Syre" typeface="Estrangelo Edessa"/>
+        <a:font script="Sora" typeface="Nirmala UI"/>
+        <a:font script="Tale" typeface="Microsoft Tai Le"/>
+        <a:font script="Talu" typeface="Microsoft New Tai Lue"/>
+        <a:font script="Tfng" typeface="Ebrima"/>
+      </a:majorFont>
+      <a:minorFont>
+        <a:latin typeface="Aptos" panose="02110004020202020204"/>
+        <a:ea typeface=""/>
+        <a:cs typeface=""/>
+        <a:font script="Jpan" typeface="游ゴシック"/>
+        <a:font script="Hang" typeface="맑은 고딕"/>
+        <a:font script="Hans" typeface="等线"/>
+        <a:font script="Hant" typeface="新細明體"/>
+        <a:font script="Arab" typeface="Arial"/>
+        <a:font script="Hebr" typeface="Arial"/>
+        <a:font script="Thai" typeface="Cordia New"/>
+        <a:font script="Ethi" typeface="Nyala"/>
+        <a:font script="Beng" typeface="Vrinda"/>
+        <a:font script="Gujr" typeface="Shruti"/>
+        <a:font script="Khmr" typeface="DaunPenh"/>
+        <a:font script="Knda" typeface="Tunga"/>
+        <a:font script="Guru" typeface="Raavi"/>
+        <a:font script="Cans" typeface="Euphemia"/>
+        <a:font script="Cher" typeface="Plantagenet Cherokee"/>
+        <a:font script="Yiii" typeface="Microsoft Yi Baiti"/>
+        <a:font script="Tibt" typeface="Microsoft Himalaya"/>
+        <a:font script="Thaa" typeface="MV Boli"/>
+        <a:font script="Deva" typeface="Mangal"/>
+        <a:font script="Telu" typeface="Gautami"/>
+        <a:font script="Taml" typeface="Latha"/>
+        <a:font script="Syrc" typeface="Estrangelo Edessa"/>
+        <a:font script="Orya" typeface="Kalinga"/>
+        <a:font script="Mlym" typeface="Kartika"/>
+        <a:font script="Laoo" typeface="DokChampa"/>
+        <a:font script="Sinh" typeface="Iskoola Pota"/>
+        <a:font script="Mong" typeface="Mongolian Baiti"/>
+        <a:font script="Viet" typeface="Arial"/>
+        <a:font script="Uigh" typeface="Microsoft Uighur"/>
+        <a:font script="Geor" typeface="Sylfaen"/>
+        <a:font script="Armn" typeface="Arial"/>
+        <a:font script="Bugi" typeface="Leelawadee UI"/>
+        <a:font script="Bopo" typeface="Microsoft JhengHei"/>
+        <a:font script="Java" typeface="Javanese Text"/>
+        <a:font script="Lisu" typeface="Segoe UI"/>
+        <a:font script="Mymr" typeface="Myanmar Text"/>
+        <a:font script="Nkoo" typeface="Ebrima"/>
+        <a:font script="Olck" typeface="Nirmala UI"/>
+        <a:font script="Osma" typeface="Ebrima"/>
+        <a:font script="Phag" typeface="Phagspa"/>
+        <a:font script="Syrn" typeface="Estrangelo Edessa"/>
+        <a:font script="Syrj" typeface="Estrangelo Edessa"/>
+        <a:font script="Syre" typeface="Estrangelo Edessa"/>
+        <a:font script="Sora" typeface="Nirmala UI"/>
+        <a:font script="Tale" typeface="Microsoft Tai Le"/>
+        <a:font script="Talu" typeface="Microsoft New Tai Lue"/>
+        <a:font script="Tfng" typeface="Ebrima"/>
+      </a:minorFont>
+    </a:fontScheme>
+    <a:fmtScheme name="Office">
+      <a:fillStyleLst>
+        <a:solidFill>
+          <a:schemeClr val="phClr"/>
+        </a:solidFill>
+        <a:gradFill rotWithShape="1">
+          <a:gsLst>
+            <a:gs pos="0">
+              <a:schemeClr val="phClr">
+                <a:lumMod val="110000"/>
+                <a:satMod val="105000"/>
+                <a:tint val="67000"/>
+              </a:schemeClr>
+            </a:gs>
+            <a:gs pos="50000">
+              <a:schemeClr val="phClr">
+                <a:lumMod val="105000"/>
+                <a:satMod val="103000"/>
+                <a:tint val="73000"/>
+              </a:schemeClr>
+            </a:gs>
+            <a:gs pos="100000">
+              <a:schemeClr val="phClr">
+                <a:lumMod val="105000"/>
+                <a:satMod val="109000"/>
+                <a:tint val="81000"/>
+              </a:schemeClr>
+            </a:gs>
+          </a:gsLst>
+          <a:lin ang="5400000" scaled="0"/>
+        </a:gradFill>
+        <a:gradFill rotWithShape="1">
+          <a:gsLst>
+            <a:gs pos="0">
+              <a:schemeClr val="phClr">
+                <a:satMod val="103000"/>
+                <a:lumMod val="102000"/>
+                <a:tint val="94000"/>
+              </a:schemeClr>
+            </a:gs>
+            <a:gs pos="50000">
+              <a:schemeClr val="phClr">
+                <a:satMod val="110000"/>
+                <a:lumMod val="100000"/>
+                <a:shade val="100000"/>
+              </a:schemeClr>
+            </a:gs>
+            <a:gs pos="100000">
+              <a:schemeClr val="phClr">
+                <a:lumMod val="99000"/>
+                <a:satMod val="120000"/>
+                <a:shade val="78000"/>
+              </a:schemeClr>
+            </a:gs>
+          </a:gsLst>
+          <a:lin ang="5400000" scaled="0"/>
+        </a:gradFill>
+      </a:fillStyleLst>
+      <a:lnStyleLst>
+        <a:ln w="12700" cap="flat" cmpd="sng" algn="ctr">
+          <a:solidFill>
+            <a:schemeClr val="phClr"/>
+          </a:solidFill>
+          <a:prstDash val="solid"/>
+          <a:miter lim="800000"/>
+        </a:ln>
+        <a:ln w="19050" cap="flat" cmpd="sng" algn="ctr">
+          <a:solidFill>
+            <a:schemeClr val="phClr"/>
+          </a:solidFill>
+          <a:prstDash val="solid"/>
+          <a:miter lim="800000"/>
+        </a:ln>
+        <a:ln w="25400" cap="flat" cmpd="sng" algn="ctr">
+          <a:solidFill>
+            <a:schemeClr val="phClr"/>
+          </a:solidFill>
+          <a:prstDash val="solid"/>
+          <a:miter lim="800000"/>
+        </a:ln>
+      </a:lnStyleLst>
+      <a:effectStyleLst>
+        <a:effectStyle>
+          <a:effectLst/>
+        </a:effectStyle>
+        <a:effectStyle>
+          <a:effectLst/>
+        </a:effectStyle>
+        <a:effectStyle>
+          <a:effectLst>
+            <a:outerShdw blurRad="57150" dist="19050" dir="5400000" algn="ctr" rotWithShape="0">
+              <a:srgbClr val="000000">
+                <a:alpha val="63000"/>
+              </a:srgbClr>
+            </a:outerShdw>
+          </a:effectLst>
+        </a:effectStyle>
+      </a:effectStyleLst>
+      <a:bgFillStyleLst>
+        <a:solidFill>
+          <a:schemeClr val="phClr"/>
+        </a:solidFill>
+        <a:solidFill>
+          <a:schemeClr val="phClr">
+            <a:tint val="95000"/>
+            <a:satMod val="170000"/>
+          </a:schemeClr>
+        </a:solidFill>
+        <a:gradFill rotWithShape="1">
+          <a:gsLst>
+            <a:gs pos="0">
+              <a:schemeClr val="phClr">
+                <a:tint val="93000"/>
+                <a:satMod val="150000"/>
+                <a:shade val="98000"/>
+                <a:lumMod val="102000"/>
+              </a:schemeClr>
+            </a:gs>
+            <a:gs pos="50000">
+              <a:schemeClr val="phClr">
+                <a:tint val="98000"/>
+                <a:satMod val="130000"/>
+                <a:shade val="90000"/>
+                <a:lumMod val="103000"/>
+              </a:schemeClr>
+            </a:gs>
+            <a:gs pos="100000">
+              <a:schemeClr val="phClr">
+                <a:shade val="63000"/>
+                <a:satMod val="120000"/>
+              </a:schemeClr>
+            </a:gs>
+          </a:gsLst>
+          <a:lin ang="5400000" scaled="0"/>
+        </a:gradFill>
+      </a:bgFillStyleLst>
+    </a:fmtScheme>
+  </a:themeElements>
+  <a:objectDefaults>
+    <a:lnDef>
+      <a:spPr/>
+      <a:bodyPr/>
+      <a:lstStyle/>
+      <a:style>
+        <a:lnRef idx="2">
+          <a:schemeClr val="accent1"/>
+        </a:lnRef>
+        <a:fillRef idx="0">
+          <a:schemeClr val="accent1"/>
+        </a:fillRef>
+        <a:effectRef idx="1">
+          <a:schemeClr val="accent1"/>
+        </a:effectRef>
+        <a:fontRef idx="minor">
+          <a:schemeClr val="tx1"/>
+        </a:fontRef>
+      </a:style>
+    </a:lnDef>
+  </a:objectDefaults>
+  <a:extraClrSchemeLst/>
+  <a:extLst>
+    <a:ext uri="{05A4C25C-085E-4340-85A3-A5531E510DB2}">
+      <thm15:themeFamily xmlns:thm15="http://schemas.microsoft.com/office/thememl/2012/main" name="Office Theme" id="{2E142A2C-CD16-42D6-873A-C26D2A0506FA}" vid="{1BDDFF52-6CD6-40A5-AB3C-68EB2F1E4D0A}"/>
+    </a:ext>
+  </a:extLst>
+</a:theme>
+</file>
+
 <file path=docMetadata/LabelInfo.xml><?xml version="1.0" encoding="utf-8"?>
 <clbl:labelList xmlns:clbl="http://schemas.microsoft.com/office/2020/mipLabelMetadata">
   <clbl:label id="{9d258917-277f-42cd-a3cd-14c4e9ee58bc}" enabled="1" method="Standard" siteId="{38ae3bcd-9579-4fd4-adda-b42e1495d55a}" contentBits="0" removed="0"/>

</xml_diff>